<commit_message>
giant component filtered + minor changes
</commit_message>
<xml_diff>
--- a/Project/Coursework_ip.pptx
+++ b/Project/Coursework_ip.pptx
@@ -6,24 +6,25 @@
     <p:sldMasterId id="2147483698" r:id="rId2"/>
   </p:sldMasterIdLst>
   <p:notesMasterIdLst>
-    <p:notesMasterId r:id="rId15"/>
+    <p:notesMasterId r:id="rId16"/>
   </p:notesMasterIdLst>
   <p:handoutMasterIdLst>
-    <p:handoutMasterId r:id="rId16"/>
+    <p:handoutMasterId r:id="rId17"/>
   </p:handoutMasterIdLst>
   <p:sldIdLst>
     <p:sldId id="265" r:id="rId3"/>
     <p:sldId id="262" r:id="rId4"/>
     <p:sldId id="275" r:id="rId5"/>
     <p:sldId id="266" r:id="rId6"/>
-    <p:sldId id="271" r:id="rId7"/>
-    <p:sldId id="267" r:id="rId8"/>
-    <p:sldId id="274" r:id="rId9"/>
-    <p:sldId id="268" r:id="rId10"/>
-    <p:sldId id="270" r:id="rId11"/>
-    <p:sldId id="273" r:id="rId12"/>
-    <p:sldId id="269" r:id="rId13"/>
-    <p:sldId id="263" r:id="rId14"/>
+    <p:sldId id="276" r:id="rId7"/>
+    <p:sldId id="271" r:id="rId8"/>
+    <p:sldId id="267" r:id="rId9"/>
+    <p:sldId id="274" r:id="rId10"/>
+    <p:sldId id="268" r:id="rId11"/>
+    <p:sldId id="270" r:id="rId12"/>
+    <p:sldId id="273" r:id="rId13"/>
+    <p:sldId id="269" r:id="rId14"/>
+    <p:sldId id="263" r:id="rId15"/>
   </p:sldIdLst>
   <p:sldSz cx="9144000" cy="5143500" type="screen16x9"/>
   <p:notesSz cx="6858000" cy="9144000"/>
@@ -224,7 +225,7 @@
             <a:fld id="{19412975-4CFD-C441-A244-B7FD9A9579C2}" type="datetimeFigureOut">
               <a:rPr lang="en-US" smtClean="0"/>
               <a:pPr/>
-              <a:t>5/17/2018</a:t>
+              <a:t>5/21/2018</a:t>
             </a:fld>
             <a:endParaRPr lang="en-US"/>
           </a:p>
@@ -392,7 +393,7 @@
             <a:fld id="{6DAFD1C8-470D-774F-8B40-381C3059BD4A}" type="datetimeFigureOut">
               <a:rPr lang="en-US" smtClean="0"/>
               <a:pPr/>
-              <a:t>5/17/2018</a:t>
+              <a:t>5/21/2018</a:t>
             </a:fld>
             <a:endParaRPr lang="en-US"/>
           </a:p>
@@ -5714,11 +5715,7 @@
           <a:p>
             <a:r>
               <a:rPr lang="en-US" sz="4000" dirty="0" smtClean="0"/>
-              <a:t>Citation </a:t>
-            </a:r>
-            <a:r>
-              <a:rPr lang="en-US" sz="4000" dirty="0" smtClean="0"/>
-              <a:t>network analysis</a:t>
+              <a:t>Citation network analysis</a:t>
             </a:r>
             <a:endParaRPr lang="en-US" sz="4000" dirty="0"/>
           </a:p>
@@ -5775,2296 +5772,6 @@
 </file>
 
 <file path=ppt/slides/slide10.xml><?xml version="1.0" encoding="utf-8"?>
-<p:sld xmlns:a="http://schemas.openxmlformats.org/drawingml/2006/main" xmlns:r="http://schemas.openxmlformats.org/officeDocument/2006/relationships" xmlns:p="http://schemas.openxmlformats.org/presentationml/2006/main" show="0">
-  <p:cSld>
-    <p:bg>
-      <p:bgPr>
-        <a:solidFill>
-          <a:schemeClr val="bg1"/>
-        </a:solidFill>
-        <a:effectLst/>
-      </p:bgPr>
-    </p:bg>
-    <p:spTree>
-      <p:nvGrpSpPr>
-        <p:cNvPr id="1" name=""/>
-        <p:cNvGrpSpPr/>
-        <p:nvPr/>
-      </p:nvGrpSpPr>
-      <p:grpSpPr>
-        <a:xfrm>
-          <a:off x="0" y="0"/>
-          <a:ext cx="0" cy="0"/>
-          <a:chOff x="0" y="0"/>
-          <a:chExt cx="0" cy="0"/>
-        </a:xfrm>
-      </p:grpSpPr>
-      <p:sp>
-        <p:nvSpPr>
-          <p:cNvPr id="2" name="Title 1"/>
-          <p:cNvSpPr>
-            <a:spLocks noGrp="1"/>
-          </p:cNvSpPr>
-          <p:nvPr>
-            <p:ph type="title"/>
-          </p:nvPr>
-        </p:nvSpPr>
-        <p:spPr>
-          <a:xfrm>
-            <a:off x="457200" y="238634"/>
-            <a:ext cx="8229600" cy="620483"/>
-          </a:xfrm>
-        </p:spPr>
-        <p:txBody>
-          <a:bodyPr/>
-          <a:lstStyle/>
-          <a:p>
-            <a:r>
-              <a:rPr lang="en-US" dirty="0" smtClean="0"/>
-              <a:t>Other Metrics</a:t>
-            </a:r>
-            <a:endParaRPr lang="ru-RU" dirty="0"/>
-          </a:p>
-        </p:txBody>
-      </p:sp>
-      <p:pic>
-        <p:nvPicPr>
-          <p:cNvPr id="6" name="Picture 5"/>
-          <p:cNvPicPr>
-            <a:picLocks noChangeAspect="1"/>
-          </p:cNvPicPr>
-          <p:nvPr/>
-        </p:nvPicPr>
-        <p:blipFill>
-          <a:blip r:embed="rId2"/>
-          <a:stretch>
-            <a:fillRect/>
-          </a:stretch>
-        </p:blipFill>
-        <p:spPr>
-          <a:xfrm>
-            <a:off x="722312" y="2395537"/>
-            <a:ext cx="2466975" cy="352425"/>
-          </a:xfrm>
-          <a:prstGeom prst="rect">
-            <a:avLst/>
-          </a:prstGeom>
-        </p:spPr>
-      </p:pic>
-      <p:sp>
-        <p:nvSpPr>
-          <p:cNvPr id="7" name="Content Placeholder 6"/>
-          <p:cNvSpPr>
-            <a:spLocks noGrp="1"/>
-          </p:cNvSpPr>
-          <p:nvPr>
-            <p:ph sz="half" idx="1"/>
-          </p:nvPr>
-        </p:nvSpPr>
-        <p:spPr/>
-        <p:txBody>
-          <a:bodyPr/>
-          <a:lstStyle/>
-          <a:p>
-            <a:endParaRPr lang="ru-RU"/>
-          </a:p>
-        </p:txBody>
-      </p:sp>
-    </p:spTree>
-    <p:extLst>
-      <p:ext uri="{BB962C8B-B14F-4D97-AF65-F5344CB8AC3E}">
-        <p14:creationId xmlns:p14="http://schemas.microsoft.com/office/powerpoint/2010/main" val="4028347123"/>
-      </p:ext>
-    </p:extLst>
-  </p:cSld>
-  <p:clrMapOvr>
-    <a:masterClrMapping/>
-  </p:clrMapOvr>
-  <mc:AlternateContent xmlns:mc="http://schemas.openxmlformats.org/markup-compatibility/2006" xmlns:p14="http://schemas.microsoft.com/office/powerpoint/2010/main">
-    <mc:Choice Requires="p14">
-      <p:transition spd="slow" p14:dur="2000"/>
-    </mc:Choice>
-    <mc:Fallback xmlns="">
-      <p:transition spd="slow"/>
-    </mc:Fallback>
-  </mc:AlternateContent>
-</p:sld>
-</file>
-
-<file path=ppt/slides/slide11.xml><?xml version="1.0" encoding="utf-8"?>
-<p:sld xmlns:a="http://schemas.openxmlformats.org/drawingml/2006/main" xmlns:r="http://schemas.openxmlformats.org/officeDocument/2006/relationships" xmlns:p="http://schemas.openxmlformats.org/presentationml/2006/main">
-  <p:cSld>
-    <p:bg>
-      <p:bgPr>
-        <a:solidFill>
-          <a:schemeClr val="bg1"/>
-        </a:solidFill>
-        <a:effectLst/>
-      </p:bgPr>
-    </p:bg>
-    <p:spTree>
-      <p:nvGrpSpPr>
-        <p:cNvPr id="1" name=""/>
-        <p:cNvGrpSpPr/>
-        <p:nvPr/>
-      </p:nvGrpSpPr>
-      <p:grpSpPr>
-        <a:xfrm>
-          <a:off x="0" y="0"/>
-          <a:ext cx="0" cy="0"/>
-          <a:chOff x="0" y="0"/>
-          <a:chExt cx="0" cy="0"/>
-        </a:xfrm>
-      </p:grpSpPr>
-      <p:sp>
-        <p:nvSpPr>
-          <p:cNvPr id="2" name="Title 1"/>
-          <p:cNvSpPr>
-            <a:spLocks noGrp="1"/>
-          </p:cNvSpPr>
-          <p:nvPr>
-            <p:ph type="title"/>
-          </p:nvPr>
-        </p:nvSpPr>
-        <p:spPr>
-          <a:xfrm>
-            <a:off x="457200" y="383381"/>
-            <a:ext cx="6273934" cy="620483"/>
-          </a:xfrm>
-        </p:spPr>
-        <p:txBody>
-          <a:bodyPr/>
-          <a:lstStyle/>
-          <a:p>
-            <a:r>
-              <a:rPr lang="en-US" dirty="0" smtClean="0"/>
-              <a:t>Models to check</a:t>
-            </a:r>
-            <a:endParaRPr lang="ru-RU" dirty="0"/>
-          </a:p>
-        </p:txBody>
-      </p:sp>
-      <p:sp>
-        <p:nvSpPr>
-          <p:cNvPr id="3" name="Content Placeholder 2"/>
-          <p:cNvSpPr>
-            <a:spLocks noGrp="1"/>
-          </p:cNvSpPr>
-          <p:nvPr>
-            <p:ph sz="half" idx="1"/>
-          </p:nvPr>
-        </p:nvSpPr>
-        <p:spPr>
-          <a:xfrm>
-            <a:off x="457200" y="1130300"/>
-            <a:ext cx="6273934" cy="3464323"/>
-          </a:xfrm>
-        </p:spPr>
-        <p:txBody>
-          <a:bodyPr/>
-          <a:lstStyle/>
-          <a:p>
-            <a:pPr marL="0" indent="0">
-              <a:buNone/>
-            </a:pPr>
-            <a:r>
-              <a:rPr lang="en-US" dirty="0" smtClean="0"/>
-              <a:t>Not exactly matches the power low</a:t>
-            </a:r>
-          </a:p>
-          <a:p>
-            <a:pPr marL="0" indent="0">
-              <a:buNone/>
-            </a:pPr>
-            <a:r>
-              <a:rPr lang="en-US" dirty="0" smtClean="0"/>
-              <a:t>- BA model</a:t>
-            </a:r>
-            <a:endParaRPr lang="ru-RU" dirty="0"/>
-          </a:p>
-        </p:txBody>
-      </p:sp>
-    </p:spTree>
-    <p:extLst>
-      <p:ext uri="{BB962C8B-B14F-4D97-AF65-F5344CB8AC3E}">
-        <p14:creationId xmlns:p14="http://schemas.microsoft.com/office/powerpoint/2010/main" val="484092184"/>
-      </p:ext>
-    </p:extLst>
-  </p:cSld>
-  <p:clrMapOvr>
-    <a:masterClrMapping/>
-  </p:clrMapOvr>
-</p:sld>
-</file>
-
-<file path=ppt/slides/slide12.xml><?xml version="1.0" encoding="utf-8"?>
-<p:sld xmlns:a="http://schemas.openxmlformats.org/drawingml/2006/main" xmlns:r="http://schemas.openxmlformats.org/officeDocument/2006/relationships" xmlns:p="http://schemas.openxmlformats.org/presentationml/2006/main">
-  <p:cSld>
-    <p:bg>
-      <p:bgPr>
-        <a:blipFill dpi="0" rotWithShape="1">
-          <a:blip r:embed="rId2">
-            <a:lum/>
-          </a:blip>
-          <a:srcRect/>
-          <a:stretch>
-            <a:fillRect/>
-          </a:stretch>
-        </a:blipFill>
-        <a:effectLst/>
-      </p:bgPr>
-    </p:bg>
-    <p:spTree>
-      <p:nvGrpSpPr>
-        <p:cNvPr id="1" name=""/>
-        <p:cNvGrpSpPr/>
-        <p:nvPr/>
-      </p:nvGrpSpPr>
-      <p:grpSpPr>
-        <a:xfrm>
-          <a:off x="0" y="0"/>
-          <a:ext cx="0" cy="0"/>
-          <a:chOff x="0" y="0"/>
-          <a:chExt cx="0" cy="0"/>
-        </a:xfrm>
-      </p:grpSpPr>
-      <p:sp>
-        <p:nvSpPr>
-          <p:cNvPr id="2" name="Title 1"/>
-          <p:cNvSpPr>
-            <a:spLocks noGrp="1"/>
-          </p:cNvSpPr>
-          <p:nvPr>
-            <p:ph type="title"/>
-          </p:nvPr>
-        </p:nvSpPr>
-        <p:spPr>
-          <a:xfrm>
-            <a:off x="457200" y="1801258"/>
-            <a:ext cx="8229600" cy="620483"/>
-          </a:xfrm>
-        </p:spPr>
-        <p:txBody>
-          <a:bodyPr/>
-          <a:lstStyle/>
-          <a:p>
-            <a:r>
-              <a:rPr lang="en-US" dirty="0" smtClean="0"/>
-              <a:t>Thank you</a:t>
-            </a:r>
-            <a:r>
-              <a:rPr lang="ru-RU" dirty="0" smtClean="0"/>
-              <a:t>!</a:t>
-            </a:r>
-            <a:endParaRPr lang="en-US" dirty="0"/>
-          </a:p>
-        </p:txBody>
-      </p:sp>
-    </p:spTree>
-    <p:extLst>
-      <p:ext uri="{BB962C8B-B14F-4D97-AF65-F5344CB8AC3E}">
-        <p14:creationId xmlns:p14="http://schemas.microsoft.com/office/powerpoint/2010/main" val="1864942597"/>
-      </p:ext>
-    </p:extLst>
-  </p:cSld>
-  <p:clrMapOvr>
-    <a:masterClrMapping/>
-  </p:clrMapOvr>
-  <p:timing>
-    <p:tnLst>
-      <p:par>
-        <p:cTn id="1" dur="indefinite" restart="never" nodeType="tmRoot"/>
-      </p:par>
-    </p:tnLst>
-  </p:timing>
-</p:sld>
-</file>
-
-<file path=ppt/slides/slide2.xml><?xml version="1.0" encoding="utf-8"?>
-<p:sld xmlns:a="http://schemas.openxmlformats.org/drawingml/2006/main" xmlns:r="http://schemas.openxmlformats.org/officeDocument/2006/relationships" xmlns:p="http://schemas.openxmlformats.org/presentationml/2006/main">
-  <p:cSld>
-    <p:bg>
-      <p:bgPr>
-        <a:solidFill>
-          <a:schemeClr val="bg1"/>
-        </a:solidFill>
-        <a:effectLst/>
-      </p:bgPr>
-    </p:bg>
-    <p:spTree>
-      <p:nvGrpSpPr>
-        <p:cNvPr id="1" name=""/>
-        <p:cNvGrpSpPr/>
-        <p:nvPr/>
-      </p:nvGrpSpPr>
-      <p:grpSpPr>
-        <a:xfrm>
-          <a:off x="0" y="0"/>
-          <a:ext cx="0" cy="0"/>
-          <a:chOff x="0" y="0"/>
-          <a:chExt cx="0" cy="0"/>
-        </a:xfrm>
-      </p:grpSpPr>
-      <p:sp>
-        <p:nvSpPr>
-          <p:cNvPr id="3" name="Content Placeholder 2"/>
-          <p:cNvSpPr>
-            <a:spLocks noGrp="1"/>
-          </p:cNvSpPr>
-          <p:nvPr>
-            <p:ph sz="half" idx="1"/>
-          </p:nvPr>
-        </p:nvSpPr>
-        <p:spPr>
-          <a:xfrm>
-            <a:off x="457197" y="2906605"/>
-            <a:ext cx="8229601" cy="1618263"/>
-          </a:xfrm>
-        </p:spPr>
-        <p:txBody>
-          <a:bodyPr>
-            <a:normAutofit/>
-          </a:bodyPr>
-          <a:lstStyle/>
-          <a:p>
-            <a:pPr marL="0" indent="0" algn="just">
-              <a:spcBef>
-                <a:spcPts val="0"/>
-              </a:spcBef>
-              <a:buNone/>
-            </a:pPr>
-            <a:r>
-              <a:rPr lang="en-US" b="1" dirty="0" smtClean="0"/>
-              <a:t>Properties:</a:t>
-            </a:r>
-          </a:p>
-          <a:p>
-            <a:pPr algn="just">
-              <a:spcBef>
-                <a:spcPts val="0"/>
-              </a:spcBef>
-              <a:buFontTx/>
-              <a:buChar char="-"/>
-            </a:pPr>
-            <a:r>
-              <a:rPr lang="en-US" dirty="0" smtClean="0"/>
-              <a:t>directed;</a:t>
-            </a:r>
-          </a:p>
-          <a:p>
-            <a:pPr algn="just">
-              <a:spcBef>
-                <a:spcPts val="0"/>
-              </a:spcBef>
-              <a:buFontTx/>
-              <a:buChar char="-"/>
-            </a:pPr>
-            <a:r>
-              <a:rPr lang="en-US" dirty="0" smtClean="0"/>
-              <a:t>34 546 vertices (publications)</a:t>
-            </a:r>
-          </a:p>
-          <a:p>
-            <a:pPr algn="just">
-              <a:spcBef>
-                <a:spcPts val="0"/>
-              </a:spcBef>
-              <a:buFontTx/>
-              <a:buChar char="-"/>
-            </a:pPr>
-            <a:r>
-              <a:rPr lang="en-US" dirty="0" smtClean="0"/>
-              <a:t>421 578 edges (citations)</a:t>
-            </a:r>
-            <a:endParaRPr lang="en-US" dirty="0"/>
-          </a:p>
-        </p:txBody>
-      </p:sp>
-      <p:sp>
-        <p:nvSpPr>
-          <p:cNvPr id="4" name="Content Placeholder 2"/>
-          <p:cNvSpPr txBox="1">
-            <a:spLocks/>
-          </p:cNvSpPr>
-          <p:nvPr/>
-        </p:nvSpPr>
-        <p:spPr>
-          <a:xfrm>
-            <a:off x="457196" y="925405"/>
-            <a:ext cx="8229601" cy="1618263"/>
-          </a:xfrm>
-          <a:prstGeom prst="rect">
-            <a:avLst/>
-          </a:prstGeom>
-        </p:spPr>
-        <p:txBody>
-          <a:bodyPr vert="horz" lIns="91440" tIns="45720" rIns="91440" bIns="45720" rtlCol="0">
-            <a:normAutofit/>
-          </a:bodyPr>
-          <a:lstStyle>
-            <a:lvl1pPr marL="342900" indent="-342900" algn="l" defTabSz="457200" rtl="0" eaLnBrk="1" latinLnBrk="0" hangingPunct="1">
-              <a:spcBef>
-                <a:spcPct val="20000"/>
-              </a:spcBef>
-              <a:buSzPct val="100000"/>
-              <a:buFontTx/>
-              <a:buBlip>
-                <a:blip r:embed="rId2"/>
-              </a:buBlip>
-              <a:defRPr sz="2400" kern="1200">
-                <a:solidFill>
-                  <a:schemeClr val="tx1"/>
-                </a:solidFill>
-                <a:latin typeface="+mn-lt"/>
-                <a:ea typeface="+mn-ea"/>
-                <a:cs typeface="+mn-cs"/>
-              </a:defRPr>
-            </a:lvl1pPr>
-            <a:lvl2pPr marL="742950" indent="-285750" algn="l" defTabSz="457200" rtl="0" eaLnBrk="1" latinLnBrk="0" hangingPunct="1">
-              <a:spcBef>
-                <a:spcPct val="20000"/>
-              </a:spcBef>
-              <a:buFont typeface="Arial"/>
-              <a:buChar char="•"/>
-              <a:defRPr sz="2400" kern="1200">
-                <a:solidFill>
-                  <a:schemeClr val="tx1"/>
-                </a:solidFill>
-                <a:latin typeface="+mn-lt"/>
-                <a:ea typeface="+mn-ea"/>
-                <a:cs typeface="+mn-cs"/>
-              </a:defRPr>
-            </a:lvl2pPr>
-            <a:lvl3pPr marL="1143000" indent="-228600" algn="l" defTabSz="457200" rtl="0" eaLnBrk="1" latinLnBrk="0" hangingPunct="1">
-              <a:spcBef>
-                <a:spcPct val="20000"/>
-              </a:spcBef>
-              <a:buFont typeface="Arial"/>
-              <a:buChar char="•"/>
-              <a:defRPr sz="2000" kern="1200">
-                <a:solidFill>
-                  <a:schemeClr val="tx1"/>
-                </a:solidFill>
-                <a:latin typeface="+mn-lt"/>
-                <a:ea typeface="+mn-ea"/>
-                <a:cs typeface="+mn-cs"/>
-              </a:defRPr>
-            </a:lvl3pPr>
-            <a:lvl4pPr marL="1600200" indent="-228600" algn="l" defTabSz="457200" rtl="0" eaLnBrk="1" latinLnBrk="0" hangingPunct="1">
-              <a:spcBef>
-                <a:spcPct val="20000"/>
-              </a:spcBef>
-              <a:buFont typeface="Arial"/>
-              <a:buChar char="•"/>
-              <a:defRPr sz="1800" kern="1200">
-                <a:solidFill>
-                  <a:schemeClr val="tx1"/>
-                </a:solidFill>
-                <a:latin typeface="+mn-lt"/>
-                <a:ea typeface="+mn-ea"/>
-                <a:cs typeface="+mn-cs"/>
-              </a:defRPr>
-            </a:lvl4pPr>
-            <a:lvl5pPr marL="2057400" indent="-228600" algn="l" defTabSz="457200" rtl="0" eaLnBrk="1" latinLnBrk="0" hangingPunct="1">
-              <a:spcBef>
-                <a:spcPct val="20000"/>
-              </a:spcBef>
-              <a:buFont typeface="Arial"/>
-              <a:buChar char="•"/>
-              <a:defRPr sz="1800" kern="1200">
-                <a:solidFill>
-                  <a:schemeClr val="tx1"/>
-                </a:solidFill>
-                <a:latin typeface="+mn-lt"/>
-                <a:ea typeface="+mn-ea"/>
-                <a:cs typeface="+mn-cs"/>
-              </a:defRPr>
-            </a:lvl5pPr>
-            <a:lvl6pPr marL="2514600" indent="-228600" algn="l" defTabSz="457200" rtl="0" eaLnBrk="1" latinLnBrk="0" hangingPunct="1">
-              <a:spcBef>
-                <a:spcPct val="20000"/>
-              </a:spcBef>
-              <a:buFont typeface="Arial"/>
-              <a:buChar char="•"/>
-              <a:defRPr sz="1800" kern="1200">
-                <a:solidFill>
-                  <a:schemeClr val="tx1"/>
-                </a:solidFill>
-                <a:latin typeface="+mn-lt"/>
-                <a:ea typeface="+mn-ea"/>
-                <a:cs typeface="+mn-cs"/>
-              </a:defRPr>
-            </a:lvl6pPr>
-            <a:lvl7pPr marL="2971800" indent="-228600" algn="l" defTabSz="457200" rtl="0" eaLnBrk="1" latinLnBrk="0" hangingPunct="1">
-              <a:spcBef>
-                <a:spcPct val="20000"/>
-              </a:spcBef>
-              <a:buFont typeface="Arial"/>
-              <a:buChar char="•"/>
-              <a:defRPr sz="1800" kern="1200">
-                <a:solidFill>
-                  <a:schemeClr val="tx1"/>
-                </a:solidFill>
-                <a:latin typeface="+mn-lt"/>
-                <a:ea typeface="+mn-ea"/>
-                <a:cs typeface="+mn-cs"/>
-              </a:defRPr>
-            </a:lvl7pPr>
-            <a:lvl8pPr marL="3429000" indent="-228600" algn="l" defTabSz="457200" rtl="0" eaLnBrk="1" latinLnBrk="0" hangingPunct="1">
-              <a:spcBef>
-                <a:spcPct val="20000"/>
-              </a:spcBef>
-              <a:buFont typeface="Arial"/>
-              <a:buChar char="•"/>
-              <a:defRPr sz="1800" kern="1200">
-                <a:solidFill>
-                  <a:schemeClr val="tx1"/>
-                </a:solidFill>
-                <a:latin typeface="+mn-lt"/>
-                <a:ea typeface="+mn-ea"/>
-                <a:cs typeface="+mn-cs"/>
-              </a:defRPr>
-            </a:lvl8pPr>
-            <a:lvl9pPr marL="3886200" indent="-228600" algn="l" defTabSz="457200" rtl="0" eaLnBrk="1" latinLnBrk="0" hangingPunct="1">
-              <a:spcBef>
-                <a:spcPct val="20000"/>
-              </a:spcBef>
-              <a:buFont typeface="Arial"/>
-              <a:buChar char="•"/>
-              <a:defRPr sz="1800" kern="1200">
-                <a:solidFill>
-                  <a:schemeClr val="tx1"/>
-                </a:solidFill>
-                <a:latin typeface="+mn-lt"/>
-                <a:ea typeface="+mn-ea"/>
-                <a:cs typeface="+mn-cs"/>
-              </a:defRPr>
-            </a:lvl9pPr>
-          </a:lstStyle>
-          <a:p>
-            <a:pPr marL="0" indent="0" algn="just">
-              <a:spcBef>
-                <a:spcPts val="0"/>
-              </a:spcBef>
-              <a:buFontTx/>
-              <a:buNone/>
-            </a:pPr>
-            <a:r>
-              <a:rPr lang="en-US" dirty="0" smtClean="0"/>
-              <a:t>The network of publications in the </a:t>
-            </a:r>
-            <a:r>
-              <a:rPr lang="en-US" dirty="0" err="1" smtClean="0"/>
-              <a:t>arXiv's</a:t>
-            </a:r>
-            <a:r>
-              <a:rPr lang="en-US" dirty="0" smtClean="0"/>
-              <a:t> High Energy Physics Phenomenology (</a:t>
-            </a:r>
-            <a:r>
-              <a:rPr lang="en-US" dirty="0" err="1" smtClean="0"/>
-              <a:t>hep-ph</a:t>
-            </a:r>
-            <a:r>
-              <a:rPr lang="en-US" dirty="0" smtClean="0"/>
-              <a:t>) section. The directed links that connect the publications are citations. Some publications cite themselves, and therefore the network contains loops.</a:t>
-            </a:r>
-            <a:endParaRPr lang="en-US" dirty="0"/>
-          </a:p>
-        </p:txBody>
-      </p:sp>
-      <p:sp>
-        <p:nvSpPr>
-          <p:cNvPr id="5" name="Title 1"/>
-          <p:cNvSpPr txBox="1">
-            <a:spLocks/>
-          </p:cNvSpPr>
-          <p:nvPr/>
-        </p:nvSpPr>
-        <p:spPr>
-          <a:xfrm>
-            <a:off x="457200" y="128595"/>
-            <a:ext cx="6273934" cy="620483"/>
-          </a:xfrm>
-          <a:prstGeom prst="rect">
-            <a:avLst/>
-          </a:prstGeom>
-        </p:spPr>
-        <p:txBody>
-          <a:bodyPr vert="horz" lIns="91440" tIns="45720" rIns="91440" bIns="45720" rtlCol="0" anchor="ctr">
-            <a:normAutofit/>
-          </a:bodyPr>
-          <a:lstStyle>
-            <a:lvl1pPr algn="l" defTabSz="457200" rtl="0" eaLnBrk="1" latinLnBrk="0" hangingPunct="1">
-              <a:spcBef>
-                <a:spcPct val="0"/>
-              </a:spcBef>
-              <a:buNone/>
-              <a:defRPr sz="3200" b="1" i="0" kern="1200" baseline="0">
-                <a:solidFill>
-                  <a:schemeClr val="tx1"/>
-                </a:solidFill>
-                <a:latin typeface="+mj-lt"/>
-                <a:ea typeface="+mj-ea"/>
-                <a:cs typeface="+mj-cs"/>
-              </a:defRPr>
-            </a:lvl1pPr>
-          </a:lstStyle>
-          <a:p>
-            <a:r>
-              <a:rPr lang="en-US" dirty="0" smtClean="0"/>
-              <a:t>Short Description</a:t>
-            </a:r>
-            <a:endParaRPr lang="ru-RU" dirty="0"/>
-          </a:p>
-        </p:txBody>
-      </p:sp>
-    </p:spTree>
-    <p:extLst>
-      <p:ext uri="{BB962C8B-B14F-4D97-AF65-F5344CB8AC3E}">
-        <p14:creationId xmlns:p14="http://schemas.microsoft.com/office/powerpoint/2010/main" val="238712034"/>
-      </p:ext>
-    </p:extLst>
-  </p:cSld>
-  <p:clrMapOvr>
-    <a:masterClrMapping/>
-  </p:clrMapOvr>
-  <p:timing>
-    <p:tnLst>
-      <p:par>
-        <p:cTn id="1" dur="indefinite" restart="never" nodeType="tmRoot"/>
-      </p:par>
-    </p:tnLst>
-  </p:timing>
-</p:sld>
-</file>
-
-<file path=ppt/slides/slide3.xml><?xml version="1.0" encoding="utf-8"?>
-<p:sld xmlns:a="http://schemas.openxmlformats.org/drawingml/2006/main" xmlns:r="http://schemas.openxmlformats.org/officeDocument/2006/relationships" xmlns:p="http://schemas.openxmlformats.org/presentationml/2006/main">
-  <p:cSld>
-    <p:bg>
-      <p:bgPr>
-        <a:solidFill>
-          <a:schemeClr val="bg1"/>
-        </a:solidFill>
-        <a:effectLst/>
-      </p:bgPr>
-    </p:bg>
-    <p:spTree>
-      <p:nvGrpSpPr>
-        <p:cNvPr id="1" name=""/>
-        <p:cNvGrpSpPr/>
-        <p:nvPr/>
-      </p:nvGrpSpPr>
-      <p:grpSpPr>
-        <a:xfrm>
-          <a:off x="0" y="0"/>
-          <a:ext cx="0" cy="0"/>
-          <a:chOff x="0" y="0"/>
-          <a:chExt cx="0" cy="0"/>
-        </a:xfrm>
-      </p:grpSpPr>
-      <p:pic>
-        <p:nvPicPr>
-          <p:cNvPr id="3" name="Picture 2"/>
-          <p:cNvPicPr>
-            <a:picLocks noChangeAspect="1"/>
-          </p:cNvPicPr>
-          <p:nvPr/>
-        </p:nvPicPr>
-        <p:blipFill>
-          <a:blip r:embed="rId2">
-            <a:extLst>
-              <a:ext uri="{28A0092B-C50C-407E-A947-70E740481C1C}">
-                <a14:useLocalDpi xmlns:a14="http://schemas.microsoft.com/office/drawing/2010/main" val="0"/>
-              </a:ext>
-            </a:extLst>
-          </a:blip>
-          <a:stretch>
-            <a:fillRect/>
-          </a:stretch>
-        </p:blipFill>
-        <p:spPr>
-          <a:xfrm>
-            <a:off x="0" y="559953"/>
-            <a:ext cx="4572000" cy="4572000"/>
-          </a:xfrm>
-          <a:prstGeom prst="rect">
-            <a:avLst/>
-          </a:prstGeom>
-        </p:spPr>
-      </p:pic>
-      <p:pic>
-        <p:nvPicPr>
-          <p:cNvPr id="4" name="Picture 3"/>
-          <p:cNvPicPr>
-            <a:picLocks noChangeAspect="1"/>
-          </p:cNvPicPr>
-          <p:nvPr/>
-        </p:nvPicPr>
-        <p:blipFill>
-          <a:blip r:embed="rId3">
-            <a:extLst>
-              <a:ext uri="{28A0092B-C50C-407E-A947-70E740481C1C}">
-                <a14:useLocalDpi xmlns:a14="http://schemas.microsoft.com/office/drawing/2010/main" val="0"/>
-              </a:ext>
-            </a:extLst>
-          </a:blip>
-          <a:stretch>
-            <a:fillRect/>
-          </a:stretch>
-        </p:blipFill>
-        <p:spPr>
-          <a:xfrm>
-            <a:off x="4572000" y="559953"/>
-            <a:ext cx="4572000" cy="4572000"/>
-          </a:xfrm>
-          <a:prstGeom prst="rect">
-            <a:avLst/>
-          </a:prstGeom>
-        </p:spPr>
-      </p:pic>
-      <p:sp>
-        <p:nvSpPr>
-          <p:cNvPr id="5" name="Title 1"/>
-          <p:cNvSpPr txBox="1">
-            <a:spLocks/>
-          </p:cNvSpPr>
-          <p:nvPr/>
-        </p:nvSpPr>
-        <p:spPr>
-          <a:xfrm>
-            <a:off x="1295400" y="100749"/>
-            <a:ext cx="1981200" cy="538155"/>
-          </a:xfrm>
-          <a:prstGeom prst="rect">
-            <a:avLst/>
-          </a:prstGeom>
-        </p:spPr>
-        <p:txBody>
-          <a:bodyPr vert="horz" lIns="91440" tIns="45720" rIns="91440" bIns="45720" rtlCol="0" anchor="ctr">
-            <a:normAutofit lnSpcReduction="10000"/>
-          </a:bodyPr>
-          <a:lstStyle>
-            <a:lvl1pPr algn="l" defTabSz="457200" rtl="0" eaLnBrk="1" latinLnBrk="0" hangingPunct="1">
-              <a:spcBef>
-                <a:spcPct val="0"/>
-              </a:spcBef>
-              <a:buNone/>
-              <a:defRPr sz="3200" b="1" i="0" kern="1200" baseline="0">
-                <a:solidFill>
-                  <a:schemeClr val="tx1"/>
-                </a:solidFill>
-                <a:latin typeface="+mj-lt"/>
-                <a:ea typeface="+mj-ea"/>
-                <a:cs typeface="+mj-cs"/>
-              </a:defRPr>
-            </a:lvl1pPr>
-          </a:lstStyle>
-          <a:p>
-            <a:r>
-              <a:rPr lang="en-US" dirty="0" smtClean="0"/>
-              <a:t>In-degree</a:t>
-            </a:r>
-            <a:endParaRPr lang="ru-RU" dirty="0"/>
-          </a:p>
-        </p:txBody>
-      </p:sp>
-      <p:sp>
-        <p:nvSpPr>
-          <p:cNvPr id="6" name="Title 1"/>
-          <p:cNvSpPr txBox="1">
-            <a:spLocks/>
-          </p:cNvSpPr>
-          <p:nvPr/>
-        </p:nvSpPr>
-        <p:spPr>
-          <a:xfrm>
-            <a:off x="5778500" y="48340"/>
-            <a:ext cx="2159000" cy="642971"/>
-          </a:xfrm>
-          <a:prstGeom prst="rect">
-            <a:avLst/>
-          </a:prstGeom>
-        </p:spPr>
-        <p:txBody>
-          <a:bodyPr vert="horz" lIns="91440" tIns="45720" rIns="91440" bIns="45720" rtlCol="0" anchor="ctr">
-            <a:normAutofit/>
-          </a:bodyPr>
-          <a:lstStyle>
-            <a:lvl1pPr algn="l" defTabSz="457200" rtl="0" eaLnBrk="1" latinLnBrk="0" hangingPunct="1">
-              <a:spcBef>
-                <a:spcPct val="0"/>
-              </a:spcBef>
-              <a:buNone/>
-              <a:defRPr sz="3200" b="1" i="0" kern="1200" baseline="0">
-                <a:solidFill>
-                  <a:schemeClr val="tx1"/>
-                </a:solidFill>
-                <a:latin typeface="+mj-lt"/>
-                <a:ea typeface="+mj-ea"/>
-                <a:cs typeface="+mj-cs"/>
-              </a:defRPr>
-            </a:lvl1pPr>
-          </a:lstStyle>
-          <a:p>
-            <a:r>
-              <a:rPr lang="en-US" dirty="0" smtClean="0"/>
-              <a:t>Out</a:t>
-            </a:r>
-            <a:r>
-              <a:rPr lang="en-US" dirty="0" smtClean="0"/>
-              <a:t>-degree</a:t>
-            </a:r>
-            <a:endParaRPr lang="ru-RU" dirty="0"/>
-          </a:p>
-        </p:txBody>
-      </p:sp>
-    </p:spTree>
-    <p:extLst>
-      <p:ext uri="{BB962C8B-B14F-4D97-AF65-F5344CB8AC3E}">
-        <p14:creationId xmlns:p14="http://schemas.microsoft.com/office/powerpoint/2010/main" val="2247482143"/>
-      </p:ext>
-    </p:extLst>
-  </p:cSld>
-  <p:clrMapOvr>
-    <a:masterClrMapping/>
-  </p:clrMapOvr>
-</p:sld>
-</file>
-
-<file path=ppt/slides/slide4.xml><?xml version="1.0" encoding="utf-8"?>
-<p:sld xmlns:a="http://schemas.openxmlformats.org/drawingml/2006/main" xmlns:r="http://schemas.openxmlformats.org/officeDocument/2006/relationships" xmlns:p="http://schemas.openxmlformats.org/presentationml/2006/main">
-  <p:cSld>
-    <p:bg>
-      <p:bgPr>
-        <a:solidFill>
-          <a:schemeClr val="bg1"/>
-        </a:solidFill>
-        <a:effectLst/>
-      </p:bgPr>
-    </p:bg>
-    <p:spTree>
-      <p:nvGrpSpPr>
-        <p:cNvPr id="1" name=""/>
-        <p:cNvGrpSpPr/>
-        <p:nvPr/>
-      </p:nvGrpSpPr>
-      <p:grpSpPr>
-        <a:xfrm>
-          <a:off x="0" y="0"/>
-          <a:ext cx="0" cy="0"/>
-          <a:chOff x="0" y="0"/>
-          <a:chExt cx="0" cy="0"/>
-        </a:xfrm>
-      </p:grpSpPr>
-      <p:sp>
-        <p:nvSpPr>
-          <p:cNvPr id="2" name="Название 1"/>
-          <p:cNvSpPr>
-            <a:spLocks noGrp="1"/>
-          </p:cNvSpPr>
-          <p:nvPr>
-            <p:ph type="title"/>
-          </p:nvPr>
-        </p:nvSpPr>
-        <p:spPr/>
-        <p:txBody>
-          <a:bodyPr/>
-          <a:lstStyle/>
-          <a:p>
-            <a:endParaRPr lang="ru-RU"/>
-          </a:p>
-        </p:txBody>
-      </p:sp>
-      <p:pic>
-        <p:nvPicPr>
-          <p:cNvPr id="4" name="Content Placeholder 3"/>
-          <p:cNvPicPr>
-            <a:picLocks noGrp="1" noChangeAspect="1"/>
-          </p:cNvPicPr>
-          <p:nvPr>
-            <p:ph sz="half" idx="1"/>
-          </p:nvPr>
-        </p:nvPicPr>
-        <p:blipFill>
-          <a:blip r:embed="rId2">
-            <a:extLst>
-              <a:ext uri="{28A0092B-C50C-407E-A947-70E740481C1C}">
-                <a14:useLocalDpi xmlns:a14="http://schemas.microsoft.com/office/drawing/2010/main" val="0"/>
-              </a:ext>
-            </a:extLst>
-          </a:blip>
-          <a:stretch>
-            <a:fillRect/>
-          </a:stretch>
-        </p:blipFill>
-        <p:spPr>
-          <a:xfrm>
-            <a:off x="5255" y="927381"/>
-            <a:ext cx="4566807" cy="3425105"/>
-          </a:xfrm>
-        </p:spPr>
-      </p:pic>
-      <p:pic>
-        <p:nvPicPr>
-          <p:cNvPr id="5" name="Picture 4"/>
-          <p:cNvPicPr>
-            <a:picLocks noChangeAspect="1"/>
-          </p:cNvPicPr>
-          <p:nvPr/>
-        </p:nvPicPr>
-        <p:blipFill>
-          <a:blip r:embed="rId3">
-            <a:extLst>
-              <a:ext uri="{28A0092B-C50C-407E-A947-70E740481C1C}">
-                <a14:useLocalDpi xmlns:a14="http://schemas.microsoft.com/office/drawing/2010/main" val="0"/>
-              </a:ext>
-            </a:extLst>
-          </a:blip>
-          <a:stretch>
-            <a:fillRect/>
-          </a:stretch>
-        </p:blipFill>
-        <p:spPr>
-          <a:xfrm>
-            <a:off x="4572062" y="958911"/>
-            <a:ext cx="4566808" cy="3425105"/>
-          </a:xfrm>
-          <a:prstGeom prst="rect">
-            <a:avLst/>
-          </a:prstGeom>
-        </p:spPr>
-      </p:pic>
-      <p:sp>
-        <p:nvSpPr>
-          <p:cNvPr id="7" name="Title 1"/>
-          <p:cNvSpPr txBox="1">
-            <a:spLocks/>
-          </p:cNvSpPr>
-          <p:nvPr/>
-        </p:nvSpPr>
-        <p:spPr>
-          <a:xfrm>
-            <a:off x="457200" y="97064"/>
-            <a:ext cx="6273934" cy="620483"/>
-          </a:xfrm>
-          <a:prstGeom prst="rect">
-            <a:avLst/>
-          </a:prstGeom>
-        </p:spPr>
-        <p:txBody>
-          <a:bodyPr vert="horz" lIns="91440" tIns="45720" rIns="91440" bIns="45720" rtlCol="0" anchor="ctr">
-            <a:normAutofit/>
-          </a:bodyPr>
-          <a:lstStyle>
-            <a:lvl1pPr algn="l" defTabSz="457200" rtl="0" eaLnBrk="1" latinLnBrk="0" hangingPunct="1">
-              <a:spcBef>
-                <a:spcPct val="0"/>
-              </a:spcBef>
-              <a:buNone/>
-              <a:defRPr sz="3200" b="1" i="0" kern="1200" baseline="0">
-                <a:solidFill>
-                  <a:schemeClr val="tx1"/>
-                </a:solidFill>
-                <a:latin typeface="+mj-lt"/>
-                <a:ea typeface="+mj-ea"/>
-                <a:cs typeface="+mj-cs"/>
-              </a:defRPr>
-            </a:lvl1pPr>
-          </a:lstStyle>
-          <a:p>
-            <a:r>
-              <a:rPr lang="en-US" dirty="0" smtClean="0"/>
-              <a:t>Degree Distributions</a:t>
-            </a:r>
-            <a:endParaRPr lang="ru-RU" dirty="0"/>
-          </a:p>
-        </p:txBody>
-      </p:sp>
-      <p:sp>
-        <p:nvSpPr>
-          <p:cNvPr id="3" name="TextBox 2"/>
-          <p:cNvSpPr txBox="1"/>
-          <p:nvPr/>
-        </p:nvSpPr>
-        <p:spPr>
-          <a:xfrm flipH="1">
-            <a:off x="203900" y="4530787"/>
-            <a:ext cx="5145340" cy="369332"/>
-          </a:xfrm>
-          <a:prstGeom prst="rect">
-            <a:avLst/>
-          </a:prstGeom>
-          <a:noFill/>
-        </p:spPr>
-        <p:txBody>
-          <a:bodyPr wrap="square" rtlCol="0">
-            <a:spAutoFit/>
-          </a:bodyPr>
-          <a:lstStyle/>
-          <a:p>
-            <a:r>
-              <a:rPr lang="en-US" dirty="0" smtClean="0"/>
-              <a:t>Average degree: </a:t>
-            </a:r>
-            <a:r>
-              <a:rPr lang="en-US" dirty="0" err="1" smtClean="0"/>
-              <a:t>Gephi</a:t>
-            </a:r>
-            <a:r>
-              <a:rPr lang="en-US" dirty="0" smtClean="0"/>
-              <a:t> (12.203)</a:t>
-            </a:r>
-            <a:endParaRPr lang="ru-RU" dirty="0"/>
-          </a:p>
-        </p:txBody>
-      </p:sp>
-    </p:spTree>
-    <p:extLst>
-      <p:ext uri="{BB962C8B-B14F-4D97-AF65-F5344CB8AC3E}">
-        <p14:creationId xmlns:p14="http://schemas.microsoft.com/office/powerpoint/2010/main" val="191886464"/>
-      </p:ext>
-    </p:extLst>
-  </p:cSld>
-  <p:clrMapOvr>
-    <a:masterClrMapping/>
-  </p:clrMapOvr>
-  <p:timing>
-    <p:tnLst>
-      <p:par>
-        <p:cTn id="1" dur="indefinite" restart="never" nodeType="tmRoot"/>
-      </p:par>
-    </p:tnLst>
-  </p:timing>
-</p:sld>
-</file>
-
-<file path=ppt/slides/slide5.xml><?xml version="1.0" encoding="utf-8"?>
-<p:sld xmlns:a="http://schemas.openxmlformats.org/drawingml/2006/main" xmlns:r="http://schemas.openxmlformats.org/officeDocument/2006/relationships" xmlns:p="http://schemas.openxmlformats.org/presentationml/2006/main">
-  <p:cSld>
-    <p:bg>
-      <p:bgPr>
-        <a:solidFill>
-          <a:schemeClr val="bg1"/>
-        </a:solidFill>
-        <a:effectLst/>
-      </p:bgPr>
-    </p:bg>
-    <p:spTree>
-      <p:nvGrpSpPr>
-        <p:cNvPr id="1" name=""/>
-        <p:cNvGrpSpPr/>
-        <p:nvPr/>
-      </p:nvGrpSpPr>
-      <p:grpSpPr>
-        <a:xfrm>
-          <a:off x="0" y="0"/>
-          <a:ext cx="0" cy="0"/>
-          <a:chOff x="0" y="0"/>
-          <a:chExt cx="0" cy="0"/>
-        </a:xfrm>
-      </p:grpSpPr>
-      <p:sp>
-        <p:nvSpPr>
-          <p:cNvPr id="2" name="Title 1"/>
-          <p:cNvSpPr>
-            <a:spLocks noGrp="1"/>
-          </p:cNvSpPr>
-          <p:nvPr>
-            <p:ph type="title"/>
-          </p:nvPr>
-        </p:nvSpPr>
-        <p:spPr>
-          <a:xfrm>
-            <a:off x="279400" y="306899"/>
-            <a:ext cx="6273934" cy="620483"/>
-          </a:xfrm>
-        </p:spPr>
-        <p:txBody>
-          <a:bodyPr/>
-          <a:lstStyle/>
-          <a:p>
-            <a:r>
-              <a:rPr lang="en-US" dirty="0" smtClean="0"/>
-              <a:t>Distances</a:t>
-            </a:r>
-            <a:endParaRPr lang="ru-RU" dirty="0"/>
-          </a:p>
-        </p:txBody>
-      </p:sp>
-      <p:pic>
-        <p:nvPicPr>
-          <p:cNvPr id="5" name="Picture 4"/>
-          <p:cNvPicPr>
-            <a:picLocks noChangeAspect="1"/>
-          </p:cNvPicPr>
-          <p:nvPr/>
-        </p:nvPicPr>
-        <p:blipFill>
-          <a:blip r:embed="rId2"/>
-          <a:stretch>
-            <a:fillRect/>
-          </a:stretch>
-        </p:blipFill>
-        <p:spPr>
-          <a:xfrm>
-            <a:off x="6786562" y="4226323"/>
-            <a:ext cx="2124075" cy="457200"/>
-          </a:xfrm>
-          <a:prstGeom prst="rect">
-            <a:avLst/>
-          </a:prstGeom>
-        </p:spPr>
-      </p:pic>
-      <p:pic>
-        <p:nvPicPr>
-          <p:cNvPr id="10" name="Content Placeholder 9"/>
-          <p:cNvPicPr>
-            <a:picLocks noGrp="1" noChangeAspect="1"/>
-          </p:cNvPicPr>
-          <p:nvPr>
-            <p:ph sz="half" idx="1"/>
-          </p:nvPr>
-        </p:nvPicPr>
-        <p:blipFill>
-          <a:blip r:embed="rId3">
-            <a:extLst>
-              <a:ext uri="{28A0092B-C50C-407E-A947-70E740481C1C}">
-                <a14:useLocalDpi xmlns:a14="http://schemas.microsoft.com/office/drawing/2010/main" val="0"/>
-              </a:ext>
-            </a:extLst>
-          </a:blip>
-          <a:stretch>
-            <a:fillRect/>
-          </a:stretch>
-        </p:blipFill>
-        <p:spPr>
-          <a:xfrm>
-            <a:off x="2641205" y="1085850"/>
-            <a:ext cx="3556529" cy="2847975"/>
-          </a:xfrm>
-        </p:spPr>
-      </p:pic>
-    </p:spTree>
-    <p:extLst>
-      <p:ext uri="{BB962C8B-B14F-4D97-AF65-F5344CB8AC3E}">
-        <p14:creationId xmlns:p14="http://schemas.microsoft.com/office/powerpoint/2010/main" val="3164072325"/>
-      </p:ext>
-    </p:extLst>
-  </p:cSld>
-  <p:clrMapOvr>
-    <a:masterClrMapping/>
-  </p:clrMapOvr>
-</p:sld>
-</file>
-
-<file path=ppt/slides/slide6.xml><?xml version="1.0" encoding="utf-8"?>
-<p:sld xmlns:a="http://schemas.openxmlformats.org/drawingml/2006/main" xmlns:r="http://schemas.openxmlformats.org/officeDocument/2006/relationships" xmlns:p="http://schemas.openxmlformats.org/presentationml/2006/main">
-  <p:cSld>
-    <p:bg>
-      <p:bgPr>
-        <a:solidFill>
-          <a:schemeClr val="bg1"/>
-        </a:solidFill>
-        <a:effectLst/>
-      </p:bgPr>
-    </p:bg>
-    <p:spTree>
-      <p:nvGrpSpPr>
-        <p:cNvPr id="1" name=""/>
-        <p:cNvGrpSpPr/>
-        <p:nvPr/>
-      </p:nvGrpSpPr>
-      <p:grpSpPr>
-        <a:xfrm>
-          <a:off x="0" y="0"/>
-          <a:ext cx="0" cy="0"/>
-          <a:chOff x="0" y="0"/>
-          <a:chExt cx="0" cy="0"/>
-        </a:xfrm>
-      </p:grpSpPr>
-      <p:pic>
-        <p:nvPicPr>
-          <p:cNvPr id="2" name="Picture 1"/>
-          <p:cNvPicPr>
-            <a:picLocks noChangeAspect="1"/>
-          </p:cNvPicPr>
-          <p:nvPr/>
-        </p:nvPicPr>
-        <p:blipFill>
-          <a:blip r:embed="rId2"/>
-          <a:stretch>
-            <a:fillRect/>
-          </a:stretch>
-        </p:blipFill>
-        <p:spPr>
-          <a:xfrm>
-            <a:off x="633412" y="4623027"/>
-            <a:ext cx="1781175" cy="142875"/>
-          </a:xfrm>
-          <a:prstGeom prst="rect">
-            <a:avLst/>
-          </a:prstGeom>
-        </p:spPr>
-      </p:pic>
-      <p:sp>
-        <p:nvSpPr>
-          <p:cNvPr id="3" name="Title 1"/>
-          <p:cNvSpPr txBox="1">
-            <a:spLocks/>
-          </p:cNvSpPr>
-          <p:nvPr/>
-        </p:nvSpPr>
-        <p:spPr>
-          <a:xfrm>
-            <a:off x="457200" y="128595"/>
-            <a:ext cx="6273934" cy="620483"/>
-          </a:xfrm>
-          <a:prstGeom prst="rect">
-            <a:avLst/>
-          </a:prstGeom>
-        </p:spPr>
-        <p:txBody>
-          <a:bodyPr vert="horz" lIns="91440" tIns="45720" rIns="91440" bIns="45720" rtlCol="0" anchor="ctr">
-            <a:normAutofit/>
-          </a:bodyPr>
-          <a:lstStyle>
-            <a:lvl1pPr algn="l" defTabSz="457200" rtl="0" eaLnBrk="1" latinLnBrk="0" hangingPunct="1">
-              <a:spcBef>
-                <a:spcPct val="0"/>
-              </a:spcBef>
-              <a:buNone/>
-              <a:defRPr sz="3200" b="1" i="0" kern="1200" baseline="0">
-                <a:solidFill>
-                  <a:schemeClr val="tx1"/>
-                </a:solidFill>
-                <a:latin typeface="+mj-lt"/>
-                <a:ea typeface="+mj-ea"/>
-                <a:cs typeface="+mj-cs"/>
-              </a:defRPr>
-            </a:lvl1pPr>
-          </a:lstStyle>
-          <a:p>
-            <a:r>
-              <a:rPr lang="en-US" dirty="0" smtClean="0"/>
-              <a:t>Clustering Coefficient Distribution</a:t>
-            </a:r>
-            <a:endParaRPr lang="ru-RU" dirty="0"/>
-          </a:p>
-        </p:txBody>
-      </p:sp>
-      <p:pic>
-        <p:nvPicPr>
-          <p:cNvPr id="4" name="Picture 3"/>
-          <p:cNvPicPr>
-            <a:picLocks noChangeAspect="1"/>
-          </p:cNvPicPr>
-          <p:nvPr/>
-        </p:nvPicPr>
-        <p:blipFill>
-          <a:blip r:embed="rId3">
-            <a:extLst>
-              <a:ext uri="{28A0092B-C50C-407E-A947-70E740481C1C}">
-                <a14:useLocalDpi xmlns:a14="http://schemas.microsoft.com/office/drawing/2010/main" val="0"/>
-              </a:ext>
-            </a:extLst>
-          </a:blip>
-          <a:stretch>
-            <a:fillRect/>
-          </a:stretch>
-        </p:blipFill>
-        <p:spPr>
-          <a:xfrm>
-            <a:off x="2300287" y="885361"/>
-            <a:ext cx="4545013" cy="3601382"/>
-          </a:xfrm>
-          <a:prstGeom prst="rect">
-            <a:avLst/>
-          </a:prstGeom>
-        </p:spPr>
-      </p:pic>
-    </p:spTree>
-    <p:extLst>
-      <p:ext uri="{BB962C8B-B14F-4D97-AF65-F5344CB8AC3E}">
-        <p14:creationId xmlns:p14="http://schemas.microsoft.com/office/powerpoint/2010/main" val="379777001"/>
-      </p:ext>
-    </p:extLst>
-  </p:cSld>
-  <p:clrMapOvr>
-    <a:masterClrMapping/>
-  </p:clrMapOvr>
-  <p:timing>
-    <p:tnLst>
-      <p:par>
-        <p:cTn id="1" dur="indefinite" restart="never" nodeType="tmRoot"/>
-      </p:par>
-    </p:tnLst>
-  </p:timing>
-</p:sld>
-</file>
-
-<file path=ppt/slides/slide7.xml><?xml version="1.0" encoding="utf-8"?>
-<p:sld xmlns:a="http://schemas.openxmlformats.org/drawingml/2006/main" xmlns:r="http://schemas.openxmlformats.org/officeDocument/2006/relationships" xmlns:p="http://schemas.openxmlformats.org/presentationml/2006/main">
-  <p:cSld>
-    <p:bg>
-      <p:bgPr>
-        <a:solidFill>
-          <a:schemeClr val="bg1"/>
-        </a:solidFill>
-        <a:effectLst/>
-      </p:bgPr>
-    </p:bg>
-    <p:spTree>
-      <p:nvGrpSpPr>
-        <p:cNvPr id="1" name=""/>
-        <p:cNvGrpSpPr/>
-        <p:nvPr/>
-      </p:nvGrpSpPr>
-      <p:grpSpPr>
-        <a:xfrm>
-          <a:off x="0" y="0"/>
-          <a:ext cx="0" cy="0"/>
-          <a:chOff x="0" y="0"/>
-          <a:chExt cx="0" cy="0"/>
-        </a:xfrm>
-      </p:grpSpPr>
-      <p:sp>
-        <p:nvSpPr>
-          <p:cNvPr id="2" name="Title 1"/>
-          <p:cNvSpPr>
-            <a:spLocks noGrp="1"/>
-          </p:cNvSpPr>
-          <p:nvPr>
-            <p:ph type="title"/>
-          </p:nvPr>
-        </p:nvSpPr>
-        <p:spPr>
-          <a:xfrm>
-            <a:off x="457200" y="306899"/>
-            <a:ext cx="7016262" cy="620483"/>
-          </a:xfrm>
-        </p:spPr>
-        <p:txBody>
-          <a:bodyPr>
-            <a:normAutofit/>
-          </a:bodyPr>
-          <a:lstStyle/>
-          <a:p>
-            <a:r>
-              <a:rPr lang="en-US" dirty="0" err="1" smtClean="0"/>
-              <a:t>Betweenness</a:t>
-            </a:r>
-            <a:r>
-              <a:rPr lang="en-US" dirty="0" smtClean="0"/>
-              <a:t> Centrality in log </a:t>
-            </a:r>
-            <a:r>
-              <a:rPr lang="en-US" dirty="0" err="1" smtClean="0"/>
-              <a:t>log</a:t>
-            </a:r>
-            <a:r>
-              <a:rPr lang="en-US" dirty="0" smtClean="0"/>
-              <a:t> scale</a:t>
-            </a:r>
-            <a:endParaRPr lang="ru-RU" dirty="0"/>
-          </a:p>
-        </p:txBody>
-      </p:sp>
-      <p:pic>
-        <p:nvPicPr>
-          <p:cNvPr id="4" name="Content Placeholder 3"/>
-          <p:cNvPicPr>
-            <a:picLocks noGrp="1" noChangeAspect="1"/>
-          </p:cNvPicPr>
-          <p:nvPr>
-            <p:ph sz="half" idx="1"/>
-          </p:nvPr>
-        </p:nvPicPr>
-        <p:blipFill>
-          <a:blip r:embed="rId2">
-            <a:extLst>
-              <a:ext uri="{28A0092B-C50C-407E-A947-70E740481C1C}">
-                <a14:useLocalDpi xmlns:a14="http://schemas.microsoft.com/office/drawing/2010/main" val="0"/>
-              </a:ext>
-            </a:extLst>
-          </a:blip>
-          <a:stretch>
-            <a:fillRect/>
-          </a:stretch>
-        </p:blipFill>
-        <p:spPr>
-          <a:xfrm>
-            <a:off x="224911" y="927382"/>
-            <a:ext cx="4195233" cy="3146425"/>
-          </a:xfrm>
-        </p:spPr>
-      </p:pic>
-      <mc:AlternateContent xmlns:mc="http://schemas.openxmlformats.org/markup-compatibility/2006" xmlns:a14="http://schemas.microsoft.com/office/drawing/2010/main">
-        <mc:Choice Requires="a14">
-          <p:sp>
-            <p:nvSpPr>
-              <p:cNvPr id="3" name="TextBox 2"/>
-              <p:cNvSpPr txBox="1"/>
-              <p:nvPr/>
-            </p:nvSpPr>
-            <p:spPr>
-              <a:xfrm>
-                <a:off x="457200" y="4554415"/>
-                <a:ext cx="7925888" cy="369332"/>
-              </a:xfrm>
-              <a:prstGeom prst="rect">
-                <a:avLst/>
-              </a:prstGeom>
-              <a:noFill/>
-            </p:spPr>
-            <p:txBody>
-              <a:bodyPr wrap="none" rtlCol="0">
-                <a:spAutoFit/>
-              </a:bodyPr>
-              <a:lstStyle/>
-              <a:p>
-                <a14:m>
-                  <m:oMath xmlns:m="http://schemas.openxmlformats.org/officeDocument/2006/math">
-                    <m:sSub>
-                      <m:sSubPr>
-                        <m:ctrlPr>
-                          <a:rPr lang="ru-RU" i="1" smtClean="0">
-                            <a:latin typeface="Cambria Math" panose="02040503050406030204" pitchFamily="18" charset="0"/>
-                          </a:rPr>
-                        </m:ctrlPr>
-                      </m:sSubPr>
-                      <m:e>
-                        <m:r>
-                          <a:rPr lang="ru-RU" b="0" i="1" smtClean="0">
-                            <a:latin typeface="Cambria Math" panose="02040503050406030204" pitchFamily="18" charset="0"/>
-                          </a:rPr>
-                          <m:t>С</m:t>
-                        </m:r>
-                      </m:e>
-                      <m:sub>
-                        <m:r>
-                          <a:rPr lang="en-US" b="0" i="1" smtClean="0">
-                            <a:latin typeface="Cambria Math" panose="02040503050406030204" pitchFamily="18" charset="0"/>
-                          </a:rPr>
-                          <m:t>𝐵</m:t>
-                        </m:r>
-                      </m:sub>
-                    </m:sSub>
-                    <m:r>
-                      <a:rPr lang="en-US" b="0" i="1" smtClean="0">
-                        <a:latin typeface="Cambria Math" panose="02040503050406030204" pitchFamily="18" charset="0"/>
-                      </a:rPr>
-                      <m:t>(</m:t>
-                    </m:r>
-                    <m:sSub>
-                      <m:sSubPr>
-                        <m:ctrlPr>
-                          <a:rPr lang="en-US" b="0" i="1" smtClean="0">
-                            <a:latin typeface="Cambria Math" panose="02040503050406030204" pitchFamily="18" charset="0"/>
-                          </a:rPr>
-                        </m:ctrlPr>
-                      </m:sSubPr>
-                      <m:e>
-                        <m:r>
-                          <a:rPr lang="ru-RU" b="0" i="1" smtClean="0">
-                            <a:latin typeface="Cambria Math" panose="02040503050406030204" pitchFamily="18" charset="0"/>
-                            <a:ea typeface="Cambria Math" panose="02040503050406030204" pitchFamily="18" charset="0"/>
-                          </a:rPr>
-                          <m:t>𝜈</m:t>
-                        </m:r>
-                      </m:e>
-                      <m:sub>
-                        <m:r>
-                          <a:rPr lang="en-US" b="0" i="1" smtClean="0">
-                            <a:latin typeface="Cambria Math" panose="02040503050406030204" pitchFamily="18" charset="0"/>
-                            <a:ea typeface="Cambria Math" panose="02040503050406030204" pitchFamily="18" charset="0"/>
-                          </a:rPr>
-                          <m:t>𝜅</m:t>
-                        </m:r>
-                      </m:sub>
-                    </m:sSub>
-                    <m:r>
-                      <a:rPr lang="en-US" b="0" i="1" smtClean="0">
-                        <a:latin typeface="Cambria Math" panose="02040503050406030204" pitchFamily="18" charset="0"/>
-                      </a:rPr>
-                      <m:t>)</m:t>
-                    </m:r>
-                  </m:oMath>
-                </a14:m>
-                <a:r>
-                  <a:rPr lang="ru-RU" dirty="0" smtClean="0"/>
-                  <a:t> </a:t>
-                </a:r>
-                <a:r>
-                  <a:rPr lang="en-US" dirty="0" smtClean="0"/>
-                  <a:t>evaluates the appearance of node </a:t>
-                </a:r>
-                <a14:m>
-                  <m:oMath xmlns:m="http://schemas.openxmlformats.org/officeDocument/2006/math">
-                    <m:sSub>
-                      <m:sSubPr>
-                        <m:ctrlPr>
-                          <a:rPr lang="en-US" i="1">
-                            <a:latin typeface="Cambria Math" panose="02040503050406030204" pitchFamily="18" charset="0"/>
-                          </a:rPr>
-                        </m:ctrlPr>
-                      </m:sSubPr>
-                      <m:e>
-                        <m:r>
-                          <a:rPr lang="ru-RU" i="1">
-                            <a:latin typeface="Cambria Math" panose="02040503050406030204" pitchFamily="18" charset="0"/>
-                            <a:ea typeface="Cambria Math" panose="02040503050406030204" pitchFamily="18" charset="0"/>
-                          </a:rPr>
-                          <m:t>𝜈</m:t>
-                        </m:r>
-                      </m:e>
-                      <m:sub>
-                        <m:r>
-                          <a:rPr lang="en-US" i="1">
-                            <a:latin typeface="Cambria Math" panose="02040503050406030204" pitchFamily="18" charset="0"/>
-                            <a:ea typeface="Cambria Math" panose="02040503050406030204" pitchFamily="18" charset="0"/>
-                          </a:rPr>
-                          <m:t>𝜅</m:t>
-                        </m:r>
-                      </m:sub>
-                    </m:sSub>
-                  </m:oMath>
-                </a14:m>
-                <a:r>
-                  <a:rPr lang="en-US" dirty="0" smtClean="0"/>
-                  <a:t> on the all shortest paths in a network</a:t>
-                </a:r>
-                <a:endParaRPr lang="ru-RU" dirty="0"/>
-              </a:p>
-            </p:txBody>
-          </p:sp>
-        </mc:Choice>
-        <mc:Fallback xmlns="">
-          <p:sp>
-            <p:nvSpPr>
-              <p:cNvPr id="3" name="TextBox 2"/>
-              <p:cNvSpPr txBox="1">
-                <a:spLocks noRot="1" noChangeAspect="1" noMove="1" noResize="1" noEditPoints="1" noAdjustHandles="1" noChangeArrowheads="1" noChangeShapeType="1" noTextEdit="1"/>
-              </p:cNvSpPr>
-              <p:nvPr/>
-            </p:nvSpPr>
-            <p:spPr>
-              <a:xfrm>
-                <a:off x="457200" y="4554415"/>
-                <a:ext cx="7925888" cy="369332"/>
-              </a:xfrm>
-              <a:prstGeom prst="rect">
-                <a:avLst/>
-              </a:prstGeom>
-              <a:blipFill>
-                <a:blip r:embed="rId3"/>
-                <a:stretch>
-                  <a:fillRect t="-8197" b="-24590"/>
-                </a:stretch>
-              </a:blipFill>
-            </p:spPr>
-            <p:txBody>
-              <a:bodyPr/>
-              <a:lstStyle/>
-              <a:p>
-                <a:r>
-                  <a:rPr lang="ru-RU">
-                    <a:noFill/>
-                  </a:rPr>
-                  <a:t> </a:t>
-                </a:r>
-              </a:p>
-            </p:txBody>
-          </p:sp>
-        </mc:Fallback>
-      </mc:AlternateContent>
-      <p:sp>
-        <p:nvSpPr>
-          <p:cNvPr id="5" name="Content Placeholder 2"/>
-          <p:cNvSpPr txBox="1">
-            <a:spLocks/>
-          </p:cNvSpPr>
-          <p:nvPr/>
-        </p:nvSpPr>
-        <p:spPr>
-          <a:xfrm>
-            <a:off x="4420144" y="1127021"/>
-            <a:ext cx="4135277" cy="2057613"/>
-          </a:xfrm>
-          <a:prstGeom prst="rect">
-            <a:avLst/>
-          </a:prstGeom>
-        </p:spPr>
-        <p:txBody>
-          <a:bodyPr vert="horz" lIns="91440" tIns="45720" rIns="91440" bIns="45720" rtlCol="0">
-            <a:normAutofit/>
-          </a:bodyPr>
-          <a:lstStyle>
-            <a:lvl1pPr marL="342900" indent="-342900" algn="l" defTabSz="457200" rtl="0" eaLnBrk="1" latinLnBrk="0" hangingPunct="1">
-              <a:spcBef>
-                <a:spcPct val="20000"/>
-              </a:spcBef>
-              <a:buSzPct val="100000"/>
-              <a:buFontTx/>
-              <a:buBlip>
-                <a:blip r:embed="rId4"/>
-              </a:buBlip>
-              <a:defRPr sz="2400" kern="1200">
-                <a:solidFill>
-                  <a:schemeClr val="tx1"/>
-                </a:solidFill>
-                <a:latin typeface="+mn-lt"/>
-                <a:ea typeface="+mn-ea"/>
-                <a:cs typeface="+mn-cs"/>
-              </a:defRPr>
-            </a:lvl1pPr>
-            <a:lvl2pPr marL="742950" indent="-285750" algn="l" defTabSz="457200" rtl="0" eaLnBrk="1" latinLnBrk="0" hangingPunct="1">
-              <a:spcBef>
-                <a:spcPct val="20000"/>
-              </a:spcBef>
-              <a:buFont typeface="Arial"/>
-              <a:buChar char="•"/>
-              <a:defRPr sz="2400" kern="1200">
-                <a:solidFill>
-                  <a:schemeClr val="tx1"/>
-                </a:solidFill>
-                <a:latin typeface="+mn-lt"/>
-                <a:ea typeface="+mn-ea"/>
-                <a:cs typeface="+mn-cs"/>
-              </a:defRPr>
-            </a:lvl2pPr>
-            <a:lvl3pPr marL="1143000" indent="-228600" algn="l" defTabSz="457200" rtl="0" eaLnBrk="1" latinLnBrk="0" hangingPunct="1">
-              <a:spcBef>
-                <a:spcPct val="20000"/>
-              </a:spcBef>
-              <a:buFont typeface="Arial"/>
-              <a:buChar char="•"/>
-              <a:defRPr sz="2000" kern="1200">
-                <a:solidFill>
-                  <a:schemeClr val="tx1"/>
-                </a:solidFill>
-                <a:latin typeface="+mn-lt"/>
-                <a:ea typeface="+mn-ea"/>
-                <a:cs typeface="+mn-cs"/>
-              </a:defRPr>
-            </a:lvl3pPr>
-            <a:lvl4pPr marL="1600200" indent="-228600" algn="l" defTabSz="457200" rtl="0" eaLnBrk="1" latinLnBrk="0" hangingPunct="1">
-              <a:spcBef>
-                <a:spcPct val="20000"/>
-              </a:spcBef>
-              <a:buFont typeface="Arial"/>
-              <a:buChar char="•"/>
-              <a:defRPr sz="1800" kern="1200">
-                <a:solidFill>
-                  <a:schemeClr val="tx1"/>
-                </a:solidFill>
-                <a:latin typeface="+mn-lt"/>
-                <a:ea typeface="+mn-ea"/>
-                <a:cs typeface="+mn-cs"/>
-              </a:defRPr>
-            </a:lvl4pPr>
-            <a:lvl5pPr marL="2057400" indent="-228600" algn="l" defTabSz="457200" rtl="0" eaLnBrk="1" latinLnBrk="0" hangingPunct="1">
-              <a:spcBef>
-                <a:spcPct val="20000"/>
-              </a:spcBef>
-              <a:buFont typeface="Arial"/>
-              <a:buChar char="•"/>
-              <a:defRPr sz="1800" kern="1200">
-                <a:solidFill>
-                  <a:schemeClr val="tx1"/>
-                </a:solidFill>
-                <a:latin typeface="+mn-lt"/>
-                <a:ea typeface="+mn-ea"/>
-                <a:cs typeface="+mn-cs"/>
-              </a:defRPr>
-            </a:lvl5pPr>
-            <a:lvl6pPr marL="2514600" indent="-228600" algn="l" defTabSz="457200" rtl="0" eaLnBrk="1" latinLnBrk="0" hangingPunct="1">
-              <a:spcBef>
-                <a:spcPct val="20000"/>
-              </a:spcBef>
-              <a:buFont typeface="Arial"/>
-              <a:buChar char="•"/>
-              <a:defRPr sz="1800" kern="1200">
-                <a:solidFill>
-                  <a:schemeClr val="tx1"/>
-                </a:solidFill>
-                <a:latin typeface="+mn-lt"/>
-                <a:ea typeface="+mn-ea"/>
-                <a:cs typeface="+mn-cs"/>
-              </a:defRPr>
-            </a:lvl6pPr>
-            <a:lvl7pPr marL="2971800" indent="-228600" algn="l" defTabSz="457200" rtl="0" eaLnBrk="1" latinLnBrk="0" hangingPunct="1">
-              <a:spcBef>
-                <a:spcPct val="20000"/>
-              </a:spcBef>
-              <a:buFont typeface="Arial"/>
-              <a:buChar char="•"/>
-              <a:defRPr sz="1800" kern="1200">
-                <a:solidFill>
-                  <a:schemeClr val="tx1"/>
-                </a:solidFill>
-                <a:latin typeface="+mn-lt"/>
-                <a:ea typeface="+mn-ea"/>
-                <a:cs typeface="+mn-cs"/>
-              </a:defRPr>
-            </a:lvl7pPr>
-            <a:lvl8pPr marL="3429000" indent="-228600" algn="l" defTabSz="457200" rtl="0" eaLnBrk="1" latinLnBrk="0" hangingPunct="1">
-              <a:spcBef>
-                <a:spcPct val="20000"/>
-              </a:spcBef>
-              <a:buFont typeface="Arial"/>
-              <a:buChar char="•"/>
-              <a:defRPr sz="1800" kern="1200">
-                <a:solidFill>
-                  <a:schemeClr val="tx1"/>
-                </a:solidFill>
-                <a:latin typeface="+mn-lt"/>
-                <a:ea typeface="+mn-ea"/>
-                <a:cs typeface="+mn-cs"/>
-              </a:defRPr>
-            </a:lvl8pPr>
-            <a:lvl9pPr marL="3886200" indent="-228600" algn="l" defTabSz="457200" rtl="0" eaLnBrk="1" latinLnBrk="0" hangingPunct="1">
-              <a:spcBef>
-                <a:spcPct val="20000"/>
-              </a:spcBef>
-              <a:buFont typeface="Arial"/>
-              <a:buChar char="•"/>
-              <a:defRPr sz="1800" kern="1200">
-                <a:solidFill>
-                  <a:schemeClr val="tx1"/>
-                </a:solidFill>
-                <a:latin typeface="+mn-lt"/>
-                <a:ea typeface="+mn-ea"/>
-                <a:cs typeface="+mn-cs"/>
-              </a:defRPr>
-            </a:lvl9pPr>
-          </a:lstStyle>
-          <a:p>
-            <a:pPr marL="0" indent="0" algn="just">
-              <a:buFontTx/>
-              <a:buNone/>
-            </a:pPr>
-            <a:r>
-              <a:rPr lang="en-US" dirty="0" smtClean="0"/>
-              <a:t>What does </a:t>
-            </a:r>
-            <a:r>
-              <a:rPr lang="en-US" dirty="0" err="1" smtClean="0"/>
-              <a:t>Gephi</a:t>
-            </a:r>
-            <a:r>
-              <a:rPr lang="en-US" dirty="0" smtClean="0"/>
-              <a:t> tries to say?</a:t>
-            </a:r>
-            <a:endParaRPr lang="ru-RU" dirty="0"/>
-          </a:p>
-        </p:txBody>
-      </p:sp>
-    </p:spTree>
-    <p:extLst>
-      <p:ext uri="{BB962C8B-B14F-4D97-AF65-F5344CB8AC3E}">
-        <p14:creationId xmlns:p14="http://schemas.microsoft.com/office/powerpoint/2010/main" val="3123058431"/>
-      </p:ext>
-    </p:extLst>
-  </p:cSld>
-  <p:clrMapOvr>
-    <a:masterClrMapping/>
-  </p:clrMapOvr>
-</p:sld>
-</file>
-
-<file path=ppt/slides/slide8.xml><?xml version="1.0" encoding="utf-8"?>
-<p:sld xmlns:a="http://schemas.openxmlformats.org/drawingml/2006/main" xmlns:r="http://schemas.openxmlformats.org/officeDocument/2006/relationships" xmlns:p="http://schemas.openxmlformats.org/presentationml/2006/main">
-  <p:cSld>
-    <p:bg>
-      <p:bgPr>
-        <a:solidFill>
-          <a:schemeClr val="bg1"/>
-        </a:solidFill>
-        <a:effectLst/>
-      </p:bgPr>
-    </p:bg>
-    <p:spTree>
-      <p:nvGrpSpPr>
-        <p:cNvPr id="1" name=""/>
-        <p:cNvGrpSpPr/>
-        <p:nvPr/>
-      </p:nvGrpSpPr>
-      <p:grpSpPr>
-        <a:xfrm>
-          <a:off x="0" y="0"/>
-          <a:ext cx="0" cy="0"/>
-          <a:chOff x="0" y="0"/>
-          <a:chExt cx="0" cy="0"/>
-        </a:xfrm>
-      </p:grpSpPr>
-      <p:sp>
-        <p:nvSpPr>
-          <p:cNvPr id="2" name="Title 1"/>
-          <p:cNvSpPr>
-            <a:spLocks noGrp="1"/>
-          </p:cNvSpPr>
-          <p:nvPr>
-            <p:ph type="title"/>
-          </p:nvPr>
-        </p:nvSpPr>
-        <p:spPr>
-          <a:xfrm>
-            <a:off x="457200" y="128595"/>
-            <a:ext cx="6273934" cy="620483"/>
-          </a:xfrm>
-        </p:spPr>
-        <p:txBody>
-          <a:bodyPr/>
-          <a:lstStyle/>
-          <a:p>
-            <a:r>
-              <a:rPr lang="en-US" dirty="0" err="1" smtClean="0"/>
-              <a:t>Assortativity</a:t>
-            </a:r>
-            <a:endParaRPr lang="ru-RU" dirty="0"/>
-          </a:p>
-        </p:txBody>
-      </p:sp>
-      <p:sp>
-        <p:nvSpPr>
-          <p:cNvPr id="3" name="Content Placeholder 2"/>
-          <p:cNvSpPr>
-            <a:spLocks noGrp="1"/>
-          </p:cNvSpPr>
-          <p:nvPr>
-            <p:ph sz="half" idx="1"/>
-          </p:nvPr>
-        </p:nvSpPr>
-        <p:spPr>
-          <a:xfrm>
-            <a:off x="342900" y="990387"/>
-            <a:ext cx="4507037" cy="1486113"/>
-          </a:xfrm>
-        </p:spPr>
-        <p:txBody>
-          <a:bodyPr>
-            <a:normAutofit/>
-          </a:bodyPr>
-          <a:lstStyle/>
-          <a:p>
-            <a:pPr marL="0" indent="0" algn="just">
-              <a:buNone/>
-            </a:pPr>
-            <a:r>
-              <a:rPr lang="en-US" dirty="0"/>
-              <a:t>The average degree connectivity is the average nearest neighbor degree of nodes with degree k. </a:t>
-            </a:r>
-            <a:endParaRPr lang="ru-RU" dirty="0"/>
-          </a:p>
-        </p:txBody>
-      </p:sp>
-      <p:pic>
-        <p:nvPicPr>
-          <p:cNvPr id="4" name="Picture 3"/>
-          <p:cNvPicPr>
-            <a:picLocks noChangeAspect="1"/>
-          </p:cNvPicPr>
-          <p:nvPr/>
-        </p:nvPicPr>
-        <p:blipFill>
-          <a:blip r:embed="rId2">
-            <a:extLst>
-              <a:ext uri="{28A0092B-C50C-407E-A947-70E740481C1C}">
-                <a14:useLocalDpi xmlns:a14="http://schemas.microsoft.com/office/drawing/2010/main" val="0"/>
-              </a:ext>
-            </a:extLst>
-          </a:blip>
-          <a:stretch>
-            <a:fillRect/>
-          </a:stretch>
-        </p:blipFill>
-        <p:spPr>
-          <a:xfrm>
-            <a:off x="4849937" y="749078"/>
-            <a:ext cx="4116263" cy="3087197"/>
-          </a:xfrm>
-          <a:prstGeom prst="rect">
-            <a:avLst/>
-          </a:prstGeom>
-        </p:spPr>
-      </p:pic>
-      <p:sp>
-        <p:nvSpPr>
-          <p:cNvPr id="5" name="Content Placeholder 2"/>
-          <p:cNvSpPr txBox="1">
-            <a:spLocks/>
-          </p:cNvSpPr>
-          <p:nvPr/>
-        </p:nvSpPr>
-        <p:spPr>
-          <a:xfrm>
-            <a:off x="457200" y="4204574"/>
-            <a:ext cx="8509000" cy="758347"/>
-          </a:xfrm>
-          <a:prstGeom prst="rect">
-            <a:avLst/>
-          </a:prstGeom>
-        </p:spPr>
-        <p:txBody>
-          <a:bodyPr vert="horz" lIns="91440" tIns="45720" rIns="91440" bIns="45720" rtlCol="0">
-            <a:normAutofit/>
-          </a:bodyPr>
-          <a:lstStyle>
-            <a:lvl1pPr marL="342900" indent="-342900" algn="l" defTabSz="457200" rtl="0" eaLnBrk="1" latinLnBrk="0" hangingPunct="1">
-              <a:spcBef>
-                <a:spcPct val="20000"/>
-              </a:spcBef>
-              <a:buSzPct val="100000"/>
-              <a:buFontTx/>
-              <a:buBlip>
-                <a:blip r:embed="rId3"/>
-              </a:buBlip>
-              <a:defRPr sz="2400" kern="1200">
-                <a:solidFill>
-                  <a:schemeClr val="tx1"/>
-                </a:solidFill>
-                <a:latin typeface="+mn-lt"/>
-                <a:ea typeface="+mn-ea"/>
-                <a:cs typeface="+mn-cs"/>
-              </a:defRPr>
-            </a:lvl1pPr>
-            <a:lvl2pPr marL="742950" indent="-285750" algn="l" defTabSz="457200" rtl="0" eaLnBrk="1" latinLnBrk="0" hangingPunct="1">
-              <a:spcBef>
-                <a:spcPct val="20000"/>
-              </a:spcBef>
-              <a:buFont typeface="Arial"/>
-              <a:buChar char="•"/>
-              <a:defRPr sz="2400" kern="1200">
-                <a:solidFill>
-                  <a:schemeClr val="tx1"/>
-                </a:solidFill>
-                <a:latin typeface="+mn-lt"/>
-                <a:ea typeface="+mn-ea"/>
-                <a:cs typeface="+mn-cs"/>
-              </a:defRPr>
-            </a:lvl2pPr>
-            <a:lvl3pPr marL="1143000" indent="-228600" algn="l" defTabSz="457200" rtl="0" eaLnBrk="1" latinLnBrk="0" hangingPunct="1">
-              <a:spcBef>
-                <a:spcPct val="20000"/>
-              </a:spcBef>
-              <a:buFont typeface="Arial"/>
-              <a:buChar char="•"/>
-              <a:defRPr sz="2000" kern="1200">
-                <a:solidFill>
-                  <a:schemeClr val="tx1"/>
-                </a:solidFill>
-                <a:latin typeface="+mn-lt"/>
-                <a:ea typeface="+mn-ea"/>
-                <a:cs typeface="+mn-cs"/>
-              </a:defRPr>
-            </a:lvl3pPr>
-            <a:lvl4pPr marL="1600200" indent="-228600" algn="l" defTabSz="457200" rtl="0" eaLnBrk="1" latinLnBrk="0" hangingPunct="1">
-              <a:spcBef>
-                <a:spcPct val="20000"/>
-              </a:spcBef>
-              <a:buFont typeface="Arial"/>
-              <a:buChar char="•"/>
-              <a:defRPr sz="1800" kern="1200">
-                <a:solidFill>
-                  <a:schemeClr val="tx1"/>
-                </a:solidFill>
-                <a:latin typeface="+mn-lt"/>
-                <a:ea typeface="+mn-ea"/>
-                <a:cs typeface="+mn-cs"/>
-              </a:defRPr>
-            </a:lvl4pPr>
-            <a:lvl5pPr marL="2057400" indent="-228600" algn="l" defTabSz="457200" rtl="0" eaLnBrk="1" latinLnBrk="0" hangingPunct="1">
-              <a:spcBef>
-                <a:spcPct val="20000"/>
-              </a:spcBef>
-              <a:buFont typeface="Arial"/>
-              <a:buChar char="•"/>
-              <a:defRPr sz="1800" kern="1200">
-                <a:solidFill>
-                  <a:schemeClr val="tx1"/>
-                </a:solidFill>
-                <a:latin typeface="+mn-lt"/>
-                <a:ea typeface="+mn-ea"/>
-                <a:cs typeface="+mn-cs"/>
-              </a:defRPr>
-            </a:lvl5pPr>
-            <a:lvl6pPr marL="2514600" indent="-228600" algn="l" defTabSz="457200" rtl="0" eaLnBrk="1" latinLnBrk="0" hangingPunct="1">
-              <a:spcBef>
-                <a:spcPct val="20000"/>
-              </a:spcBef>
-              <a:buFont typeface="Arial"/>
-              <a:buChar char="•"/>
-              <a:defRPr sz="1800" kern="1200">
-                <a:solidFill>
-                  <a:schemeClr val="tx1"/>
-                </a:solidFill>
-                <a:latin typeface="+mn-lt"/>
-                <a:ea typeface="+mn-ea"/>
-                <a:cs typeface="+mn-cs"/>
-              </a:defRPr>
-            </a:lvl6pPr>
-            <a:lvl7pPr marL="2971800" indent="-228600" algn="l" defTabSz="457200" rtl="0" eaLnBrk="1" latinLnBrk="0" hangingPunct="1">
-              <a:spcBef>
-                <a:spcPct val="20000"/>
-              </a:spcBef>
-              <a:buFont typeface="Arial"/>
-              <a:buChar char="•"/>
-              <a:defRPr sz="1800" kern="1200">
-                <a:solidFill>
-                  <a:schemeClr val="tx1"/>
-                </a:solidFill>
-                <a:latin typeface="+mn-lt"/>
-                <a:ea typeface="+mn-ea"/>
-                <a:cs typeface="+mn-cs"/>
-              </a:defRPr>
-            </a:lvl7pPr>
-            <a:lvl8pPr marL="3429000" indent="-228600" algn="l" defTabSz="457200" rtl="0" eaLnBrk="1" latinLnBrk="0" hangingPunct="1">
-              <a:spcBef>
-                <a:spcPct val="20000"/>
-              </a:spcBef>
-              <a:buFont typeface="Arial"/>
-              <a:buChar char="•"/>
-              <a:defRPr sz="1800" kern="1200">
-                <a:solidFill>
-                  <a:schemeClr val="tx1"/>
-                </a:solidFill>
-                <a:latin typeface="+mn-lt"/>
-                <a:ea typeface="+mn-ea"/>
-                <a:cs typeface="+mn-cs"/>
-              </a:defRPr>
-            </a:lvl8pPr>
-            <a:lvl9pPr marL="3886200" indent="-228600" algn="l" defTabSz="457200" rtl="0" eaLnBrk="1" latinLnBrk="0" hangingPunct="1">
-              <a:spcBef>
-                <a:spcPct val="20000"/>
-              </a:spcBef>
-              <a:buFont typeface="Arial"/>
-              <a:buChar char="•"/>
-              <a:defRPr sz="1800" kern="1200">
-                <a:solidFill>
-                  <a:schemeClr val="tx1"/>
-                </a:solidFill>
-                <a:latin typeface="+mn-lt"/>
-                <a:ea typeface="+mn-ea"/>
-                <a:cs typeface="+mn-cs"/>
-              </a:defRPr>
-            </a:lvl9pPr>
-          </a:lstStyle>
-          <a:p>
-            <a:pPr marL="0" indent="0" algn="just">
-              <a:buNone/>
-            </a:pPr>
-            <a:r>
-              <a:rPr lang="en-US" dirty="0" smtClean="0"/>
-              <a:t>Degree Pearson correlation coefficient: </a:t>
-            </a:r>
-            <a:r>
-              <a:rPr lang="en-US" dirty="0"/>
-              <a:t>-0.002628226403824088</a:t>
-            </a:r>
-            <a:endParaRPr lang="ru-RU" dirty="0"/>
-          </a:p>
-        </p:txBody>
-      </p:sp>
-      <p:sp>
-        <p:nvSpPr>
-          <p:cNvPr id="7" name="Content Placeholder 2"/>
-          <p:cNvSpPr txBox="1">
-            <a:spLocks/>
-          </p:cNvSpPr>
-          <p:nvPr/>
-        </p:nvSpPr>
-        <p:spPr>
-          <a:xfrm>
-            <a:off x="342900" y="2688323"/>
-            <a:ext cx="4507037" cy="1147952"/>
-          </a:xfrm>
-          <a:prstGeom prst="rect">
-            <a:avLst/>
-          </a:prstGeom>
-        </p:spPr>
-        <p:txBody>
-          <a:bodyPr vert="horz" lIns="91440" tIns="45720" rIns="91440" bIns="45720" rtlCol="0">
-            <a:normAutofit/>
-          </a:bodyPr>
-          <a:lstStyle>
-            <a:lvl1pPr marL="342900" indent="-342900" algn="l" defTabSz="457200" rtl="0" eaLnBrk="1" latinLnBrk="0" hangingPunct="1">
-              <a:spcBef>
-                <a:spcPct val="20000"/>
-              </a:spcBef>
-              <a:buSzPct val="100000"/>
-              <a:buFontTx/>
-              <a:buBlip>
-                <a:blip r:embed="rId3"/>
-              </a:buBlip>
-              <a:defRPr sz="2400" kern="1200">
-                <a:solidFill>
-                  <a:schemeClr val="tx1"/>
-                </a:solidFill>
-                <a:latin typeface="+mn-lt"/>
-                <a:ea typeface="+mn-ea"/>
-                <a:cs typeface="+mn-cs"/>
-              </a:defRPr>
-            </a:lvl1pPr>
-            <a:lvl2pPr marL="742950" indent="-285750" algn="l" defTabSz="457200" rtl="0" eaLnBrk="1" latinLnBrk="0" hangingPunct="1">
-              <a:spcBef>
-                <a:spcPct val="20000"/>
-              </a:spcBef>
-              <a:buFont typeface="Arial"/>
-              <a:buChar char="•"/>
-              <a:defRPr sz="2400" kern="1200">
-                <a:solidFill>
-                  <a:schemeClr val="tx1"/>
-                </a:solidFill>
-                <a:latin typeface="+mn-lt"/>
-                <a:ea typeface="+mn-ea"/>
-                <a:cs typeface="+mn-cs"/>
-              </a:defRPr>
-            </a:lvl2pPr>
-            <a:lvl3pPr marL="1143000" indent="-228600" algn="l" defTabSz="457200" rtl="0" eaLnBrk="1" latinLnBrk="0" hangingPunct="1">
-              <a:spcBef>
-                <a:spcPct val="20000"/>
-              </a:spcBef>
-              <a:buFont typeface="Arial"/>
-              <a:buChar char="•"/>
-              <a:defRPr sz="2000" kern="1200">
-                <a:solidFill>
-                  <a:schemeClr val="tx1"/>
-                </a:solidFill>
-                <a:latin typeface="+mn-lt"/>
-                <a:ea typeface="+mn-ea"/>
-                <a:cs typeface="+mn-cs"/>
-              </a:defRPr>
-            </a:lvl3pPr>
-            <a:lvl4pPr marL="1600200" indent="-228600" algn="l" defTabSz="457200" rtl="0" eaLnBrk="1" latinLnBrk="0" hangingPunct="1">
-              <a:spcBef>
-                <a:spcPct val="20000"/>
-              </a:spcBef>
-              <a:buFont typeface="Arial"/>
-              <a:buChar char="•"/>
-              <a:defRPr sz="1800" kern="1200">
-                <a:solidFill>
-                  <a:schemeClr val="tx1"/>
-                </a:solidFill>
-                <a:latin typeface="+mn-lt"/>
-                <a:ea typeface="+mn-ea"/>
-                <a:cs typeface="+mn-cs"/>
-              </a:defRPr>
-            </a:lvl4pPr>
-            <a:lvl5pPr marL="2057400" indent="-228600" algn="l" defTabSz="457200" rtl="0" eaLnBrk="1" latinLnBrk="0" hangingPunct="1">
-              <a:spcBef>
-                <a:spcPct val="20000"/>
-              </a:spcBef>
-              <a:buFont typeface="Arial"/>
-              <a:buChar char="•"/>
-              <a:defRPr sz="1800" kern="1200">
-                <a:solidFill>
-                  <a:schemeClr val="tx1"/>
-                </a:solidFill>
-                <a:latin typeface="+mn-lt"/>
-                <a:ea typeface="+mn-ea"/>
-                <a:cs typeface="+mn-cs"/>
-              </a:defRPr>
-            </a:lvl5pPr>
-            <a:lvl6pPr marL="2514600" indent="-228600" algn="l" defTabSz="457200" rtl="0" eaLnBrk="1" latinLnBrk="0" hangingPunct="1">
-              <a:spcBef>
-                <a:spcPct val="20000"/>
-              </a:spcBef>
-              <a:buFont typeface="Arial"/>
-              <a:buChar char="•"/>
-              <a:defRPr sz="1800" kern="1200">
-                <a:solidFill>
-                  <a:schemeClr val="tx1"/>
-                </a:solidFill>
-                <a:latin typeface="+mn-lt"/>
-                <a:ea typeface="+mn-ea"/>
-                <a:cs typeface="+mn-cs"/>
-              </a:defRPr>
-            </a:lvl6pPr>
-            <a:lvl7pPr marL="2971800" indent="-228600" algn="l" defTabSz="457200" rtl="0" eaLnBrk="1" latinLnBrk="0" hangingPunct="1">
-              <a:spcBef>
-                <a:spcPct val="20000"/>
-              </a:spcBef>
-              <a:buFont typeface="Arial"/>
-              <a:buChar char="•"/>
-              <a:defRPr sz="1800" kern="1200">
-                <a:solidFill>
-                  <a:schemeClr val="tx1"/>
-                </a:solidFill>
-                <a:latin typeface="+mn-lt"/>
-                <a:ea typeface="+mn-ea"/>
-                <a:cs typeface="+mn-cs"/>
-              </a:defRPr>
-            </a:lvl7pPr>
-            <a:lvl8pPr marL="3429000" indent="-228600" algn="l" defTabSz="457200" rtl="0" eaLnBrk="1" latinLnBrk="0" hangingPunct="1">
-              <a:spcBef>
-                <a:spcPct val="20000"/>
-              </a:spcBef>
-              <a:buFont typeface="Arial"/>
-              <a:buChar char="•"/>
-              <a:defRPr sz="1800" kern="1200">
-                <a:solidFill>
-                  <a:schemeClr val="tx1"/>
-                </a:solidFill>
-                <a:latin typeface="+mn-lt"/>
-                <a:ea typeface="+mn-ea"/>
-                <a:cs typeface="+mn-cs"/>
-              </a:defRPr>
-            </a:lvl8pPr>
-            <a:lvl9pPr marL="3886200" indent="-228600" algn="l" defTabSz="457200" rtl="0" eaLnBrk="1" latinLnBrk="0" hangingPunct="1">
-              <a:spcBef>
-                <a:spcPct val="20000"/>
-              </a:spcBef>
-              <a:buFont typeface="Arial"/>
-              <a:buChar char="•"/>
-              <a:defRPr sz="1800" kern="1200">
-                <a:solidFill>
-                  <a:schemeClr val="tx1"/>
-                </a:solidFill>
-                <a:latin typeface="+mn-lt"/>
-                <a:ea typeface="+mn-ea"/>
-                <a:cs typeface="+mn-cs"/>
-              </a:defRPr>
-            </a:lvl9pPr>
-          </a:lstStyle>
-          <a:p>
-            <a:pPr marL="0" indent="0" algn="just">
-              <a:buNone/>
-            </a:pPr>
-            <a:r>
-              <a:rPr lang="en-US" dirty="0" smtClean="0"/>
-              <a:t>This network is </a:t>
-            </a:r>
-            <a:r>
-              <a:rPr lang="en-US" dirty="0" err="1" smtClean="0"/>
-              <a:t>disassortative</a:t>
-            </a:r>
-            <a:endParaRPr lang="en-US" dirty="0" smtClean="0"/>
-          </a:p>
-        </p:txBody>
-      </p:sp>
-    </p:spTree>
-    <p:extLst>
-      <p:ext uri="{BB962C8B-B14F-4D97-AF65-F5344CB8AC3E}">
-        <p14:creationId xmlns:p14="http://schemas.microsoft.com/office/powerpoint/2010/main" val="2827962398"/>
-      </p:ext>
-    </p:extLst>
-  </p:cSld>
-  <p:clrMapOvr>
-    <a:masterClrMapping/>
-  </p:clrMapOvr>
-  <p:timing>
-    <p:tnLst>
-      <p:par>
-        <p:cTn id="1" dur="indefinite" restart="never" nodeType="tmRoot"/>
-      </p:par>
-    </p:tnLst>
-  </p:timing>
-</p:sld>
-</file>
-
-<file path=ppt/slides/slide9.xml><?xml version="1.0" encoding="utf-8"?>
 <p:sld xmlns:a="http://schemas.openxmlformats.org/drawingml/2006/main" xmlns:r="http://schemas.openxmlformats.org/officeDocument/2006/relationships" xmlns:p="http://schemas.openxmlformats.org/presentationml/2006/main">
   <p:cSld>
     <p:bg>
@@ -8730,6 +6437,2611 @@
     <p:extLst>
       <p:ext uri="{BB962C8B-B14F-4D97-AF65-F5344CB8AC3E}">
         <p14:creationId xmlns:p14="http://schemas.microsoft.com/office/powerpoint/2010/main" val="3400051497"/>
+      </p:ext>
+    </p:extLst>
+  </p:cSld>
+  <p:clrMapOvr>
+    <a:masterClrMapping/>
+  </p:clrMapOvr>
+  <p:timing>
+    <p:tnLst>
+      <p:par>
+        <p:cTn id="1" dur="indefinite" restart="never" nodeType="tmRoot"/>
+      </p:par>
+    </p:tnLst>
+  </p:timing>
+</p:sld>
+</file>
+
+<file path=ppt/slides/slide11.xml><?xml version="1.0" encoding="utf-8"?>
+<p:sld xmlns:a="http://schemas.openxmlformats.org/drawingml/2006/main" xmlns:r="http://schemas.openxmlformats.org/officeDocument/2006/relationships" xmlns:p="http://schemas.openxmlformats.org/presentationml/2006/main" show="0">
+  <p:cSld>
+    <p:bg>
+      <p:bgPr>
+        <a:solidFill>
+          <a:schemeClr val="bg1"/>
+        </a:solidFill>
+        <a:effectLst/>
+      </p:bgPr>
+    </p:bg>
+    <p:spTree>
+      <p:nvGrpSpPr>
+        <p:cNvPr id="1" name=""/>
+        <p:cNvGrpSpPr/>
+        <p:nvPr/>
+      </p:nvGrpSpPr>
+      <p:grpSpPr>
+        <a:xfrm>
+          <a:off x="0" y="0"/>
+          <a:ext cx="0" cy="0"/>
+          <a:chOff x="0" y="0"/>
+          <a:chExt cx="0" cy="0"/>
+        </a:xfrm>
+      </p:grpSpPr>
+      <p:sp>
+        <p:nvSpPr>
+          <p:cNvPr id="2" name="Title 1"/>
+          <p:cNvSpPr>
+            <a:spLocks noGrp="1"/>
+          </p:cNvSpPr>
+          <p:nvPr>
+            <p:ph type="title"/>
+          </p:nvPr>
+        </p:nvSpPr>
+        <p:spPr>
+          <a:xfrm>
+            <a:off x="457200" y="238634"/>
+            <a:ext cx="8229600" cy="620483"/>
+          </a:xfrm>
+        </p:spPr>
+        <p:txBody>
+          <a:bodyPr/>
+          <a:lstStyle/>
+          <a:p>
+            <a:r>
+              <a:rPr lang="en-US" dirty="0" smtClean="0"/>
+              <a:t>Other Metrics</a:t>
+            </a:r>
+            <a:endParaRPr lang="ru-RU" dirty="0"/>
+          </a:p>
+        </p:txBody>
+      </p:sp>
+      <p:pic>
+        <p:nvPicPr>
+          <p:cNvPr id="6" name="Picture 5"/>
+          <p:cNvPicPr>
+            <a:picLocks noChangeAspect="1"/>
+          </p:cNvPicPr>
+          <p:nvPr/>
+        </p:nvPicPr>
+        <p:blipFill>
+          <a:blip r:embed="rId2"/>
+          <a:stretch>
+            <a:fillRect/>
+          </a:stretch>
+        </p:blipFill>
+        <p:spPr>
+          <a:xfrm>
+            <a:off x="722312" y="2395537"/>
+            <a:ext cx="2466975" cy="352425"/>
+          </a:xfrm>
+          <a:prstGeom prst="rect">
+            <a:avLst/>
+          </a:prstGeom>
+        </p:spPr>
+      </p:pic>
+      <p:sp>
+        <p:nvSpPr>
+          <p:cNvPr id="7" name="Content Placeholder 6"/>
+          <p:cNvSpPr>
+            <a:spLocks noGrp="1"/>
+          </p:cNvSpPr>
+          <p:nvPr>
+            <p:ph sz="half" idx="1"/>
+          </p:nvPr>
+        </p:nvSpPr>
+        <p:spPr/>
+        <p:txBody>
+          <a:bodyPr/>
+          <a:lstStyle/>
+          <a:p>
+            <a:endParaRPr lang="ru-RU"/>
+          </a:p>
+        </p:txBody>
+      </p:sp>
+    </p:spTree>
+    <p:extLst>
+      <p:ext uri="{BB962C8B-B14F-4D97-AF65-F5344CB8AC3E}">
+        <p14:creationId xmlns:p14="http://schemas.microsoft.com/office/powerpoint/2010/main" val="4028347123"/>
+      </p:ext>
+    </p:extLst>
+  </p:cSld>
+  <p:clrMapOvr>
+    <a:masterClrMapping/>
+  </p:clrMapOvr>
+  <mc:AlternateContent xmlns:mc="http://schemas.openxmlformats.org/markup-compatibility/2006" xmlns:p14="http://schemas.microsoft.com/office/powerpoint/2010/main">
+    <mc:Choice Requires="p14">
+      <p:transition spd="slow" p14:dur="2000"/>
+    </mc:Choice>
+    <mc:Fallback xmlns="">
+      <p:transition spd="slow"/>
+    </mc:Fallback>
+  </mc:AlternateContent>
+</p:sld>
+</file>
+
+<file path=ppt/slides/slide12.xml><?xml version="1.0" encoding="utf-8"?>
+<p:sld xmlns:a="http://schemas.openxmlformats.org/drawingml/2006/main" xmlns:r="http://schemas.openxmlformats.org/officeDocument/2006/relationships" xmlns:p="http://schemas.openxmlformats.org/presentationml/2006/main">
+  <p:cSld>
+    <p:bg>
+      <p:bgPr>
+        <a:solidFill>
+          <a:schemeClr val="bg1"/>
+        </a:solidFill>
+        <a:effectLst/>
+      </p:bgPr>
+    </p:bg>
+    <p:spTree>
+      <p:nvGrpSpPr>
+        <p:cNvPr id="1" name=""/>
+        <p:cNvGrpSpPr/>
+        <p:nvPr/>
+      </p:nvGrpSpPr>
+      <p:grpSpPr>
+        <a:xfrm>
+          <a:off x="0" y="0"/>
+          <a:ext cx="0" cy="0"/>
+          <a:chOff x="0" y="0"/>
+          <a:chExt cx="0" cy="0"/>
+        </a:xfrm>
+      </p:grpSpPr>
+      <p:sp>
+        <p:nvSpPr>
+          <p:cNvPr id="2" name="Title 1"/>
+          <p:cNvSpPr>
+            <a:spLocks noGrp="1"/>
+          </p:cNvSpPr>
+          <p:nvPr>
+            <p:ph type="title"/>
+          </p:nvPr>
+        </p:nvSpPr>
+        <p:spPr>
+          <a:xfrm>
+            <a:off x="457200" y="383381"/>
+            <a:ext cx="6273934" cy="620483"/>
+          </a:xfrm>
+        </p:spPr>
+        <p:txBody>
+          <a:bodyPr/>
+          <a:lstStyle/>
+          <a:p>
+            <a:r>
+              <a:rPr lang="en-US" dirty="0" smtClean="0"/>
+              <a:t>Models to check</a:t>
+            </a:r>
+            <a:endParaRPr lang="ru-RU" dirty="0"/>
+          </a:p>
+        </p:txBody>
+      </p:sp>
+      <p:sp>
+        <p:nvSpPr>
+          <p:cNvPr id="3" name="Content Placeholder 2"/>
+          <p:cNvSpPr>
+            <a:spLocks noGrp="1"/>
+          </p:cNvSpPr>
+          <p:nvPr>
+            <p:ph sz="half" idx="1"/>
+          </p:nvPr>
+        </p:nvSpPr>
+        <p:spPr>
+          <a:xfrm>
+            <a:off x="457200" y="1130300"/>
+            <a:ext cx="6273934" cy="3464323"/>
+          </a:xfrm>
+        </p:spPr>
+        <p:txBody>
+          <a:bodyPr/>
+          <a:lstStyle/>
+          <a:p>
+            <a:pPr marL="0" indent="0">
+              <a:buNone/>
+            </a:pPr>
+            <a:r>
+              <a:rPr lang="en-US" dirty="0" smtClean="0"/>
+              <a:t>Not exactly matches the power low</a:t>
+            </a:r>
+          </a:p>
+          <a:p>
+            <a:pPr marL="0" indent="0">
+              <a:buNone/>
+            </a:pPr>
+            <a:r>
+              <a:rPr lang="en-US" dirty="0" smtClean="0"/>
+              <a:t>- BA model</a:t>
+            </a:r>
+            <a:endParaRPr lang="ru-RU" dirty="0"/>
+          </a:p>
+        </p:txBody>
+      </p:sp>
+    </p:spTree>
+    <p:extLst>
+      <p:ext uri="{BB962C8B-B14F-4D97-AF65-F5344CB8AC3E}">
+        <p14:creationId xmlns:p14="http://schemas.microsoft.com/office/powerpoint/2010/main" val="484092184"/>
+      </p:ext>
+    </p:extLst>
+  </p:cSld>
+  <p:clrMapOvr>
+    <a:masterClrMapping/>
+  </p:clrMapOvr>
+</p:sld>
+</file>
+
+<file path=ppt/slides/slide13.xml><?xml version="1.0" encoding="utf-8"?>
+<p:sld xmlns:a="http://schemas.openxmlformats.org/drawingml/2006/main" xmlns:r="http://schemas.openxmlformats.org/officeDocument/2006/relationships" xmlns:p="http://schemas.openxmlformats.org/presentationml/2006/main">
+  <p:cSld>
+    <p:bg>
+      <p:bgPr>
+        <a:blipFill dpi="0" rotWithShape="1">
+          <a:blip r:embed="rId2">
+            <a:lum/>
+          </a:blip>
+          <a:srcRect/>
+          <a:stretch>
+            <a:fillRect/>
+          </a:stretch>
+        </a:blipFill>
+        <a:effectLst/>
+      </p:bgPr>
+    </p:bg>
+    <p:spTree>
+      <p:nvGrpSpPr>
+        <p:cNvPr id="1" name=""/>
+        <p:cNvGrpSpPr/>
+        <p:nvPr/>
+      </p:nvGrpSpPr>
+      <p:grpSpPr>
+        <a:xfrm>
+          <a:off x="0" y="0"/>
+          <a:ext cx="0" cy="0"/>
+          <a:chOff x="0" y="0"/>
+          <a:chExt cx="0" cy="0"/>
+        </a:xfrm>
+      </p:grpSpPr>
+      <p:sp>
+        <p:nvSpPr>
+          <p:cNvPr id="2" name="Title 1"/>
+          <p:cNvSpPr>
+            <a:spLocks noGrp="1"/>
+          </p:cNvSpPr>
+          <p:nvPr>
+            <p:ph type="title"/>
+          </p:nvPr>
+        </p:nvSpPr>
+        <p:spPr>
+          <a:xfrm>
+            <a:off x="457200" y="1801258"/>
+            <a:ext cx="8229600" cy="620483"/>
+          </a:xfrm>
+        </p:spPr>
+        <p:txBody>
+          <a:bodyPr/>
+          <a:lstStyle/>
+          <a:p>
+            <a:r>
+              <a:rPr lang="en-US" dirty="0" smtClean="0"/>
+              <a:t>Thank you</a:t>
+            </a:r>
+            <a:r>
+              <a:rPr lang="ru-RU" dirty="0" smtClean="0"/>
+              <a:t>!</a:t>
+            </a:r>
+            <a:endParaRPr lang="en-US" dirty="0"/>
+          </a:p>
+        </p:txBody>
+      </p:sp>
+    </p:spTree>
+    <p:extLst>
+      <p:ext uri="{BB962C8B-B14F-4D97-AF65-F5344CB8AC3E}">
+        <p14:creationId xmlns:p14="http://schemas.microsoft.com/office/powerpoint/2010/main" val="1864942597"/>
+      </p:ext>
+    </p:extLst>
+  </p:cSld>
+  <p:clrMapOvr>
+    <a:masterClrMapping/>
+  </p:clrMapOvr>
+  <p:timing>
+    <p:tnLst>
+      <p:par>
+        <p:cTn id="1" dur="indefinite" restart="never" nodeType="tmRoot"/>
+      </p:par>
+    </p:tnLst>
+  </p:timing>
+</p:sld>
+</file>
+
+<file path=ppt/slides/slide2.xml><?xml version="1.0" encoding="utf-8"?>
+<p:sld xmlns:a="http://schemas.openxmlformats.org/drawingml/2006/main" xmlns:r="http://schemas.openxmlformats.org/officeDocument/2006/relationships" xmlns:p="http://schemas.openxmlformats.org/presentationml/2006/main">
+  <p:cSld>
+    <p:bg>
+      <p:bgPr>
+        <a:solidFill>
+          <a:schemeClr val="bg1"/>
+        </a:solidFill>
+        <a:effectLst/>
+      </p:bgPr>
+    </p:bg>
+    <p:spTree>
+      <p:nvGrpSpPr>
+        <p:cNvPr id="1" name=""/>
+        <p:cNvGrpSpPr/>
+        <p:nvPr/>
+      </p:nvGrpSpPr>
+      <p:grpSpPr>
+        <a:xfrm>
+          <a:off x="0" y="0"/>
+          <a:ext cx="0" cy="0"/>
+          <a:chOff x="0" y="0"/>
+          <a:chExt cx="0" cy="0"/>
+        </a:xfrm>
+      </p:grpSpPr>
+      <p:sp>
+        <p:nvSpPr>
+          <p:cNvPr id="3" name="Content Placeholder 2"/>
+          <p:cNvSpPr>
+            <a:spLocks noGrp="1"/>
+          </p:cNvSpPr>
+          <p:nvPr>
+            <p:ph sz="half" idx="1"/>
+          </p:nvPr>
+        </p:nvSpPr>
+        <p:spPr>
+          <a:xfrm>
+            <a:off x="457197" y="2906605"/>
+            <a:ext cx="8229601" cy="1618263"/>
+          </a:xfrm>
+        </p:spPr>
+        <p:txBody>
+          <a:bodyPr>
+            <a:normAutofit/>
+          </a:bodyPr>
+          <a:lstStyle/>
+          <a:p>
+            <a:pPr marL="0" indent="0" algn="just">
+              <a:spcBef>
+                <a:spcPts val="0"/>
+              </a:spcBef>
+              <a:buNone/>
+            </a:pPr>
+            <a:r>
+              <a:rPr lang="en-US" b="1" dirty="0" smtClean="0"/>
+              <a:t>Properties:</a:t>
+            </a:r>
+          </a:p>
+          <a:p>
+            <a:pPr algn="just">
+              <a:spcBef>
+                <a:spcPts val="0"/>
+              </a:spcBef>
+              <a:buFontTx/>
+              <a:buChar char="-"/>
+            </a:pPr>
+            <a:r>
+              <a:rPr lang="en-US" dirty="0" smtClean="0"/>
+              <a:t>directed;</a:t>
+            </a:r>
+          </a:p>
+          <a:p>
+            <a:pPr algn="just">
+              <a:spcBef>
+                <a:spcPts val="0"/>
+              </a:spcBef>
+              <a:buFontTx/>
+              <a:buChar char="-"/>
+            </a:pPr>
+            <a:r>
+              <a:rPr lang="en-US" dirty="0" smtClean="0"/>
+              <a:t>34 546 vertices (publications)</a:t>
+            </a:r>
+          </a:p>
+          <a:p>
+            <a:pPr algn="just">
+              <a:spcBef>
+                <a:spcPts val="0"/>
+              </a:spcBef>
+              <a:buFontTx/>
+              <a:buChar char="-"/>
+            </a:pPr>
+            <a:r>
+              <a:rPr lang="en-US" dirty="0" smtClean="0"/>
+              <a:t>421 578 edges (citations)</a:t>
+            </a:r>
+            <a:endParaRPr lang="en-US" dirty="0"/>
+          </a:p>
+        </p:txBody>
+      </p:sp>
+      <p:sp>
+        <p:nvSpPr>
+          <p:cNvPr id="4" name="Content Placeholder 2"/>
+          <p:cNvSpPr txBox="1">
+            <a:spLocks/>
+          </p:cNvSpPr>
+          <p:nvPr/>
+        </p:nvSpPr>
+        <p:spPr>
+          <a:xfrm>
+            <a:off x="457196" y="925405"/>
+            <a:ext cx="8229601" cy="1618263"/>
+          </a:xfrm>
+          <a:prstGeom prst="rect">
+            <a:avLst/>
+          </a:prstGeom>
+        </p:spPr>
+        <p:txBody>
+          <a:bodyPr vert="horz" lIns="91440" tIns="45720" rIns="91440" bIns="45720" rtlCol="0">
+            <a:normAutofit/>
+          </a:bodyPr>
+          <a:lstStyle>
+            <a:lvl1pPr marL="342900" indent="-342900" algn="l" defTabSz="457200" rtl="0" eaLnBrk="1" latinLnBrk="0" hangingPunct="1">
+              <a:spcBef>
+                <a:spcPct val="20000"/>
+              </a:spcBef>
+              <a:buSzPct val="100000"/>
+              <a:buFontTx/>
+              <a:buBlip>
+                <a:blip r:embed="rId2"/>
+              </a:buBlip>
+              <a:defRPr sz="2400" kern="1200">
+                <a:solidFill>
+                  <a:schemeClr val="tx1"/>
+                </a:solidFill>
+                <a:latin typeface="+mn-lt"/>
+                <a:ea typeface="+mn-ea"/>
+                <a:cs typeface="+mn-cs"/>
+              </a:defRPr>
+            </a:lvl1pPr>
+            <a:lvl2pPr marL="742950" indent="-285750" algn="l" defTabSz="457200" rtl="0" eaLnBrk="1" latinLnBrk="0" hangingPunct="1">
+              <a:spcBef>
+                <a:spcPct val="20000"/>
+              </a:spcBef>
+              <a:buFont typeface="Arial"/>
+              <a:buChar char="•"/>
+              <a:defRPr sz="2400" kern="1200">
+                <a:solidFill>
+                  <a:schemeClr val="tx1"/>
+                </a:solidFill>
+                <a:latin typeface="+mn-lt"/>
+                <a:ea typeface="+mn-ea"/>
+                <a:cs typeface="+mn-cs"/>
+              </a:defRPr>
+            </a:lvl2pPr>
+            <a:lvl3pPr marL="1143000" indent="-228600" algn="l" defTabSz="457200" rtl="0" eaLnBrk="1" latinLnBrk="0" hangingPunct="1">
+              <a:spcBef>
+                <a:spcPct val="20000"/>
+              </a:spcBef>
+              <a:buFont typeface="Arial"/>
+              <a:buChar char="•"/>
+              <a:defRPr sz="2000" kern="1200">
+                <a:solidFill>
+                  <a:schemeClr val="tx1"/>
+                </a:solidFill>
+                <a:latin typeface="+mn-lt"/>
+                <a:ea typeface="+mn-ea"/>
+                <a:cs typeface="+mn-cs"/>
+              </a:defRPr>
+            </a:lvl3pPr>
+            <a:lvl4pPr marL="1600200" indent="-228600" algn="l" defTabSz="457200" rtl="0" eaLnBrk="1" latinLnBrk="0" hangingPunct="1">
+              <a:spcBef>
+                <a:spcPct val="20000"/>
+              </a:spcBef>
+              <a:buFont typeface="Arial"/>
+              <a:buChar char="•"/>
+              <a:defRPr sz="1800" kern="1200">
+                <a:solidFill>
+                  <a:schemeClr val="tx1"/>
+                </a:solidFill>
+                <a:latin typeface="+mn-lt"/>
+                <a:ea typeface="+mn-ea"/>
+                <a:cs typeface="+mn-cs"/>
+              </a:defRPr>
+            </a:lvl4pPr>
+            <a:lvl5pPr marL="2057400" indent="-228600" algn="l" defTabSz="457200" rtl="0" eaLnBrk="1" latinLnBrk="0" hangingPunct="1">
+              <a:spcBef>
+                <a:spcPct val="20000"/>
+              </a:spcBef>
+              <a:buFont typeface="Arial"/>
+              <a:buChar char="•"/>
+              <a:defRPr sz="1800" kern="1200">
+                <a:solidFill>
+                  <a:schemeClr val="tx1"/>
+                </a:solidFill>
+                <a:latin typeface="+mn-lt"/>
+                <a:ea typeface="+mn-ea"/>
+                <a:cs typeface="+mn-cs"/>
+              </a:defRPr>
+            </a:lvl5pPr>
+            <a:lvl6pPr marL="2514600" indent="-228600" algn="l" defTabSz="457200" rtl="0" eaLnBrk="1" latinLnBrk="0" hangingPunct="1">
+              <a:spcBef>
+                <a:spcPct val="20000"/>
+              </a:spcBef>
+              <a:buFont typeface="Arial"/>
+              <a:buChar char="•"/>
+              <a:defRPr sz="1800" kern="1200">
+                <a:solidFill>
+                  <a:schemeClr val="tx1"/>
+                </a:solidFill>
+                <a:latin typeface="+mn-lt"/>
+                <a:ea typeface="+mn-ea"/>
+                <a:cs typeface="+mn-cs"/>
+              </a:defRPr>
+            </a:lvl6pPr>
+            <a:lvl7pPr marL="2971800" indent="-228600" algn="l" defTabSz="457200" rtl="0" eaLnBrk="1" latinLnBrk="0" hangingPunct="1">
+              <a:spcBef>
+                <a:spcPct val="20000"/>
+              </a:spcBef>
+              <a:buFont typeface="Arial"/>
+              <a:buChar char="•"/>
+              <a:defRPr sz="1800" kern="1200">
+                <a:solidFill>
+                  <a:schemeClr val="tx1"/>
+                </a:solidFill>
+                <a:latin typeface="+mn-lt"/>
+                <a:ea typeface="+mn-ea"/>
+                <a:cs typeface="+mn-cs"/>
+              </a:defRPr>
+            </a:lvl7pPr>
+            <a:lvl8pPr marL="3429000" indent="-228600" algn="l" defTabSz="457200" rtl="0" eaLnBrk="1" latinLnBrk="0" hangingPunct="1">
+              <a:spcBef>
+                <a:spcPct val="20000"/>
+              </a:spcBef>
+              <a:buFont typeface="Arial"/>
+              <a:buChar char="•"/>
+              <a:defRPr sz="1800" kern="1200">
+                <a:solidFill>
+                  <a:schemeClr val="tx1"/>
+                </a:solidFill>
+                <a:latin typeface="+mn-lt"/>
+                <a:ea typeface="+mn-ea"/>
+                <a:cs typeface="+mn-cs"/>
+              </a:defRPr>
+            </a:lvl8pPr>
+            <a:lvl9pPr marL="3886200" indent="-228600" algn="l" defTabSz="457200" rtl="0" eaLnBrk="1" latinLnBrk="0" hangingPunct="1">
+              <a:spcBef>
+                <a:spcPct val="20000"/>
+              </a:spcBef>
+              <a:buFont typeface="Arial"/>
+              <a:buChar char="•"/>
+              <a:defRPr sz="1800" kern="1200">
+                <a:solidFill>
+                  <a:schemeClr val="tx1"/>
+                </a:solidFill>
+                <a:latin typeface="+mn-lt"/>
+                <a:ea typeface="+mn-ea"/>
+                <a:cs typeface="+mn-cs"/>
+              </a:defRPr>
+            </a:lvl9pPr>
+          </a:lstStyle>
+          <a:p>
+            <a:pPr marL="0" indent="0" algn="just">
+              <a:spcBef>
+                <a:spcPts val="0"/>
+              </a:spcBef>
+              <a:buFontTx/>
+              <a:buNone/>
+            </a:pPr>
+            <a:r>
+              <a:rPr lang="en-US" dirty="0" smtClean="0"/>
+              <a:t>The network of publications in the </a:t>
+            </a:r>
+            <a:r>
+              <a:rPr lang="en-US" dirty="0" err="1" smtClean="0"/>
+              <a:t>arXiv's</a:t>
+            </a:r>
+            <a:r>
+              <a:rPr lang="en-US" dirty="0" smtClean="0"/>
+              <a:t> High Energy Physics Phenomenology (</a:t>
+            </a:r>
+            <a:r>
+              <a:rPr lang="en-US" dirty="0" err="1" smtClean="0"/>
+              <a:t>hep-ph</a:t>
+            </a:r>
+            <a:r>
+              <a:rPr lang="en-US" dirty="0" smtClean="0"/>
+              <a:t>) section. The directed links that connect the publications are citations. Some publications cite themselves, and therefore the network contains loops.</a:t>
+            </a:r>
+            <a:endParaRPr lang="en-US" dirty="0"/>
+          </a:p>
+        </p:txBody>
+      </p:sp>
+      <p:sp>
+        <p:nvSpPr>
+          <p:cNvPr id="5" name="Title 1"/>
+          <p:cNvSpPr txBox="1">
+            <a:spLocks/>
+          </p:cNvSpPr>
+          <p:nvPr/>
+        </p:nvSpPr>
+        <p:spPr>
+          <a:xfrm>
+            <a:off x="457200" y="128595"/>
+            <a:ext cx="6273934" cy="620483"/>
+          </a:xfrm>
+          <a:prstGeom prst="rect">
+            <a:avLst/>
+          </a:prstGeom>
+        </p:spPr>
+        <p:txBody>
+          <a:bodyPr vert="horz" lIns="91440" tIns="45720" rIns="91440" bIns="45720" rtlCol="0" anchor="ctr">
+            <a:normAutofit/>
+          </a:bodyPr>
+          <a:lstStyle>
+            <a:lvl1pPr algn="l" defTabSz="457200" rtl="0" eaLnBrk="1" latinLnBrk="0" hangingPunct="1">
+              <a:spcBef>
+                <a:spcPct val="0"/>
+              </a:spcBef>
+              <a:buNone/>
+              <a:defRPr sz="3200" b="1" i="0" kern="1200" baseline="0">
+                <a:solidFill>
+                  <a:schemeClr val="tx1"/>
+                </a:solidFill>
+                <a:latin typeface="+mj-lt"/>
+                <a:ea typeface="+mj-ea"/>
+                <a:cs typeface="+mj-cs"/>
+              </a:defRPr>
+            </a:lvl1pPr>
+          </a:lstStyle>
+          <a:p>
+            <a:r>
+              <a:rPr lang="en-US" dirty="0" smtClean="0"/>
+              <a:t>Short Description</a:t>
+            </a:r>
+            <a:endParaRPr lang="ru-RU" dirty="0"/>
+          </a:p>
+        </p:txBody>
+      </p:sp>
+    </p:spTree>
+    <p:extLst>
+      <p:ext uri="{BB962C8B-B14F-4D97-AF65-F5344CB8AC3E}">
+        <p14:creationId xmlns:p14="http://schemas.microsoft.com/office/powerpoint/2010/main" val="238712034"/>
+      </p:ext>
+    </p:extLst>
+  </p:cSld>
+  <p:clrMapOvr>
+    <a:masterClrMapping/>
+  </p:clrMapOvr>
+  <p:timing>
+    <p:tnLst>
+      <p:par>
+        <p:cTn id="1" dur="indefinite" restart="never" nodeType="tmRoot"/>
+      </p:par>
+    </p:tnLst>
+  </p:timing>
+</p:sld>
+</file>
+
+<file path=ppt/slides/slide3.xml><?xml version="1.0" encoding="utf-8"?>
+<p:sld xmlns:a="http://schemas.openxmlformats.org/drawingml/2006/main" xmlns:r="http://schemas.openxmlformats.org/officeDocument/2006/relationships" xmlns:p="http://schemas.openxmlformats.org/presentationml/2006/main">
+  <p:cSld>
+    <p:bg>
+      <p:bgPr>
+        <a:solidFill>
+          <a:schemeClr val="bg1"/>
+        </a:solidFill>
+        <a:effectLst/>
+      </p:bgPr>
+    </p:bg>
+    <p:spTree>
+      <p:nvGrpSpPr>
+        <p:cNvPr id="1" name=""/>
+        <p:cNvGrpSpPr/>
+        <p:nvPr/>
+      </p:nvGrpSpPr>
+      <p:grpSpPr>
+        <a:xfrm>
+          <a:off x="0" y="0"/>
+          <a:ext cx="0" cy="0"/>
+          <a:chOff x="0" y="0"/>
+          <a:chExt cx="0" cy="0"/>
+        </a:xfrm>
+      </p:grpSpPr>
+      <p:pic>
+        <p:nvPicPr>
+          <p:cNvPr id="3" name="Picture 2"/>
+          <p:cNvPicPr>
+            <a:picLocks noChangeAspect="1"/>
+          </p:cNvPicPr>
+          <p:nvPr/>
+        </p:nvPicPr>
+        <p:blipFill>
+          <a:blip r:embed="rId2">
+            <a:extLst>
+              <a:ext uri="{28A0092B-C50C-407E-A947-70E740481C1C}">
+                <a14:useLocalDpi xmlns:a14="http://schemas.microsoft.com/office/drawing/2010/main" val="0"/>
+              </a:ext>
+            </a:extLst>
+          </a:blip>
+          <a:stretch>
+            <a:fillRect/>
+          </a:stretch>
+        </p:blipFill>
+        <p:spPr>
+          <a:xfrm>
+            <a:off x="0" y="559953"/>
+            <a:ext cx="4572000" cy="4572000"/>
+          </a:xfrm>
+          <a:prstGeom prst="rect">
+            <a:avLst/>
+          </a:prstGeom>
+        </p:spPr>
+      </p:pic>
+      <p:pic>
+        <p:nvPicPr>
+          <p:cNvPr id="4" name="Picture 3"/>
+          <p:cNvPicPr>
+            <a:picLocks noChangeAspect="1"/>
+          </p:cNvPicPr>
+          <p:nvPr/>
+        </p:nvPicPr>
+        <p:blipFill>
+          <a:blip r:embed="rId3">
+            <a:extLst>
+              <a:ext uri="{28A0092B-C50C-407E-A947-70E740481C1C}">
+                <a14:useLocalDpi xmlns:a14="http://schemas.microsoft.com/office/drawing/2010/main" val="0"/>
+              </a:ext>
+            </a:extLst>
+          </a:blip>
+          <a:stretch>
+            <a:fillRect/>
+          </a:stretch>
+        </p:blipFill>
+        <p:spPr>
+          <a:xfrm>
+            <a:off x="4572000" y="559953"/>
+            <a:ext cx="4572000" cy="4572000"/>
+          </a:xfrm>
+          <a:prstGeom prst="rect">
+            <a:avLst/>
+          </a:prstGeom>
+        </p:spPr>
+      </p:pic>
+      <p:sp>
+        <p:nvSpPr>
+          <p:cNvPr id="5" name="Title 1"/>
+          <p:cNvSpPr txBox="1">
+            <a:spLocks/>
+          </p:cNvSpPr>
+          <p:nvPr/>
+        </p:nvSpPr>
+        <p:spPr>
+          <a:xfrm>
+            <a:off x="1295400" y="100749"/>
+            <a:ext cx="1981200" cy="538155"/>
+          </a:xfrm>
+          <a:prstGeom prst="rect">
+            <a:avLst/>
+          </a:prstGeom>
+        </p:spPr>
+        <p:txBody>
+          <a:bodyPr vert="horz" lIns="91440" tIns="45720" rIns="91440" bIns="45720" rtlCol="0" anchor="ctr">
+            <a:normAutofit lnSpcReduction="10000"/>
+          </a:bodyPr>
+          <a:lstStyle>
+            <a:lvl1pPr algn="l" defTabSz="457200" rtl="0" eaLnBrk="1" latinLnBrk="0" hangingPunct="1">
+              <a:spcBef>
+                <a:spcPct val="0"/>
+              </a:spcBef>
+              <a:buNone/>
+              <a:defRPr sz="3200" b="1" i="0" kern="1200" baseline="0">
+                <a:solidFill>
+                  <a:schemeClr val="tx1"/>
+                </a:solidFill>
+                <a:latin typeface="+mj-lt"/>
+                <a:ea typeface="+mj-ea"/>
+                <a:cs typeface="+mj-cs"/>
+              </a:defRPr>
+            </a:lvl1pPr>
+          </a:lstStyle>
+          <a:p>
+            <a:r>
+              <a:rPr lang="en-US" dirty="0" smtClean="0"/>
+              <a:t>In-degree</a:t>
+            </a:r>
+            <a:endParaRPr lang="ru-RU" dirty="0"/>
+          </a:p>
+        </p:txBody>
+      </p:sp>
+      <p:sp>
+        <p:nvSpPr>
+          <p:cNvPr id="6" name="Title 1"/>
+          <p:cNvSpPr txBox="1">
+            <a:spLocks/>
+          </p:cNvSpPr>
+          <p:nvPr/>
+        </p:nvSpPr>
+        <p:spPr>
+          <a:xfrm>
+            <a:off x="5778500" y="48340"/>
+            <a:ext cx="2159000" cy="642971"/>
+          </a:xfrm>
+          <a:prstGeom prst="rect">
+            <a:avLst/>
+          </a:prstGeom>
+        </p:spPr>
+        <p:txBody>
+          <a:bodyPr vert="horz" lIns="91440" tIns="45720" rIns="91440" bIns="45720" rtlCol="0" anchor="ctr">
+            <a:normAutofit/>
+          </a:bodyPr>
+          <a:lstStyle>
+            <a:lvl1pPr algn="l" defTabSz="457200" rtl="0" eaLnBrk="1" latinLnBrk="0" hangingPunct="1">
+              <a:spcBef>
+                <a:spcPct val="0"/>
+              </a:spcBef>
+              <a:buNone/>
+              <a:defRPr sz="3200" b="1" i="0" kern="1200" baseline="0">
+                <a:solidFill>
+                  <a:schemeClr val="tx1"/>
+                </a:solidFill>
+                <a:latin typeface="+mj-lt"/>
+                <a:ea typeface="+mj-ea"/>
+                <a:cs typeface="+mj-cs"/>
+              </a:defRPr>
+            </a:lvl1pPr>
+          </a:lstStyle>
+          <a:p>
+            <a:r>
+              <a:rPr lang="en-US" dirty="0" smtClean="0"/>
+              <a:t>Out-degree</a:t>
+            </a:r>
+            <a:endParaRPr lang="ru-RU" dirty="0"/>
+          </a:p>
+        </p:txBody>
+      </p:sp>
+    </p:spTree>
+    <p:extLst>
+      <p:ext uri="{BB962C8B-B14F-4D97-AF65-F5344CB8AC3E}">
+        <p14:creationId xmlns:p14="http://schemas.microsoft.com/office/powerpoint/2010/main" val="2247482143"/>
+      </p:ext>
+    </p:extLst>
+  </p:cSld>
+  <p:clrMapOvr>
+    <a:masterClrMapping/>
+  </p:clrMapOvr>
+</p:sld>
+</file>
+
+<file path=ppt/slides/slide4.xml><?xml version="1.0" encoding="utf-8"?>
+<p:sld xmlns:a="http://schemas.openxmlformats.org/drawingml/2006/main" xmlns:r="http://schemas.openxmlformats.org/officeDocument/2006/relationships" xmlns:p="http://schemas.openxmlformats.org/presentationml/2006/main">
+  <p:cSld>
+    <p:bg>
+      <p:bgPr>
+        <a:solidFill>
+          <a:schemeClr val="bg1"/>
+        </a:solidFill>
+        <a:effectLst/>
+      </p:bgPr>
+    </p:bg>
+    <p:spTree>
+      <p:nvGrpSpPr>
+        <p:cNvPr id="1" name=""/>
+        <p:cNvGrpSpPr/>
+        <p:nvPr/>
+      </p:nvGrpSpPr>
+      <p:grpSpPr>
+        <a:xfrm>
+          <a:off x="0" y="0"/>
+          <a:ext cx="0" cy="0"/>
+          <a:chOff x="0" y="0"/>
+          <a:chExt cx="0" cy="0"/>
+        </a:xfrm>
+      </p:grpSpPr>
+      <p:sp>
+        <p:nvSpPr>
+          <p:cNvPr id="2" name="Название 1"/>
+          <p:cNvSpPr>
+            <a:spLocks noGrp="1"/>
+          </p:cNvSpPr>
+          <p:nvPr>
+            <p:ph type="title"/>
+          </p:nvPr>
+        </p:nvSpPr>
+        <p:spPr/>
+        <p:txBody>
+          <a:bodyPr/>
+          <a:lstStyle/>
+          <a:p>
+            <a:endParaRPr lang="ru-RU"/>
+          </a:p>
+        </p:txBody>
+      </p:sp>
+      <p:pic>
+        <p:nvPicPr>
+          <p:cNvPr id="4" name="Content Placeholder 3"/>
+          <p:cNvPicPr>
+            <a:picLocks noGrp="1" noChangeAspect="1"/>
+          </p:cNvPicPr>
+          <p:nvPr>
+            <p:ph sz="half" idx="1"/>
+          </p:nvPr>
+        </p:nvPicPr>
+        <p:blipFill>
+          <a:blip r:embed="rId2">
+            <a:extLst>
+              <a:ext uri="{28A0092B-C50C-407E-A947-70E740481C1C}">
+                <a14:useLocalDpi xmlns:a14="http://schemas.microsoft.com/office/drawing/2010/main" val="0"/>
+              </a:ext>
+            </a:extLst>
+          </a:blip>
+          <a:stretch>
+            <a:fillRect/>
+          </a:stretch>
+        </p:blipFill>
+        <p:spPr>
+          <a:xfrm>
+            <a:off x="5255" y="927381"/>
+            <a:ext cx="4566807" cy="3425105"/>
+          </a:xfrm>
+        </p:spPr>
+      </p:pic>
+      <p:pic>
+        <p:nvPicPr>
+          <p:cNvPr id="5" name="Picture 4"/>
+          <p:cNvPicPr>
+            <a:picLocks noChangeAspect="1"/>
+          </p:cNvPicPr>
+          <p:nvPr/>
+        </p:nvPicPr>
+        <p:blipFill>
+          <a:blip r:embed="rId3">
+            <a:extLst>
+              <a:ext uri="{28A0092B-C50C-407E-A947-70E740481C1C}">
+                <a14:useLocalDpi xmlns:a14="http://schemas.microsoft.com/office/drawing/2010/main" val="0"/>
+              </a:ext>
+            </a:extLst>
+          </a:blip>
+          <a:stretch>
+            <a:fillRect/>
+          </a:stretch>
+        </p:blipFill>
+        <p:spPr>
+          <a:xfrm>
+            <a:off x="4572062" y="958911"/>
+            <a:ext cx="4566808" cy="3425105"/>
+          </a:xfrm>
+          <a:prstGeom prst="rect">
+            <a:avLst/>
+          </a:prstGeom>
+        </p:spPr>
+      </p:pic>
+      <p:sp>
+        <p:nvSpPr>
+          <p:cNvPr id="7" name="Title 1"/>
+          <p:cNvSpPr txBox="1">
+            <a:spLocks/>
+          </p:cNvSpPr>
+          <p:nvPr/>
+        </p:nvSpPr>
+        <p:spPr>
+          <a:xfrm>
+            <a:off x="457200" y="97064"/>
+            <a:ext cx="6273934" cy="620483"/>
+          </a:xfrm>
+          <a:prstGeom prst="rect">
+            <a:avLst/>
+          </a:prstGeom>
+        </p:spPr>
+        <p:txBody>
+          <a:bodyPr vert="horz" lIns="91440" tIns="45720" rIns="91440" bIns="45720" rtlCol="0" anchor="ctr">
+            <a:normAutofit/>
+          </a:bodyPr>
+          <a:lstStyle>
+            <a:lvl1pPr algn="l" defTabSz="457200" rtl="0" eaLnBrk="1" latinLnBrk="0" hangingPunct="1">
+              <a:spcBef>
+                <a:spcPct val="0"/>
+              </a:spcBef>
+              <a:buNone/>
+              <a:defRPr sz="3200" b="1" i="0" kern="1200" baseline="0">
+                <a:solidFill>
+                  <a:schemeClr val="tx1"/>
+                </a:solidFill>
+                <a:latin typeface="+mj-lt"/>
+                <a:ea typeface="+mj-ea"/>
+                <a:cs typeface="+mj-cs"/>
+              </a:defRPr>
+            </a:lvl1pPr>
+          </a:lstStyle>
+          <a:p>
+            <a:r>
+              <a:rPr lang="en-US" dirty="0" smtClean="0"/>
+              <a:t>Degree Distributions</a:t>
+            </a:r>
+            <a:endParaRPr lang="ru-RU" dirty="0"/>
+          </a:p>
+        </p:txBody>
+      </p:sp>
+      <p:sp>
+        <p:nvSpPr>
+          <p:cNvPr id="3" name="TextBox 2"/>
+          <p:cNvSpPr txBox="1"/>
+          <p:nvPr/>
+        </p:nvSpPr>
+        <p:spPr>
+          <a:xfrm flipH="1">
+            <a:off x="203900" y="4530787"/>
+            <a:ext cx="5145340" cy="369332"/>
+          </a:xfrm>
+          <a:prstGeom prst="rect">
+            <a:avLst/>
+          </a:prstGeom>
+          <a:noFill/>
+        </p:spPr>
+        <p:txBody>
+          <a:bodyPr wrap="square" rtlCol="0">
+            <a:spAutoFit/>
+          </a:bodyPr>
+          <a:lstStyle/>
+          <a:p>
+            <a:r>
+              <a:rPr lang="en-US" dirty="0" smtClean="0"/>
+              <a:t>Average degree: </a:t>
+            </a:r>
+            <a:r>
+              <a:rPr lang="en-US" dirty="0" err="1" smtClean="0"/>
+              <a:t>Gephi</a:t>
+            </a:r>
+            <a:r>
+              <a:rPr lang="en-US" dirty="0" smtClean="0"/>
+              <a:t> (12.203)</a:t>
+            </a:r>
+            <a:endParaRPr lang="ru-RU" dirty="0"/>
+          </a:p>
+        </p:txBody>
+      </p:sp>
+    </p:spTree>
+    <p:extLst>
+      <p:ext uri="{BB962C8B-B14F-4D97-AF65-F5344CB8AC3E}">
+        <p14:creationId xmlns:p14="http://schemas.microsoft.com/office/powerpoint/2010/main" val="191886464"/>
+      </p:ext>
+    </p:extLst>
+  </p:cSld>
+  <p:clrMapOvr>
+    <a:masterClrMapping/>
+  </p:clrMapOvr>
+  <p:timing>
+    <p:tnLst>
+      <p:par>
+        <p:cTn id="1" dur="indefinite" restart="never" nodeType="tmRoot"/>
+      </p:par>
+    </p:tnLst>
+  </p:timing>
+</p:sld>
+</file>
+
+<file path=ppt/slides/slide5.xml><?xml version="1.0" encoding="utf-8"?>
+<p:sld xmlns:a="http://schemas.openxmlformats.org/drawingml/2006/main" xmlns:r="http://schemas.openxmlformats.org/officeDocument/2006/relationships" xmlns:p="http://schemas.openxmlformats.org/presentationml/2006/main">
+  <p:cSld>
+    <p:bg>
+      <p:bgPr>
+        <a:solidFill>
+          <a:schemeClr val="bg1"/>
+        </a:solidFill>
+        <a:effectLst/>
+      </p:bgPr>
+    </p:bg>
+    <p:spTree>
+      <p:nvGrpSpPr>
+        <p:cNvPr id="1" name=""/>
+        <p:cNvGrpSpPr/>
+        <p:nvPr/>
+      </p:nvGrpSpPr>
+      <p:grpSpPr>
+        <a:xfrm>
+          <a:off x="0" y="0"/>
+          <a:ext cx="0" cy="0"/>
+          <a:chOff x="0" y="0"/>
+          <a:chExt cx="0" cy="0"/>
+        </a:xfrm>
+      </p:grpSpPr>
+      <p:sp>
+        <p:nvSpPr>
+          <p:cNvPr id="3" name="Title 1"/>
+          <p:cNvSpPr txBox="1">
+            <a:spLocks/>
+          </p:cNvSpPr>
+          <p:nvPr/>
+        </p:nvSpPr>
+        <p:spPr>
+          <a:xfrm>
+            <a:off x="457200" y="97064"/>
+            <a:ext cx="6273934" cy="620483"/>
+          </a:xfrm>
+          <a:prstGeom prst="rect">
+            <a:avLst/>
+          </a:prstGeom>
+        </p:spPr>
+        <p:txBody>
+          <a:bodyPr vert="horz" lIns="91440" tIns="45720" rIns="91440" bIns="45720" rtlCol="0" anchor="ctr">
+            <a:normAutofit/>
+          </a:bodyPr>
+          <a:lstStyle>
+            <a:lvl1pPr algn="l" defTabSz="457200" rtl="0" eaLnBrk="1" latinLnBrk="0" hangingPunct="1">
+              <a:spcBef>
+                <a:spcPct val="0"/>
+              </a:spcBef>
+              <a:buNone/>
+              <a:defRPr sz="3200" b="1" i="0" kern="1200" baseline="0">
+                <a:solidFill>
+                  <a:schemeClr val="tx1"/>
+                </a:solidFill>
+                <a:latin typeface="+mj-lt"/>
+                <a:ea typeface="+mj-ea"/>
+                <a:cs typeface="+mj-cs"/>
+              </a:defRPr>
+            </a:lvl1pPr>
+          </a:lstStyle>
+          <a:p>
+            <a:r>
+              <a:rPr lang="en-US" dirty="0" smtClean="0"/>
+              <a:t>Filtering</a:t>
+            </a:r>
+            <a:r>
+              <a:rPr lang="en-US" dirty="0" smtClean="0"/>
+              <a:t> the giant component</a:t>
+            </a:r>
+            <a:endParaRPr lang="ru-RU" dirty="0"/>
+          </a:p>
+        </p:txBody>
+      </p:sp>
+      <p:sp>
+        <p:nvSpPr>
+          <p:cNvPr id="4" name="Content Placeholder 2"/>
+          <p:cNvSpPr txBox="1">
+            <a:spLocks/>
+          </p:cNvSpPr>
+          <p:nvPr/>
+        </p:nvSpPr>
+        <p:spPr>
+          <a:xfrm>
+            <a:off x="457196" y="925405"/>
+            <a:ext cx="8229601" cy="1618263"/>
+          </a:xfrm>
+          <a:prstGeom prst="rect">
+            <a:avLst/>
+          </a:prstGeom>
+        </p:spPr>
+        <p:txBody>
+          <a:bodyPr vert="horz" lIns="91440" tIns="45720" rIns="91440" bIns="45720" rtlCol="0">
+            <a:normAutofit/>
+          </a:bodyPr>
+          <a:lstStyle>
+            <a:lvl1pPr marL="342900" indent="-342900" algn="l" defTabSz="457200" rtl="0" eaLnBrk="1" latinLnBrk="0" hangingPunct="1">
+              <a:spcBef>
+                <a:spcPct val="20000"/>
+              </a:spcBef>
+              <a:buSzPct val="100000"/>
+              <a:buFontTx/>
+              <a:buBlip>
+                <a:blip r:embed="rId2"/>
+              </a:buBlip>
+              <a:defRPr sz="2400" kern="1200">
+                <a:solidFill>
+                  <a:schemeClr val="tx1"/>
+                </a:solidFill>
+                <a:latin typeface="+mn-lt"/>
+                <a:ea typeface="+mn-ea"/>
+                <a:cs typeface="+mn-cs"/>
+              </a:defRPr>
+            </a:lvl1pPr>
+            <a:lvl2pPr marL="742950" indent="-285750" algn="l" defTabSz="457200" rtl="0" eaLnBrk="1" latinLnBrk="0" hangingPunct="1">
+              <a:spcBef>
+                <a:spcPct val="20000"/>
+              </a:spcBef>
+              <a:buFont typeface="Arial"/>
+              <a:buChar char="•"/>
+              <a:defRPr sz="2400" kern="1200">
+                <a:solidFill>
+                  <a:schemeClr val="tx1"/>
+                </a:solidFill>
+                <a:latin typeface="+mn-lt"/>
+                <a:ea typeface="+mn-ea"/>
+                <a:cs typeface="+mn-cs"/>
+              </a:defRPr>
+            </a:lvl2pPr>
+            <a:lvl3pPr marL="1143000" indent="-228600" algn="l" defTabSz="457200" rtl="0" eaLnBrk="1" latinLnBrk="0" hangingPunct="1">
+              <a:spcBef>
+                <a:spcPct val="20000"/>
+              </a:spcBef>
+              <a:buFont typeface="Arial"/>
+              <a:buChar char="•"/>
+              <a:defRPr sz="2000" kern="1200">
+                <a:solidFill>
+                  <a:schemeClr val="tx1"/>
+                </a:solidFill>
+                <a:latin typeface="+mn-lt"/>
+                <a:ea typeface="+mn-ea"/>
+                <a:cs typeface="+mn-cs"/>
+              </a:defRPr>
+            </a:lvl3pPr>
+            <a:lvl4pPr marL="1600200" indent="-228600" algn="l" defTabSz="457200" rtl="0" eaLnBrk="1" latinLnBrk="0" hangingPunct="1">
+              <a:spcBef>
+                <a:spcPct val="20000"/>
+              </a:spcBef>
+              <a:buFont typeface="Arial"/>
+              <a:buChar char="•"/>
+              <a:defRPr sz="1800" kern="1200">
+                <a:solidFill>
+                  <a:schemeClr val="tx1"/>
+                </a:solidFill>
+                <a:latin typeface="+mn-lt"/>
+                <a:ea typeface="+mn-ea"/>
+                <a:cs typeface="+mn-cs"/>
+              </a:defRPr>
+            </a:lvl4pPr>
+            <a:lvl5pPr marL="2057400" indent="-228600" algn="l" defTabSz="457200" rtl="0" eaLnBrk="1" latinLnBrk="0" hangingPunct="1">
+              <a:spcBef>
+                <a:spcPct val="20000"/>
+              </a:spcBef>
+              <a:buFont typeface="Arial"/>
+              <a:buChar char="•"/>
+              <a:defRPr sz="1800" kern="1200">
+                <a:solidFill>
+                  <a:schemeClr val="tx1"/>
+                </a:solidFill>
+                <a:latin typeface="+mn-lt"/>
+                <a:ea typeface="+mn-ea"/>
+                <a:cs typeface="+mn-cs"/>
+              </a:defRPr>
+            </a:lvl5pPr>
+            <a:lvl6pPr marL="2514600" indent="-228600" algn="l" defTabSz="457200" rtl="0" eaLnBrk="1" latinLnBrk="0" hangingPunct="1">
+              <a:spcBef>
+                <a:spcPct val="20000"/>
+              </a:spcBef>
+              <a:buFont typeface="Arial"/>
+              <a:buChar char="•"/>
+              <a:defRPr sz="1800" kern="1200">
+                <a:solidFill>
+                  <a:schemeClr val="tx1"/>
+                </a:solidFill>
+                <a:latin typeface="+mn-lt"/>
+                <a:ea typeface="+mn-ea"/>
+                <a:cs typeface="+mn-cs"/>
+              </a:defRPr>
+            </a:lvl6pPr>
+            <a:lvl7pPr marL="2971800" indent="-228600" algn="l" defTabSz="457200" rtl="0" eaLnBrk="1" latinLnBrk="0" hangingPunct="1">
+              <a:spcBef>
+                <a:spcPct val="20000"/>
+              </a:spcBef>
+              <a:buFont typeface="Arial"/>
+              <a:buChar char="•"/>
+              <a:defRPr sz="1800" kern="1200">
+                <a:solidFill>
+                  <a:schemeClr val="tx1"/>
+                </a:solidFill>
+                <a:latin typeface="+mn-lt"/>
+                <a:ea typeface="+mn-ea"/>
+                <a:cs typeface="+mn-cs"/>
+              </a:defRPr>
+            </a:lvl7pPr>
+            <a:lvl8pPr marL="3429000" indent="-228600" algn="l" defTabSz="457200" rtl="0" eaLnBrk="1" latinLnBrk="0" hangingPunct="1">
+              <a:spcBef>
+                <a:spcPct val="20000"/>
+              </a:spcBef>
+              <a:buFont typeface="Arial"/>
+              <a:buChar char="•"/>
+              <a:defRPr sz="1800" kern="1200">
+                <a:solidFill>
+                  <a:schemeClr val="tx1"/>
+                </a:solidFill>
+                <a:latin typeface="+mn-lt"/>
+                <a:ea typeface="+mn-ea"/>
+                <a:cs typeface="+mn-cs"/>
+              </a:defRPr>
+            </a:lvl8pPr>
+            <a:lvl9pPr marL="3886200" indent="-228600" algn="l" defTabSz="457200" rtl="0" eaLnBrk="1" latinLnBrk="0" hangingPunct="1">
+              <a:spcBef>
+                <a:spcPct val="20000"/>
+              </a:spcBef>
+              <a:buFont typeface="Arial"/>
+              <a:buChar char="•"/>
+              <a:defRPr sz="1800" kern="1200">
+                <a:solidFill>
+                  <a:schemeClr val="tx1"/>
+                </a:solidFill>
+                <a:latin typeface="+mn-lt"/>
+                <a:ea typeface="+mn-ea"/>
+                <a:cs typeface="+mn-cs"/>
+              </a:defRPr>
+            </a:lvl9pPr>
+          </a:lstStyle>
+          <a:p>
+            <a:pPr marL="0" indent="0" algn="just">
+              <a:spcBef>
+                <a:spcPts val="0"/>
+              </a:spcBef>
+              <a:buFontTx/>
+              <a:buNone/>
+            </a:pPr>
+            <a:r>
+              <a:rPr lang="en-US" dirty="0" smtClean="0"/>
+              <a:t>Significant reduce in amount of nodes and edges</a:t>
+            </a:r>
+            <a:r>
+              <a:rPr lang="en-US" dirty="0" smtClean="0"/>
+              <a:t>:</a:t>
+            </a:r>
+          </a:p>
+          <a:p>
+            <a:pPr marL="0" indent="0" algn="just">
+              <a:spcBef>
+                <a:spcPts val="0"/>
+              </a:spcBef>
+              <a:buFontTx/>
+              <a:buNone/>
+            </a:pPr>
+            <a:endParaRPr lang="en-US" dirty="0"/>
+          </a:p>
+          <a:p>
+            <a:pPr marL="0" indent="0" algn="just">
+              <a:spcBef>
+                <a:spcPts val="0"/>
+              </a:spcBef>
+              <a:buNone/>
+            </a:pPr>
+            <a:r>
+              <a:rPr lang="en-US" dirty="0" smtClean="0"/>
+              <a:t>Nodes</a:t>
+            </a:r>
+            <a:r>
+              <a:rPr lang="en-US" dirty="0"/>
+              <a:t>: </a:t>
+            </a:r>
+            <a:r>
+              <a:rPr lang="en-US" dirty="0" smtClean="0"/>
+              <a:t>34546 -&gt; </a:t>
+            </a:r>
+            <a:r>
+              <a:rPr lang="en-US" dirty="0"/>
+              <a:t>12711</a:t>
+            </a:r>
+            <a:endParaRPr lang="en-US" dirty="0" smtClean="0"/>
+          </a:p>
+          <a:p>
+            <a:pPr marL="0" indent="0" algn="just">
+              <a:spcBef>
+                <a:spcPts val="0"/>
+              </a:spcBef>
+              <a:buNone/>
+            </a:pPr>
+            <a:r>
+              <a:rPr lang="en-US" dirty="0" smtClean="0"/>
+              <a:t>Edges</a:t>
+            </a:r>
+            <a:r>
+              <a:rPr lang="en-US" dirty="0"/>
+              <a:t>: 421578 </a:t>
+            </a:r>
+            <a:r>
+              <a:rPr lang="en-US" dirty="0" smtClean="0"/>
+              <a:t>-&gt; 139981</a:t>
+            </a:r>
+            <a:endParaRPr lang="en-US" dirty="0"/>
+          </a:p>
+        </p:txBody>
+      </p:sp>
+      <p:sp>
+        <p:nvSpPr>
+          <p:cNvPr id="5" name="Content Placeholder 2"/>
+          <p:cNvSpPr txBox="1">
+            <a:spLocks/>
+          </p:cNvSpPr>
+          <p:nvPr/>
+        </p:nvSpPr>
+        <p:spPr>
+          <a:xfrm>
+            <a:off x="457200" y="4060371"/>
+            <a:ext cx="8229601" cy="627782"/>
+          </a:xfrm>
+          <a:prstGeom prst="rect">
+            <a:avLst/>
+          </a:prstGeom>
+        </p:spPr>
+        <p:txBody>
+          <a:bodyPr vert="horz" lIns="91440" tIns="45720" rIns="91440" bIns="45720" rtlCol="0">
+            <a:normAutofit/>
+          </a:bodyPr>
+          <a:lstStyle>
+            <a:lvl1pPr marL="342900" indent="-342900" algn="l" defTabSz="457200" rtl="0" eaLnBrk="1" latinLnBrk="0" hangingPunct="1">
+              <a:spcBef>
+                <a:spcPct val="20000"/>
+              </a:spcBef>
+              <a:buSzPct val="100000"/>
+              <a:buFontTx/>
+              <a:buBlip>
+                <a:blip r:embed="rId2"/>
+              </a:buBlip>
+              <a:defRPr sz="2400" kern="1200">
+                <a:solidFill>
+                  <a:schemeClr val="tx1"/>
+                </a:solidFill>
+                <a:latin typeface="+mn-lt"/>
+                <a:ea typeface="+mn-ea"/>
+                <a:cs typeface="+mn-cs"/>
+              </a:defRPr>
+            </a:lvl1pPr>
+            <a:lvl2pPr marL="742950" indent="-285750" algn="l" defTabSz="457200" rtl="0" eaLnBrk="1" latinLnBrk="0" hangingPunct="1">
+              <a:spcBef>
+                <a:spcPct val="20000"/>
+              </a:spcBef>
+              <a:buFont typeface="Arial"/>
+              <a:buChar char="•"/>
+              <a:defRPr sz="2400" kern="1200">
+                <a:solidFill>
+                  <a:schemeClr val="tx1"/>
+                </a:solidFill>
+                <a:latin typeface="+mn-lt"/>
+                <a:ea typeface="+mn-ea"/>
+                <a:cs typeface="+mn-cs"/>
+              </a:defRPr>
+            </a:lvl2pPr>
+            <a:lvl3pPr marL="1143000" indent="-228600" algn="l" defTabSz="457200" rtl="0" eaLnBrk="1" latinLnBrk="0" hangingPunct="1">
+              <a:spcBef>
+                <a:spcPct val="20000"/>
+              </a:spcBef>
+              <a:buFont typeface="Arial"/>
+              <a:buChar char="•"/>
+              <a:defRPr sz="2000" kern="1200">
+                <a:solidFill>
+                  <a:schemeClr val="tx1"/>
+                </a:solidFill>
+                <a:latin typeface="+mn-lt"/>
+                <a:ea typeface="+mn-ea"/>
+                <a:cs typeface="+mn-cs"/>
+              </a:defRPr>
+            </a:lvl3pPr>
+            <a:lvl4pPr marL="1600200" indent="-228600" algn="l" defTabSz="457200" rtl="0" eaLnBrk="1" latinLnBrk="0" hangingPunct="1">
+              <a:spcBef>
+                <a:spcPct val="20000"/>
+              </a:spcBef>
+              <a:buFont typeface="Arial"/>
+              <a:buChar char="•"/>
+              <a:defRPr sz="1800" kern="1200">
+                <a:solidFill>
+                  <a:schemeClr val="tx1"/>
+                </a:solidFill>
+                <a:latin typeface="+mn-lt"/>
+                <a:ea typeface="+mn-ea"/>
+                <a:cs typeface="+mn-cs"/>
+              </a:defRPr>
+            </a:lvl4pPr>
+            <a:lvl5pPr marL="2057400" indent="-228600" algn="l" defTabSz="457200" rtl="0" eaLnBrk="1" latinLnBrk="0" hangingPunct="1">
+              <a:spcBef>
+                <a:spcPct val="20000"/>
+              </a:spcBef>
+              <a:buFont typeface="Arial"/>
+              <a:buChar char="•"/>
+              <a:defRPr sz="1800" kern="1200">
+                <a:solidFill>
+                  <a:schemeClr val="tx1"/>
+                </a:solidFill>
+                <a:latin typeface="+mn-lt"/>
+                <a:ea typeface="+mn-ea"/>
+                <a:cs typeface="+mn-cs"/>
+              </a:defRPr>
+            </a:lvl5pPr>
+            <a:lvl6pPr marL="2514600" indent="-228600" algn="l" defTabSz="457200" rtl="0" eaLnBrk="1" latinLnBrk="0" hangingPunct="1">
+              <a:spcBef>
+                <a:spcPct val="20000"/>
+              </a:spcBef>
+              <a:buFont typeface="Arial"/>
+              <a:buChar char="•"/>
+              <a:defRPr sz="1800" kern="1200">
+                <a:solidFill>
+                  <a:schemeClr val="tx1"/>
+                </a:solidFill>
+                <a:latin typeface="+mn-lt"/>
+                <a:ea typeface="+mn-ea"/>
+                <a:cs typeface="+mn-cs"/>
+              </a:defRPr>
+            </a:lvl6pPr>
+            <a:lvl7pPr marL="2971800" indent="-228600" algn="l" defTabSz="457200" rtl="0" eaLnBrk="1" latinLnBrk="0" hangingPunct="1">
+              <a:spcBef>
+                <a:spcPct val="20000"/>
+              </a:spcBef>
+              <a:buFont typeface="Arial"/>
+              <a:buChar char="•"/>
+              <a:defRPr sz="1800" kern="1200">
+                <a:solidFill>
+                  <a:schemeClr val="tx1"/>
+                </a:solidFill>
+                <a:latin typeface="+mn-lt"/>
+                <a:ea typeface="+mn-ea"/>
+                <a:cs typeface="+mn-cs"/>
+              </a:defRPr>
+            </a:lvl7pPr>
+            <a:lvl8pPr marL="3429000" indent="-228600" algn="l" defTabSz="457200" rtl="0" eaLnBrk="1" latinLnBrk="0" hangingPunct="1">
+              <a:spcBef>
+                <a:spcPct val="20000"/>
+              </a:spcBef>
+              <a:buFont typeface="Arial"/>
+              <a:buChar char="•"/>
+              <a:defRPr sz="1800" kern="1200">
+                <a:solidFill>
+                  <a:schemeClr val="tx1"/>
+                </a:solidFill>
+                <a:latin typeface="+mn-lt"/>
+                <a:ea typeface="+mn-ea"/>
+                <a:cs typeface="+mn-cs"/>
+              </a:defRPr>
+            </a:lvl8pPr>
+            <a:lvl9pPr marL="3886200" indent="-228600" algn="l" defTabSz="457200" rtl="0" eaLnBrk="1" latinLnBrk="0" hangingPunct="1">
+              <a:spcBef>
+                <a:spcPct val="20000"/>
+              </a:spcBef>
+              <a:buFont typeface="Arial"/>
+              <a:buChar char="•"/>
+              <a:defRPr sz="1800" kern="1200">
+                <a:solidFill>
+                  <a:schemeClr val="tx1"/>
+                </a:solidFill>
+                <a:latin typeface="+mn-lt"/>
+                <a:ea typeface="+mn-ea"/>
+                <a:cs typeface="+mn-cs"/>
+              </a:defRPr>
+            </a:lvl9pPr>
+          </a:lstStyle>
+          <a:p>
+            <a:pPr marL="0" indent="0" algn="just">
+              <a:spcBef>
+                <a:spcPts val="0"/>
+              </a:spcBef>
+              <a:buFontTx/>
+              <a:buNone/>
+            </a:pPr>
+            <a:r>
+              <a:rPr lang="en-US" dirty="0" smtClean="0"/>
+              <a:t>TODO: Other components should be checked</a:t>
+            </a:r>
+            <a:endParaRPr lang="en-US" dirty="0"/>
+          </a:p>
+        </p:txBody>
+      </p:sp>
+    </p:spTree>
+    <p:extLst>
+      <p:ext uri="{BB962C8B-B14F-4D97-AF65-F5344CB8AC3E}">
+        <p14:creationId xmlns:p14="http://schemas.microsoft.com/office/powerpoint/2010/main" val="2008142909"/>
+      </p:ext>
+    </p:extLst>
+  </p:cSld>
+  <p:clrMapOvr>
+    <a:masterClrMapping/>
+  </p:clrMapOvr>
+</p:sld>
+</file>
+
+<file path=ppt/slides/slide6.xml><?xml version="1.0" encoding="utf-8"?>
+<p:sld xmlns:a="http://schemas.openxmlformats.org/drawingml/2006/main" xmlns:r="http://schemas.openxmlformats.org/officeDocument/2006/relationships" xmlns:p="http://schemas.openxmlformats.org/presentationml/2006/main">
+  <p:cSld>
+    <p:bg>
+      <p:bgPr>
+        <a:solidFill>
+          <a:schemeClr val="bg1"/>
+        </a:solidFill>
+        <a:effectLst/>
+      </p:bgPr>
+    </p:bg>
+    <p:spTree>
+      <p:nvGrpSpPr>
+        <p:cNvPr id="1" name=""/>
+        <p:cNvGrpSpPr/>
+        <p:nvPr/>
+      </p:nvGrpSpPr>
+      <p:grpSpPr>
+        <a:xfrm>
+          <a:off x="0" y="0"/>
+          <a:ext cx="0" cy="0"/>
+          <a:chOff x="0" y="0"/>
+          <a:chExt cx="0" cy="0"/>
+        </a:xfrm>
+      </p:grpSpPr>
+      <p:sp>
+        <p:nvSpPr>
+          <p:cNvPr id="2" name="Title 1"/>
+          <p:cNvSpPr>
+            <a:spLocks noGrp="1"/>
+          </p:cNvSpPr>
+          <p:nvPr>
+            <p:ph type="title"/>
+          </p:nvPr>
+        </p:nvSpPr>
+        <p:spPr>
+          <a:xfrm>
+            <a:off x="279400" y="306899"/>
+            <a:ext cx="6273934" cy="620483"/>
+          </a:xfrm>
+        </p:spPr>
+        <p:txBody>
+          <a:bodyPr/>
+          <a:lstStyle/>
+          <a:p>
+            <a:r>
+              <a:rPr lang="en-US" dirty="0" smtClean="0"/>
+              <a:t>Distances</a:t>
+            </a:r>
+            <a:endParaRPr lang="ru-RU" dirty="0"/>
+          </a:p>
+        </p:txBody>
+      </p:sp>
+      <p:pic>
+        <p:nvPicPr>
+          <p:cNvPr id="5" name="Picture 4"/>
+          <p:cNvPicPr>
+            <a:picLocks noChangeAspect="1"/>
+          </p:cNvPicPr>
+          <p:nvPr/>
+        </p:nvPicPr>
+        <p:blipFill>
+          <a:blip r:embed="rId2"/>
+          <a:stretch>
+            <a:fillRect/>
+          </a:stretch>
+        </p:blipFill>
+        <p:spPr>
+          <a:xfrm>
+            <a:off x="6786562" y="4226323"/>
+            <a:ext cx="2124075" cy="457200"/>
+          </a:xfrm>
+          <a:prstGeom prst="rect">
+            <a:avLst/>
+          </a:prstGeom>
+        </p:spPr>
+      </p:pic>
+      <p:pic>
+        <p:nvPicPr>
+          <p:cNvPr id="10" name="Content Placeholder 9"/>
+          <p:cNvPicPr>
+            <a:picLocks noGrp="1" noChangeAspect="1"/>
+          </p:cNvPicPr>
+          <p:nvPr>
+            <p:ph sz="half" idx="1"/>
+          </p:nvPr>
+        </p:nvPicPr>
+        <p:blipFill>
+          <a:blip r:embed="rId3">
+            <a:extLst>
+              <a:ext uri="{28A0092B-C50C-407E-A947-70E740481C1C}">
+                <a14:useLocalDpi xmlns:a14="http://schemas.microsoft.com/office/drawing/2010/main" val="0"/>
+              </a:ext>
+            </a:extLst>
+          </a:blip>
+          <a:stretch>
+            <a:fillRect/>
+          </a:stretch>
+        </p:blipFill>
+        <p:spPr>
+          <a:xfrm>
+            <a:off x="2641205" y="1085850"/>
+            <a:ext cx="3556529" cy="2847975"/>
+          </a:xfrm>
+        </p:spPr>
+      </p:pic>
+    </p:spTree>
+    <p:extLst>
+      <p:ext uri="{BB962C8B-B14F-4D97-AF65-F5344CB8AC3E}">
+        <p14:creationId xmlns:p14="http://schemas.microsoft.com/office/powerpoint/2010/main" val="3164072325"/>
+      </p:ext>
+    </p:extLst>
+  </p:cSld>
+  <p:clrMapOvr>
+    <a:masterClrMapping/>
+  </p:clrMapOvr>
+</p:sld>
+</file>
+
+<file path=ppt/slides/slide7.xml><?xml version="1.0" encoding="utf-8"?>
+<p:sld xmlns:a="http://schemas.openxmlformats.org/drawingml/2006/main" xmlns:r="http://schemas.openxmlformats.org/officeDocument/2006/relationships" xmlns:p="http://schemas.openxmlformats.org/presentationml/2006/main">
+  <p:cSld>
+    <p:bg>
+      <p:bgPr>
+        <a:solidFill>
+          <a:schemeClr val="bg1"/>
+        </a:solidFill>
+        <a:effectLst/>
+      </p:bgPr>
+    </p:bg>
+    <p:spTree>
+      <p:nvGrpSpPr>
+        <p:cNvPr id="1" name=""/>
+        <p:cNvGrpSpPr/>
+        <p:nvPr/>
+      </p:nvGrpSpPr>
+      <p:grpSpPr>
+        <a:xfrm>
+          <a:off x="0" y="0"/>
+          <a:ext cx="0" cy="0"/>
+          <a:chOff x="0" y="0"/>
+          <a:chExt cx="0" cy="0"/>
+        </a:xfrm>
+      </p:grpSpPr>
+      <p:pic>
+        <p:nvPicPr>
+          <p:cNvPr id="2" name="Picture 1"/>
+          <p:cNvPicPr>
+            <a:picLocks noChangeAspect="1"/>
+          </p:cNvPicPr>
+          <p:nvPr/>
+        </p:nvPicPr>
+        <p:blipFill>
+          <a:blip r:embed="rId2"/>
+          <a:stretch>
+            <a:fillRect/>
+          </a:stretch>
+        </p:blipFill>
+        <p:spPr>
+          <a:xfrm>
+            <a:off x="633412" y="4623027"/>
+            <a:ext cx="1781175" cy="142875"/>
+          </a:xfrm>
+          <a:prstGeom prst="rect">
+            <a:avLst/>
+          </a:prstGeom>
+        </p:spPr>
+      </p:pic>
+      <p:sp>
+        <p:nvSpPr>
+          <p:cNvPr id="3" name="Title 1"/>
+          <p:cNvSpPr txBox="1">
+            <a:spLocks/>
+          </p:cNvSpPr>
+          <p:nvPr/>
+        </p:nvSpPr>
+        <p:spPr>
+          <a:xfrm>
+            <a:off x="457200" y="128595"/>
+            <a:ext cx="6273934" cy="620483"/>
+          </a:xfrm>
+          <a:prstGeom prst="rect">
+            <a:avLst/>
+          </a:prstGeom>
+        </p:spPr>
+        <p:txBody>
+          <a:bodyPr vert="horz" lIns="91440" tIns="45720" rIns="91440" bIns="45720" rtlCol="0" anchor="ctr">
+            <a:normAutofit/>
+          </a:bodyPr>
+          <a:lstStyle>
+            <a:lvl1pPr algn="l" defTabSz="457200" rtl="0" eaLnBrk="1" latinLnBrk="0" hangingPunct="1">
+              <a:spcBef>
+                <a:spcPct val="0"/>
+              </a:spcBef>
+              <a:buNone/>
+              <a:defRPr sz="3200" b="1" i="0" kern="1200" baseline="0">
+                <a:solidFill>
+                  <a:schemeClr val="tx1"/>
+                </a:solidFill>
+                <a:latin typeface="+mj-lt"/>
+                <a:ea typeface="+mj-ea"/>
+                <a:cs typeface="+mj-cs"/>
+              </a:defRPr>
+            </a:lvl1pPr>
+          </a:lstStyle>
+          <a:p>
+            <a:r>
+              <a:rPr lang="en-US" dirty="0" smtClean="0"/>
+              <a:t>Clustering Coefficient Distribution</a:t>
+            </a:r>
+            <a:endParaRPr lang="ru-RU" dirty="0"/>
+          </a:p>
+        </p:txBody>
+      </p:sp>
+      <p:pic>
+        <p:nvPicPr>
+          <p:cNvPr id="4" name="Picture 3"/>
+          <p:cNvPicPr>
+            <a:picLocks noChangeAspect="1"/>
+          </p:cNvPicPr>
+          <p:nvPr/>
+        </p:nvPicPr>
+        <p:blipFill>
+          <a:blip r:embed="rId3">
+            <a:extLst>
+              <a:ext uri="{28A0092B-C50C-407E-A947-70E740481C1C}">
+                <a14:useLocalDpi xmlns:a14="http://schemas.microsoft.com/office/drawing/2010/main" val="0"/>
+              </a:ext>
+            </a:extLst>
+          </a:blip>
+          <a:stretch>
+            <a:fillRect/>
+          </a:stretch>
+        </p:blipFill>
+        <p:spPr>
+          <a:xfrm>
+            <a:off x="2300287" y="885361"/>
+            <a:ext cx="4545013" cy="3601382"/>
+          </a:xfrm>
+          <a:prstGeom prst="rect">
+            <a:avLst/>
+          </a:prstGeom>
+        </p:spPr>
+      </p:pic>
+    </p:spTree>
+    <p:extLst>
+      <p:ext uri="{BB962C8B-B14F-4D97-AF65-F5344CB8AC3E}">
+        <p14:creationId xmlns:p14="http://schemas.microsoft.com/office/powerpoint/2010/main" val="379777001"/>
+      </p:ext>
+    </p:extLst>
+  </p:cSld>
+  <p:clrMapOvr>
+    <a:masterClrMapping/>
+  </p:clrMapOvr>
+  <p:timing>
+    <p:tnLst>
+      <p:par>
+        <p:cTn id="1" dur="indefinite" restart="never" nodeType="tmRoot"/>
+      </p:par>
+    </p:tnLst>
+  </p:timing>
+</p:sld>
+</file>
+
+<file path=ppt/slides/slide8.xml><?xml version="1.0" encoding="utf-8"?>
+<p:sld xmlns:a="http://schemas.openxmlformats.org/drawingml/2006/main" xmlns:r="http://schemas.openxmlformats.org/officeDocument/2006/relationships" xmlns:p="http://schemas.openxmlformats.org/presentationml/2006/main">
+  <p:cSld>
+    <p:bg>
+      <p:bgPr>
+        <a:solidFill>
+          <a:schemeClr val="bg1"/>
+        </a:solidFill>
+        <a:effectLst/>
+      </p:bgPr>
+    </p:bg>
+    <p:spTree>
+      <p:nvGrpSpPr>
+        <p:cNvPr id="1" name=""/>
+        <p:cNvGrpSpPr/>
+        <p:nvPr/>
+      </p:nvGrpSpPr>
+      <p:grpSpPr>
+        <a:xfrm>
+          <a:off x="0" y="0"/>
+          <a:ext cx="0" cy="0"/>
+          <a:chOff x="0" y="0"/>
+          <a:chExt cx="0" cy="0"/>
+        </a:xfrm>
+      </p:grpSpPr>
+      <p:sp>
+        <p:nvSpPr>
+          <p:cNvPr id="2" name="Title 1"/>
+          <p:cNvSpPr>
+            <a:spLocks noGrp="1"/>
+          </p:cNvSpPr>
+          <p:nvPr>
+            <p:ph type="title"/>
+          </p:nvPr>
+        </p:nvSpPr>
+        <p:spPr>
+          <a:xfrm>
+            <a:off x="457200" y="306899"/>
+            <a:ext cx="7016262" cy="620483"/>
+          </a:xfrm>
+        </p:spPr>
+        <p:txBody>
+          <a:bodyPr>
+            <a:normAutofit/>
+          </a:bodyPr>
+          <a:lstStyle/>
+          <a:p>
+            <a:r>
+              <a:rPr lang="en-US" dirty="0" err="1" smtClean="0"/>
+              <a:t>Betweenness</a:t>
+            </a:r>
+            <a:r>
+              <a:rPr lang="en-US" dirty="0" smtClean="0"/>
+              <a:t> Centrality in log </a:t>
+            </a:r>
+            <a:r>
+              <a:rPr lang="en-US" dirty="0" err="1" smtClean="0"/>
+              <a:t>log</a:t>
+            </a:r>
+            <a:r>
+              <a:rPr lang="en-US" dirty="0" smtClean="0"/>
+              <a:t> scale</a:t>
+            </a:r>
+            <a:endParaRPr lang="ru-RU" dirty="0"/>
+          </a:p>
+        </p:txBody>
+      </p:sp>
+      <p:pic>
+        <p:nvPicPr>
+          <p:cNvPr id="4" name="Content Placeholder 3"/>
+          <p:cNvPicPr>
+            <a:picLocks noGrp="1" noChangeAspect="1"/>
+          </p:cNvPicPr>
+          <p:nvPr>
+            <p:ph sz="half" idx="1"/>
+          </p:nvPr>
+        </p:nvPicPr>
+        <p:blipFill>
+          <a:blip r:embed="rId2">
+            <a:extLst>
+              <a:ext uri="{28A0092B-C50C-407E-A947-70E740481C1C}">
+                <a14:useLocalDpi xmlns:a14="http://schemas.microsoft.com/office/drawing/2010/main" val="0"/>
+              </a:ext>
+            </a:extLst>
+          </a:blip>
+          <a:stretch>
+            <a:fillRect/>
+          </a:stretch>
+        </p:blipFill>
+        <p:spPr>
+          <a:xfrm>
+            <a:off x="224911" y="927382"/>
+            <a:ext cx="4195233" cy="3146425"/>
+          </a:xfrm>
+        </p:spPr>
+      </p:pic>
+      <mc:AlternateContent xmlns:mc="http://schemas.openxmlformats.org/markup-compatibility/2006" xmlns:a14="http://schemas.microsoft.com/office/drawing/2010/main">
+        <mc:Choice Requires="a14">
+          <p:sp>
+            <p:nvSpPr>
+              <p:cNvPr id="3" name="TextBox 2"/>
+              <p:cNvSpPr txBox="1"/>
+              <p:nvPr/>
+            </p:nvSpPr>
+            <p:spPr>
+              <a:xfrm>
+                <a:off x="457200" y="4554415"/>
+                <a:ext cx="7925888" cy="369332"/>
+              </a:xfrm>
+              <a:prstGeom prst="rect">
+                <a:avLst/>
+              </a:prstGeom>
+              <a:noFill/>
+            </p:spPr>
+            <p:txBody>
+              <a:bodyPr wrap="none" rtlCol="0">
+                <a:spAutoFit/>
+              </a:bodyPr>
+              <a:lstStyle/>
+              <a:p>
+                <a14:m>
+                  <m:oMath xmlns:m="http://schemas.openxmlformats.org/officeDocument/2006/math">
+                    <m:sSub>
+                      <m:sSubPr>
+                        <m:ctrlPr>
+                          <a:rPr lang="ru-RU" i="1" smtClean="0">
+                            <a:latin typeface="Cambria Math" panose="02040503050406030204" pitchFamily="18" charset="0"/>
+                          </a:rPr>
+                        </m:ctrlPr>
+                      </m:sSubPr>
+                      <m:e>
+                        <m:r>
+                          <a:rPr lang="ru-RU" b="0" i="1" smtClean="0">
+                            <a:latin typeface="Cambria Math" panose="02040503050406030204" pitchFamily="18" charset="0"/>
+                          </a:rPr>
+                          <m:t>С</m:t>
+                        </m:r>
+                      </m:e>
+                      <m:sub>
+                        <m:r>
+                          <a:rPr lang="en-US" b="0" i="1" smtClean="0">
+                            <a:latin typeface="Cambria Math" panose="02040503050406030204" pitchFamily="18" charset="0"/>
+                          </a:rPr>
+                          <m:t>𝐵</m:t>
+                        </m:r>
+                      </m:sub>
+                    </m:sSub>
+                    <m:r>
+                      <a:rPr lang="en-US" b="0" i="1" smtClean="0">
+                        <a:latin typeface="Cambria Math" panose="02040503050406030204" pitchFamily="18" charset="0"/>
+                      </a:rPr>
+                      <m:t>(</m:t>
+                    </m:r>
+                    <m:sSub>
+                      <m:sSubPr>
+                        <m:ctrlPr>
+                          <a:rPr lang="en-US" b="0" i="1" smtClean="0">
+                            <a:latin typeface="Cambria Math" panose="02040503050406030204" pitchFamily="18" charset="0"/>
+                          </a:rPr>
+                        </m:ctrlPr>
+                      </m:sSubPr>
+                      <m:e>
+                        <m:r>
+                          <a:rPr lang="ru-RU" b="0" i="1" smtClean="0">
+                            <a:latin typeface="Cambria Math" panose="02040503050406030204" pitchFamily="18" charset="0"/>
+                            <a:ea typeface="Cambria Math" panose="02040503050406030204" pitchFamily="18" charset="0"/>
+                          </a:rPr>
+                          <m:t>𝜈</m:t>
+                        </m:r>
+                      </m:e>
+                      <m:sub>
+                        <m:r>
+                          <a:rPr lang="en-US" b="0" i="1" smtClean="0">
+                            <a:latin typeface="Cambria Math" panose="02040503050406030204" pitchFamily="18" charset="0"/>
+                            <a:ea typeface="Cambria Math" panose="02040503050406030204" pitchFamily="18" charset="0"/>
+                          </a:rPr>
+                          <m:t>𝜅</m:t>
+                        </m:r>
+                      </m:sub>
+                    </m:sSub>
+                    <m:r>
+                      <a:rPr lang="en-US" b="0" i="1" smtClean="0">
+                        <a:latin typeface="Cambria Math" panose="02040503050406030204" pitchFamily="18" charset="0"/>
+                      </a:rPr>
+                      <m:t>)</m:t>
+                    </m:r>
+                  </m:oMath>
+                </a14:m>
+                <a:r>
+                  <a:rPr lang="ru-RU" dirty="0" smtClean="0"/>
+                  <a:t> </a:t>
+                </a:r>
+                <a:r>
+                  <a:rPr lang="en-US" dirty="0" smtClean="0"/>
+                  <a:t>evaluates the appearance of node </a:t>
+                </a:r>
+                <a14:m>
+                  <m:oMath xmlns:m="http://schemas.openxmlformats.org/officeDocument/2006/math">
+                    <m:sSub>
+                      <m:sSubPr>
+                        <m:ctrlPr>
+                          <a:rPr lang="en-US" i="1">
+                            <a:latin typeface="Cambria Math" panose="02040503050406030204" pitchFamily="18" charset="0"/>
+                          </a:rPr>
+                        </m:ctrlPr>
+                      </m:sSubPr>
+                      <m:e>
+                        <m:r>
+                          <a:rPr lang="ru-RU" i="1">
+                            <a:latin typeface="Cambria Math" panose="02040503050406030204" pitchFamily="18" charset="0"/>
+                            <a:ea typeface="Cambria Math" panose="02040503050406030204" pitchFamily="18" charset="0"/>
+                          </a:rPr>
+                          <m:t>𝜈</m:t>
+                        </m:r>
+                      </m:e>
+                      <m:sub>
+                        <m:r>
+                          <a:rPr lang="en-US" i="1">
+                            <a:latin typeface="Cambria Math" panose="02040503050406030204" pitchFamily="18" charset="0"/>
+                            <a:ea typeface="Cambria Math" panose="02040503050406030204" pitchFamily="18" charset="0"/>
+                          </a:rPr>
+                          <m:t>𝜅</m:t>
+                        </m:r>
+                      </m:sub>
+                    </m:sSub>
+                  </m:oMath>
+                </a14:m>
+                <a:r>
+                  <a:rPr lang="en-US" dirty="0" smtClean="0"/>
+                  <a:t> on the all shortest paths in a network</a:t>
+                </a:r>
+                <a:endParaRPr lang="ru-RU" dirty="0"/>
+              </a:p>
+            </p:txBody>
+          </p:sp>
+        </mc:Choice>
+        <mc:Fallback xmlns="">
+          <p:sp>
+            <p:nvSpPr>
+              <p:cNvPr id="3" name="TextBox 2"/>
+              <p:cNvSpPr txBox="1">
+                <a:spLocks noRot="1" noChangeAspect="1" noMove="1" noResize="1" noEditPoints="1" noAdjustHandles="1" noChangeArrowheads="1" noChangeShapeType="1" noTextEdit="1"/>
+              </p:cNvSpPr>
+              <p:nvPr/>
+            </p:nvSpPr>
+            <p:spPr>
+              <a:xfrm>
+                <a:off x="457200" y="4554415"/>
+                <a:ext cx="7925888" cy="369332"/>
+              </a:xfrm>
+              <a:prstGeom prst="rect">
+                <a:avLst/>
+              </a:prstGeom>
+              <a:blipFill>
+                <a:blip r:embed="rId3"/>
+                <a:stretch>
+                  <a:fillRect t="-8197" b="-24590"/>
+                </a:stretch>
+              </a:blipFill>
+            </p:spPr>
+            <p:txBody>
+              <a:bodyPr/>
+              <a:lstStyle/>
+              <a:p>
+                <a:r>
+                  <a:rPr lang="ru-RU">
+                    <a:noFill/>
+                  </a:rPr>
+                  <a:t> </a:t>
+                </a:r>
+              </a:p>
+            </p:txBody>
+          </p:sp>
+        </mc:Fallback>
+      </mc:AlternateContent>
+    </p:spTree>
+    <p:extLst>
+      <p:ext uri="{BB962C8B-B14F-4D97-AF65-F5344CB8AC3E}">
+        <p14:creationId xmlns:p14="http://schemas.microsoft.com/office/powerpoint/2010/main" val="3123058431"/>
+      </p:ext>
+    </p:extLst>
+  </p:cSld>
+  <p:clrMapOvr>
+    <a:masterClrMapping/>
+  </p:clrMapOvr>
+</p:sld>
+</file>
+
+<file path=ppt/slides/slide9.xml><?xml version="1.0" encoding="utf-8"?>
+<p:sld xmlns:a="http://schemas.openxmlformats.org/drawingml/2006/main" xmlns:r="http://schemas.openxmlformats.org/officeDocument/2006/relationships" xmlns:p="http://schemas.openxmlformats.org/presentationml/2006/main">
+  <p:cSld>
+    <p:bg>
+      <p:bgPr>
+        <a:solidFill>
+          <a:schemeClr val="bg1"/>
+        </a:solidFill>
+        <a:effectLst/>
+      </p:bgPr>
+    </p:bg>
+    <p:spTree>
+      <p:nvGrpSpPr>
+        <p:cNvPr id="1" name=""/>
+        <p:cNvGrpSpPr/>
+        <p:nvPr/>
+      </p:nvGrpSpPr>
+      <p:grpSpPr>
+        <a:xfrm>
+          <a:off x="0" y="0"/>
+          <a:ext cx="0" cy="0"/>
+          <a:chOff x="0" y="0"/>
+          <a:chExt cx="0" cy="0"/>
+        </a:xfrm>
+      </p:grpSpPr>
+      <p:sp>
+        <p:nvSpPr>
+          <p:cNvPr id="2" name="Title 1"/>
+          <p:cNvSpPr>
+            <a:spLocks noGrp="1"/>
+          </p:cNvSpPr>
+          <p:nvPr>
+            <p:ph type="title"/>
+          </p:nvPr>
+        </p:nvSpPr>
+        <p:spPr>
+          <a:xfrm>
+            <a:off x="457200" y="128595"/>
+            <a:ext cx="6273934" cy="620483"/>
+          </a:xfrm>
+        </p:spPr>
+        <p:txBody>
+          <a:bodyPr/>
+          <a:lstStyle/>
+          <a:p>
+            <a:r>
+              <a:rPr lang="en-US" dirty="0" err="1" smtClean="0"/>
+              <a:t>Assortativity</a:t>
+            </a:r>
+            <a:endParaRPr lang="ru-RU" dirty="0"/>
+          </a:p>
+        </p:txBody>
+      </p:sp>
+      <p:sp>
+        <p:nvSpPr>
+          <p:cNvPr id="3" name="Content Placeholder 2"/>
+          <p:cNvSpPr>
+            <a:spLocks noGrp="1"/>
+          </p:cNvSpPr>
+          <p:nvPr>
+            <p:ph sz="half" idx="1"/>
+          </p:nvPr>
+        </p:nvSpPr>
+        <p:spPr>
+          <a:xfrm>
+            <a:off x="342900" y="990387"/>
+            <a:ext cx="4507037" cy="1486113"/>
+          </a:xfrm>
+        </p:spPr>
+        <p:txBody>
+          <a:bodyPr>
+            <a:normAutofit/>
+          </a:bodyPr>
+          <a:lstStyle/>
+          <a:p>
+            <a:pPr marL="0" indent="0" algn="just">
+              <a:buNone/>
+            </a:pPr>
+            <a:r>
+              <a:rPr lang="en-US" dirty="0"/>
+              <a:t>The average degree connectivity is the average nearest neighbor degree of nodes with degree k. </a:t>
+            </a:r>
+            <a:endParaRPr lang="ru-RU" dirty="0"/>
+          </a:p>
+        </p:txBody>
+      </p:sp>
+      <p:pic>
+        <p:nvPicPr>
+          <p:cNvPr id="4" name="Picture 3"/>
+          <p:cNvPicPr>
+            <a:picLocks noChangeAspect="1"/>
+          </p:cNvPicPr>
+          <p:nvPr/>
+        </p:nvPicPr>
+        <p:blipFill>
+          <a:blip r:embed="rId2">
+            <a:extLst>
+              <a:ext uri="{28A0092B-C50C-407E-A947-70E740481C1C}">
+                <a14:useLocalDpi xmlns:a14="http://schemas.microsoft.com/office/drawing/2010/main" val="0"/>
+              </a:ext>
+            </a:extLst>
+          </a:blip>
+          <a:stretch>
+            <a:fillRect/>
+          </a:stretch>
+        </p:blipFill>
+        <p:spPr>
+          <a:xfrm>
+            <a:off x="4849937" y="749078"/>
+            <a:ext cx="4116263" cy="3087197"/>
+          </a:xfrm>
+          <a:prstGeom prst="rect">
+            <a:avLst/>
+          </a:prstGeom>
+        </p:spPr>
+      </p:pic>
+      <p:sp>
+        <p:nvSpPr>
+          <p:cNvPr id="5" name="Content Placeholder 2"/>
+          <p:cNvSpPr txBox="1">
+            <a:spLocks/>
+          </p:cNvSpPr>
+          <p:nvPr/>
+        </p:nvSpPr>
+        <p:spPr>
+          <a:xfrm>
+            <a:off x="457200" y="4204574"/>
+            <a:ext cx="8509000" cy="758347"/>
+          </a:xfrm>
+          <a:prstGeom prst="rect">
+            <a:avLst/>
+          </a:prstGeom>
+        </p:spPr>
+        <p:txBody>
+          <a:bodyPr vert="horz" lIns="91440" tIns="45720" rIns="91440" bIns="45720" rtlCol="0">
+            <a:normAutofit/>
+          </a:bodyPr>
+          <a:lstStyle>
+            <a:lvl1pPr marL="342900" indent="-342900" algn="l" defTabSz="457200" rtl="0" eaLnBrk="1" latinLnBrk="0" hangingPunct="1">
+              <a:spcBef>
+                <a:spcPct val="20000"/>
+              </a:spcBef>
+              <a:buSzPct val="100000"/>
+              <a:buFontTx/>
+              <a:buBlip>
+                <a:blip r:embed="rId3"/>
+              </a:buBlip>
+              <a:defRPr sz="2400" kern="1200">
+                <a:solidFill>
+                  <a:schemeClr val="tx1"/>
+                </a:solidFill>
+                <a:latin typeface="+mn-lt"/>
+                <a:ea typeface="+mn-ea"/>
+                <a:cs typeface="+mn-cs"/>
+              </a:defRPr>
+            </a:lvl1pPr>
+            <a:lvl2pPr marL="742950" indent="-285750" algn="l" defTabSz="457200" rtl="0" eaLnBrk="1" latinLnBrk="0" hangingPunct="1">
+              <a:spcBef>
+                <a:spcPct val="20000"/>
+              </a:spcBef>
+              <a:buFont typeface="Arial"/>
+              <a:buChar char="•"/>
+              <a:defRPr sz="2400" kern="1200">
+                <a:solidFill>
+                  <a:schemeClr val="tx1"/>
+                </a:solidFill>
+                <a:latin typeface="+mn-lt"/>
+                <a:ea typeface="+mn-ea"/>
+                <a:cs typeface="+mn-cs"/>
+              </a:defRPr>
+            </a:lvl2pPr>
+            <a:lvl3pPr marL="1143000" indent="-228600" algn="l" defTabSz="457200" rtl="0" eaLnBrk="1" latinLnBrk="0" hangingPunct="1">
+              <a:spcBef>
+                <a:spcPct val="20000"/>
+              </a:spcBef>
+              <a:buFont typeface="Arial"/>
+              <a:buChar char="•"/>
+              <a:defRPr sz="2000" kern="1200">
+                <a:solidFill>
+                  <a:schemeClr val="tx1"/>
+                </a:solidFill>
+                <a:latin typeface="+mn-lt"/>
+                <a:ea typeface="+mn-ea"/>
+                <a:cs typeface="+mn-cs"/>
+              </a:defRPr>
+            </a:lvl3pPr>
+            <a:lvl4pPr marL="1600200" indent="-228600" algn="l" defTabSz="457200" rtl="0" eaLnBrk="1" latinLnBrk="0" hangingPunct="1">
+              <a:spcBef>
+                <a:spcPct val="20000"/>
+              </a:spcBef>
+              <a:buFont typeface="Arial"/>
+              <a:buChar char="•"/>
+              <a:defRPr sz="1800" kern="1200">
+                <a:solidFill>
+                  <a:schemeClr val="tx1"/>
+                </a:solidFill>
+                <a:latin typeface="+mn-lt"/>
+                <a:ea typeface="+mn-ea"/>
+                <a:cs typeface="+mn-cs"/>
+              </a:defRPr>
+            </a:lvl4pPr>
+            <a:lvl5pPr marL="2057400" indent="-228600" algn="l" defTabSz="457200" rtl="0" eaLnBrk="1" latinLnBrk="0" hangingPunct="1">
+              <a:spcBef>
+                <a:spcPct val="20000"/>
+              </a:spcBef>
+              <a:buFont typeface="Arial"/>
+              <a:buChar char="•"/>
+              <a:defRPr sz="1800" kern="1200">
+                <a:solidFill>
+                  <a:schemeClr val="tx1"/>
+                </a:solidFill>
+                <a:latin typeface="+mn-lt"/>
+                <a:ea typeface="+mn-ea"/>
+                <a:cs typeface="+mn-cs"/>
+              </a:defRPr>
+            </a:lvl5pPr>
+            <a:lvl6pPr marL="2514600" indent="-228600" algn="l" defTabSz="457200" rtl="0" eaLnBrk="1" latinLnBrk="0" hangingPunct="1">
+              <a:spcBef>
+                <a:spcPct val="20000"/>
+              </a:spcBef>
+              <a:buFont typeface="Arial"/>
+              <a:buChar char="•"/>
+              <a:defRPr sz="1800" kern="1200">
+                <a:solidFill>
+                  <a:schemeClr val="tx1"/>
+                </a:solidFill>
+                <a:latin typeface="+mn-lt"/>
+                <a:ea typeface="+mn-ea"/>
+                <a:cs typeface="+mn-cs"/>
+              </a:defRPr>
+            </a:lvl6pPr>
+            <a:lvl7pPr marL="2971800" indent="-228600" algn="l" defTabSz="457200" rtl="0" eaLnBrk="1" latinLnBrk="0" hangingPunct="1">
+              <a:spcBef>
+                <a:spcPct val="20000"/>
+              </a:spcBef>
+              <a:buFont typeface="Arial"/>
+              <a:buChar char="•"/>
+              <a:defRPr sz="1800" kern="1200">
+                <a:solidFill>
+                  <a:schemeClr val="tx1"/>
+                </a:solidFill>
+                <a:latin typeface="+mn-lt"/>
+                <a:ea typeface="+mn-ea"/>
+                <a:cs typeface="+mn-cs"/>
+              </a:defRPr>
+            </a:lvl7pPr>
+            <a:lvl8pPr marL="3429000" indent="-228600" algn="l" defTabSz="457200" rtl="0" eaLnBrk="1" latinLnBrk="0" hangingPunct="1">
+              <a:spcBef>
+                <a:spcPct val="20000"/>
+              </a:spcBef>
+              <a:buFont typeface="Arial"/>
+              <a:buChar char="•"/>
+              <a:defRPr sz="1800" kern="1200">
+                <a:solidFill>
+                  <a:schemeClr val="tx1"/>
+                </a:solidFill>
+                <a:latin typeface="+mn-lt"/>
+                <a:ea typeface="+mn-ea"/>
+                <a:cs typeface="+mn-cs"/>
+              </a:defRPr>
+            </a:lvl8pPr>
+            <a:lvl9pPr marL="3886200" indent="-228600" algn="l" defTabSz="457200" rtl="0" eaLnBrk="1" latinLnBrk="0" hangingPunct="1">
+              <a:spcBef>
+                <a:spcPct val="20000"/>
+              </a:spcBef>
+              <a:buFont typeface="Arial"/>
+              <a:buChar char="•"/>
+              <a:defRPr sz="1800" kern="1200">
+                <a:solidFill>
+                  <a:schemeClr val="tx1"/>
+                </a:solidFill>
+                <a:latin typeface="+mn-lt"/>
+                <a:ea typeface="+mn-ea"/>
+                <a:cs typeface="+mn-cs"/>
+              </a:defRPr>
+            </a:lvl9pPr>
+          </a:lstStyle>
+          <a:p>
+            <a:pPr marL="0" indent="0" algn="just">
+              <a:buNone/>
+            </a:pPr>
+            <a:r>
+              <a:rPr lang="en-US" dirty="0" smtClean="0"/>
+              <a:t>Degree Pearson correlation coefficient: </a:t>
+            </a:r>
+            <a:r>
+              <a:rPr lang="en-US" dirty="0"/>
+              <a:t>-0.002628226403824088</a:t>
+            </a:r>
+            <a:endParaRPr lang="ru-RU" dirty="0"/>
+          </a:p>
+        </p:txBody>
+      </p:sp>
+      <p:sp>
+        <p:nvSpPr>
+          <p:cNvPr id="7" name="Content Placeholder 2"/>
+          <p:cNvSpPr txBox="1">
+            <a:spLocks/>
+          </p:cNvSpPr>
+          <p:nvPr/>
+        </p:nvSpPr>
+        <p:spPr>
+          <a:xfrm>
+            <a:off x="342900" y="2688323"/>
+            <a:ext cx="4507037" cy="1147952"/>
+          </a:xfrm>
+          <a:prstGeom prst="rect">
+            <a:avLst/>
+          </a:prstGeom>
+        </p:spPr>
+        <p:txBody>
+          <a:bodyPr vert="horz" lIns="91440" tIns="45720" rIns="91440" bIns="45720" rtlCol="0">
+            <a:normAutofit/>
+          </a:bodyPr>
+          <a:lstStyle>
+            <a:lvl1pPr marL="342900" indent="-342900" algn="l" defTabSz="457200" rtl="0" eaLnBrk="1" latinLnBrk="0" hangingPunct="1">
+              <a:spcBef>
+                <a:spcPct val="20000"/>
+              </a:spcBef>
+              <a:buSzPct val="100000"/>
+              <a:buFontTx/>
+              <a:buBlip>
+                <a:blip r:embed="rId3"/>
+              </a:buBlip>
+              <a:defRPr sz="2400" kern="1200">
+                <a:solidFill>
+                  <a:schemeClr val="tx1"/>
+                </a:solidFill>
+                <a:latin typeface="+mn-lt"/>
+                <a:ea typeface="+mn-ea"/>
+                <a:cs typeface="+mn-cs"/>
+              </a:defRPr>
+            </a:lvl1pPr>
+            <a:lvl2pPr marL="742950" indent="-285750" algn="l" defTabSz="457200" rtl="0" eaLnBrk="1" latinLnBrk="0" hangingPunct="1">
+              <a:spcBef>
+                <a:spcPct val="20000"/>
+              </a:spcBef>
+              <a:buFont typeface="Arial"/>
+              <a:buChar char="•"/>
+              <a:defRPr sz="2400" kern="1200">
+                <a:solidFill>
+                  <a:schemeClr val="tx1"/>
+                </a:solidFill>
+                <a:latin typeface="+mn-lt"/>
+                <a:ea typeface="+mn-ea"/>
+                <a:cs typeface="+mn-cs"/>
+              </a:defRPr>
+            </a:lvl2pPr>
+            <a:lvl3pPr marL="1143000" indent="-228600" algn="l" defTabSz="457200" rtl="0" eaLnBrk="1" latinLnBrk="0" hangingPunct="1">
+              <a:spcBef>
+                <a:spcPct val="20000"/>
+              </a:spcBef>
+              <a:buFont typeface="Arial"/>
+              <a:buChar char="•"/>
+              <a:defRPr sz="2000" kern="1200">
+                <a:solidFill>
+                  <a:schemeClr val="tx1"/>
+                </a:solidFill>
+                <a:latin typeface="+mn-lt"/>
+                <a:ea typeface="+mn-ea"/>
+                <a:cs typeface="+mn-cs"/>
+              </a:defRPr>
+            </a:lvl3pPr>
+            <a:lvl4pPr marL="1600200" indent="-228600" algn="l" defTabSz="457200" rtl="0" eaLnBrk="1" latinLnBrk="0" hangingPunct="1">
+              <a:spcBef>
+                <a:spcPct val="20000"/>
+              </a:spcBef>
+              <a:buFont typeface="Arial"/>
+              <a:buChar char="•"/>
+              <a:defRPr sz="1800" kern="1200">
+                <a:solidFill>
+                  <a:schemeClr val="tx1"/>
+                </a:solidFill>
+                <a:latin typeface="+mn-lt"/>
+                <a:ea typeface="+mn-ea"/>
+                <a:cs typeface="+mn-cs"/>
+              </a:defRPr>
+            </a:lvl4pPr>
+            <a:lvl5pPr marL="2057400" indent="-228600" algn="l" defTabSz="457200" rtl="0" eaLnBrk="1" latinLnBrk="0" hangingPunct="1">
+              <a:spcBef>
+                <a:spcPct val="20000"/>
+              </a:spcBef>
+              <a:buFont typeface="Arial"/>
+              <a:buChar char="•"/>
+              <a:defRPr sz="1800" kern="1200">
+                <a:solidFill>
+                  <a:schemeClr val="tx1"/>
+                </a:solidFill>
+                <a:latin typeface="+mn-lt"/>
+                <a:ea typeface="+mn-ea"/>
+                <a:cs typeface="+mn-cs"/>
+              </a:defRPr>
+            </a:lvl5pPr>
+            <a:lvl6pPr marL="2514600" indent="-228600" algn="l" defTabSz="457200" rtl="0" eaLnBrk="1" latinLnBrk="0" hangingPunct="1">
+              <a:spcBef>
+                <a:spcPct val="20000"/>
+              </a:spcBef>
+              <a:buFont typeface="Arial"/>
+              <a:buChar char="•"/>
+              <a:defRPr sz="1800" kern="1200">
+                <a:solidFill>
+                  <a:schemeClr val="tx1"/>
+                </a:solidFill>
+                <a:latin typeface="+mn-lt"/>
+                <a:ea typeface="+mn-ea"/>
+                <a:cs typeface="+mn-cs"/>
+              </a:defRPr>
+            </a:lvl6pPr>
+            <a:lvl7pPr marL="2971800" indent="-228600" algn="l" defTabSz="457200" rtl="0" eaLnBrk="1" latinLnBrk="0" hangingPunct="1">
+              <a:spcBef>
+                <a:spcPct val="20000"/>
+              </a:spcBef>
+              <a:buFont typeface="Arial"/>
+              <a:buChar char="•"/>
+              <a:defRPr sz="1800" kern="1200">
+                <a:solidFill>
+                  <a:schemeClr val="tx1"/>
+                </a:solidFill>
+                <a:latin typeface="+mn-lt"/>
+                <a:ea typeface="+mn-ea"/>
+                <a:cs typeface="+mn-cs"/>
+              </a:defRPr>
+            </a:lvl7pPr>
+            <a:lvl8pPr marL="3429000" indent="-228600" algn="l" defTabSz="457200" rtl="0" eaLnBrk="1" latinLnBrk="0" hangingPunct="1">
+              <a:spcBef>
+                <a:spcPct val="20000"/>
+              </a:spcBef>
+              <a:buFont typeface="Arial"/>
+              <a:buChar char="•"/>
+              <a:defRPr sz="1800" kern="1200">
+                <a:solidFill>
+                  <a:schemeClr val="tx1"/>
+                </a:solidFill>
+                <a:latin typeface="+mn-lt"/>
+                <a:ea typeface="+mn-ea"/>
+                <a:cs typeface="+mn-cs"/>
+              </a:defRPr>
+            </a:lvl8pPr>
+            <a:lvl9pPr marL="3886200" indent="-228600" algn="l" defTabSz="457200" rtl="0" eaLnBrk="1" latinLnBrk="0" hangingPunct="1">
+              <a:spcBef>
+                <a:spcPct val="20000"/>
+              </a:spcBef>
+              <a:buFont typeface="Arial"/>
+              <a:buChar char="•"/>
+              <a:defRPr sz="1800" kern="1200">
+                <a:solidFill>
+                  <a:schemeClr val="tx1"/>
+                </a:solidFill>
+                <a:latin typeface="+mn-lt"/>
+                <a:ea typeface="+mn-ea"/>
+                <a:cs typeface="+mn-cs"/>
+              </a:defRPr>
+            </a:lvl9pPr>
+          </a:lstStyle>
+          <a:p>
+            <a:pPr marL="0" indent="0" algn="just">
+              <a:buNone/>
+            </a:pPr>
+            <a:r>
+              <a:rPr lang="en-US" dirty="0" smtClean="0"/>
+              <a:t>This network is </a:t>
+            </a:r>
+            <a:r>
+              <a:rPr lang="en-US" dirty="0" err="1" smtClean="0"/>
+              <a:t>disassortative</a:t>
+            </a:r>
+            <a:endParaRPr lang="en-US" dirty="0" smtClean="0"/>
+          </a:p>
+        </p:txBody>
+      </p:sp>
+    </p:spTree>
+    <p:extLst>
+      <p:ext uri="{BB962C8B-B14F-4D97-AF65-F5344CB8AC3E}">
+        <p14:creationId xmlns:p14="http://schemas.microsoft.com/office/powerpoint/2010/main" val="2827962398"/>
       </p:ext>
     </p:extLst>
   </p:cSld>

</xml_diff>